<commit_message>
Update through lecture 10
</commit_message>
<xml_diff>
--- a/Lecture10_SyntheticControl_QuantileRegression/Lecture10_SyntheticControl_QuantileRegression.pptx
+++ b/Lecture10_SyntheticControl_QuantileRegression/Lecture10_SyntheticControl_QuantileRegression.pptx
@@ -248,7 +248,7 @@
           <a:p>
             <a:fld id="{EF911157-0FC2-4F06-8D61-FD647FE4E19D}" type="datetimeFigureOut">
               <a:rPr lang="en-US" smtClean="0"/>
-              <a:t>7/26/2022</a:t>
+              <a:t>8/15/2022</a:t>
             </a:fld>
             <a:endParaRPr lang="en-US"/>
           </a:p>
@@ -3678,6 +3678,31 @@
           <a:bodyPr/>
           <a:lstStyle/>
           <a:p>
+            <a:pPr marL="0" marR="0" lvl="0" indent="0" algn="l" defTabSz="914400" rtl="0" eaLnBrk="1" fontAlgn="auto" latinLnBrk="0" hangingPunct="1">
+              <a:lnSpc>
+                <a:spcPct val="100000"/>
+              </a:lnSpc>
+              <a:spcBef>
+                <a:spcPts val="0"/>
+              </a:spcBef>
+              <a:spcAft>
+                <a:spcPts val="0"/>
+              </a:spcAft>
+              <a:buClrTx/>
+              <a:buSzTx/>
+              <a:buFontTx/>
+              <a:buNone/>
+              <a:tabLst/>
+              <a:defRPr/>
+            </a:pPr>
+            <a:r>
+              <a:rPr lang="en-US" sz="1200" dirty="0">
+                <a:cs typeface="Times New Roman" panose="02020603050405020304" pitchFamily="18" charset="0"/>
+              </a:rPr>
+              <a:t>Lots of ways to estimate distributional effects!</a:t>
+            </a:r>
+          </a:p>
+          <a:p>
             <a:endParaRPr lang="en-US" dirty="0"/>
           </a:p>
         </p:txBody>
@@ -4334,7 +4359,7 @@
             <a:fld id="{0972D05C-DCFB-4BB6-B49C-AC126BF3ED2C}" type="datetimeFigureOut">
               <a:rPr lang="en-US" smtClean="0"/>
               <a:pPr/>
-              <a:t>7/26/2022</a:t>
+              <a:t>8/15/2022</a:t>
             </a:fld>
             <a:endParaRPr lang="en-US"/>
           </a:p>
@@ -4564,7 +4589,7 @@
             <a:fld id="{0972D05C-DCFB-4BB6-B49C-AC126BF3ED2C}" type="datetimeFigureOut">
               <a:rPr lang="en-US" smtClean="0"/>
               <a:pPr/>
-              <a:t>7/26/2022</a:t>
+              <a:t>8/15/2022</a:t>
             </a:fld>
             <a:endParaRPr lang="en-US"/>
           </a:p>
@@ -4746,7 +4771,7 @@
             <a:fld id="{0972D05C-DCFB-4BB6-B49C-AC126BF3ED2C}" type="datetimeFigureOut">
               <a:rPr lang="en-US" smtClean="0"/>
               <a:pPr/>
-              <a:t>7/26/2022</a:t>
+              <a:t>8/15/2022</a:t>
             </a:fld>
             <a:endParaRPr lang="en-US"/>
           </a:p>
@@ -4918,7 +4943,7 @@
             <a:fld id="{0972D05C-DCFB-4BB6-B49C-AC126BF3ED2C}" type="datetimeFigureOut">
               <a:rPr lang="en-US" smtClean="0"/>
               <a:pPr/>
-              <a:t>7/26/2022</a:t>
+              <a:t>8/15/2022</a:t>
             </a:fld>
             <a:endParaRPr lang="en-US"/>
           </a:p>
@@ -5174,7 +5199,7 @@
             <a:fld id="{0972D05C-DCFB-4BB6-B49C-AC126BF3ED2C}" type="datetimeFigureOut">
               <a:rPr lang="en-US" smtClean="0"/>
               <a:pPr/>
-              <a:t>7/26/2022</a:t>
+              <a:t>8/15/2022</a:t>
             </a:fld>
             <a:endParaRPr lang="en-US"/>
           </a:p>
@@ -5502,7 +5527,7 @@
             <a:fld id="{0972D05C-DCFB-4BB6-B49C-AC126BF3ED2C}" type="datetimeFigureOut">
               <a:rPr lang="en-US" smtClean="0"/>
               <a:pPr/>
-              <a:t>7/26/2022</a:t>
+              <a:t>8/15/2022</a:t>
             </a:fld>
             <a:endParaRPr lang="en-US"/>
           </a:p>
@@ -5955,7 +5980,7 @@
             <a:fld id="{0972D05C-DCFB-4BB6-B49C-AC126BF3ED2C}" type="datetimeFigureOut">
               <a:rPr lang="en-US" smtClean="0"/>
               <a:pPr/>
-              <a:t>7/26/2022</a:t>
+              <a:t>8/15/2022</a:t>
             </a:fld>
             <a:endParaRPr lang="en-US"/>
           </a:p>
@@ -6075,7 +6100,7 @@
             <a:fld id="{0972D05C-DCFB-4BB6-B49C-AC126BF3ED2C}" type="datetimeFigureOut">
               <a:rPr lang="en-US" smtClean="0"/>
               <a:pPr/>
-              <a:t>7/26/2022</a:t>
+              <a:t>8/15/2022</a:t>
             </a:fld>
             <a:endParaRPr lang="en-US"/>
           </a:p>
@@ -6172,7 +6197,7 @@
             <a:fld id="{0972D05C-DCFB-4BB6-B49C-AC126BF3ED2C}" type="datetimeFigureOut">
               <a:rPr lang="en-US" smtClean="0"/>
               <a:pPr/>
-              <a:t>7/26/2022</a:t>
+              <a:t>8/15/2022</a:t>
             </a:fld>
             <a:endParaRPr lang="en-US"/>
           </a:p>
@@ -6461,7 +6486,7 @@
             <a:fld id="{0972D05C-DCFB-4BB6-B49C-AC126BF3ED2C}" type="datetimeFigureOut">
               <a:rPr lang="en-US" smtClean="0"/>
               <a:pPr/>
-              <a:t>7/26/2022</a:t>
+              <a:t>8/15/2022</a:t>
             </a:fld>
             <a:endParaRPr lang="en-US"/>
           </a:p>
@@ -6785,7 +6810,7 @@
             <a:fld id="{0972D05C-DCFB-4BB6-B49C-AC126BF3ED2C}" type="datetimeFigureOut">
               <a:rPr lang="en-US" smtClean="0"/>
               <a:pPr/>
-              <a:t>7/26/2022</a:t>
+              <a:t>8/15/2022</a:t>
             </a:fld>
             <a:endParaRPr lang="en-US"/>
           </a:p>
@@ -7040,7 +7065,7 @@
             <a:fld id="{0972D05C-DCFB-4BB6-B49C-AC126BF3ED2C}" type="datetimeFigureOut">
               <a:rPr lang="en-US" smtClean="0"/>
               <a:pPr/>
-              <a:t>7/26/2022</a:t>
+              <a:t>8/15/2022</a:t>
             </a:fld>
             <a:endParaRPr lang="en-US" dirty="0"/>
           </a:p>
@@ -7686,8 +7711,8 @@
         </p:nvSpPr>
         <p:spPr>
           <a:xfrm>
-            <a:off x="1219199" y="1066801"/>
-            <a:ext cx="9405791" cy="5141388"/>
+            <a:off x="609601" y="1066801"/>
+            <a:ext cx="10015390" cy="5141388"/>
           </a:xfrm>
         </p:spPr>
         <p:txBody>
@@ -7697,13 +7722,13 @@
           <a:lstStyle/>
           <a:p>
             <a:r>
-              <a:rPr lang="en-US" sz="2200" dirty="0">
+              <a:rPr lang="en-US" sz="2400" dirty="0">
                 <a:cs typeface="Times New Roman" panose="02020603050405020304" pitchFamily="18" charset="0"/>
               </a:rPr>
               <a:t>To get around the problem: </a:t>
             </a:r>
             <a:r>
-              <a:rPr lang="en-US" sz="2200" b="1" dirty="0">
+              <a:rPr lang="en-US" sz="2400" b="1" dirty="0">
                 <a:cs typeface="Times New Roman" panose="02020603050405020304" pitchFamily="18" charset="0"/>
               </a:rPr>
               <a:t>throw in the kitchen sink!</a:t>
@@ -7711,7 +7736,7 @@
           </a:p>
           <a:p>
             <a:r>
-              <a:rPr lang="en-US" sz="2200" dirty="0">
+              <a:rPr lang="en-US" sz="2400" dirty="0">
                 <a:cs typeface="Times New Roman" panose="02020603050405020304" pitchFamily="18" charset="0"/>
               </a:rPr>
               <a:t>Main advantage: data-driven way to construct weighted average </a:t>
@@ -7720,7 +7745,7 @@
           <a:p>
             <a:pPr lvl="1"/>
             <a:r>
-              <a:rPr lang="en-US" sz="2200" dirty="0">
+              <a:rPr lang="en-US" sz="2400" dirty="0">
                 <a:cs typeface="Times New Roman" panose="02020603050405020304" pitchFamily="18" charset="0"/>
               </a:rPr>
               <a:t>Researcher doesn’t choose weights</a:t>
@@ -7728,7 +7753,7 @@
           </a:p>
           <a:p>
             <a:r>
-              <a:rPr lang="en-US" sz="2200" dirty="0">
+              <a:rPr lang="en-US" sz="2400" dirty="0">
                 <a:cs typeface="Times New Roman" panose="02020603050405020304" pitchFamily="18" charset="0"/>
               </a:rPr>
               <a:t>Researcher chooses: </a:t>
@@ -7740,13 +7765,13 @@
               <a:buAutoNum type="arabicPeriod"/>
             </a:pPr>
             <a:r>
-              <a:rPr lang="en-US" sz="2200" b="1" dirty="0">
+              <a:rPr lang="en-US" sz="2400" b="1" dirty="0">
                 <a:cs typeface="Times New Roman" panose="02020603050405020304" pitchFamily="18" charset="0"/>
               </a:rPr>
               <a:t>Donor pool</a:t>
             </a:r>
             <a:r>
-              <a:rPr lang="en-US" sz="2200" dirty="0">
+              <a:rPr lang="en-US" sz="2400" dirty="0">
                 <a:cs typeface="Times New Roman" panose="02020603050405020304" pitchFamily="18" charset="0"/>
               </a:rPr>
               <a:t>: possible states for control (algorithm may assign weight 0)</a:t>
@@ -7758,13 +7783,13 @@
               <a:buAutoNum type="arabicPeriod"/>
             </a:pPr>
             <a:r>
-              <a:rPr lang="en-US" sz="2200" b="1" dirty="0">
+              <a:rPr lang="en-US" sz="2400" b="1" dirty="0">
                 <a:cs typeface="Times New Roman" panose="02020603050405020304" pitchFamily="18" charset="0"/>
               </a:rPr>
               <a:t>Matching variables: </a:t>
             </a:r>
             <a:r>
-              <a:rPr lang="en-US" sz="2200" dirty="0">
+              <a:rPr lang="en-US" sz="2400" dirty="0">
                 <a:cs typeface="Times New Roman" panose="02020603050405020304" pitchFamily="18" charset="0"/>
               </a:rPr>
               <a:t>pre-treatment trends + any other covariates</a:t>
@@ -7775,7 +7800,7 @@
               <a:buFont typeface="+mj-lt"/>
               <a:buAutoNum type="arabicPeriod"/>
             </a:pPr>
-            <a:endParaRPr lang="en-US" sz="2200" dirty="0">
+            <a:endParaRPr lang="en-US" sz="2400" dirty="0">
               <a:cs typeface="Times New Roman" panose="02020603050405020304" pitchFamily="18" charset="0"/>
             </a:endParaRPr>
           </a:p>
@@ -7784,7 +7809,7 @@
               <a:buNone/>
             </a:pPr>
             <a:r>
-              <a:rPr lang="en-US" sz="2200" dirty="0">
+              <a:rPr lang="en-US" sz="2400" dirty="0">
                 <a:cs typeface="Times New Roman" panose="02020603050405020304" pitchFamily="18" charset="0"/>
               </a:rPr>
               <a:t>In this context: </a:t>
@@ -7793,7 +7818,7 @@
           <a:p>
             <a:pPr lvl="1"/>
             <a:r>
-              <a:rPr lang="en-US" sz="2200" dirty="0">
+              <a:rPr lang="en-US" sz="2400" dirty="0">
                 <a:cs typeface="Times New Roman" panose="02020603050405020304" pitchFamily="18" charset="0"/>
               </a:rPr>
               <a:t>Unit of observation: state</a:t>
@@ -7802,7 +7827,7 @@
           <a:p>
             <a:pPr lvl="1"/>
             <a:r>
-              <a:rPr lang="en-US" sz="2200" dirty="0">
+              <a:rPr lang="en-US" sz="2400" dirty="0">
                 <a:cs typeface="Times New Roman" panose="02020603050405020304" pitchFamily="18" charset="0"/>
               </a:rPr>
               <a:t>Exclude other states that subsequently passed control programs</a:t>
@@ -7811,7 +7836,7 @@
           <a:p>
             <a:pPr lvl="1"/>
             <a:r>
-              <a:rPr lang="en-US" sz="2200" dirty="0">
+              <a:rPr lang="en-US" sz="2400" dirty="0">
                 <a:cs typeface="Times New Roman" panose="02020603050405020304" pitchFamily="18" charset="0"/>
               </a:rPr>
               <a:t>Match on pre-trends + state economy, price of cigarettes, etc. </a:t>
@@ -7820,19 +7845,19 @@
           <a:p>
             <a:pPr lvl="1"/>
             <a:r>
-              <a:rPr lang="en-US" sz="2200" dirty="0">
+              <a:rPr lang="en-US" sz="2400" dirty="0">
                 <a:cs typeface="Times New Roman" panose="02020603050405020304" pitchFamily="18" charset="0"/>
               </a:rPr>
               <a:t>Main goal: </a:t>
             </a:r>
             <a:r>
-              <a:rPr lang="en-US" sz="2200" b="1" dirty="0">
+              <a:rPr lang="en-US" sz="2400" b="1" dirty="0">
                 <a:cs typeface="Times New Roman" panose="02020603050405020304" pitchFamily="18" charset="0"/>
               </a:rPr>
               <a:t>interpolation </a:t>
             </a:r>
             <a:r>
-              <a:rPr lang="en-US" sz="2200" dirty="0">
+              <a:rPr lang="en-US" sz="2400" dirty="0">
                 <a:cs typeface="Times New Roman" panose="02020603050405020304" pitchFamily="18" charset="0"/>
               </a:rPr>
               <a:t>(next slide)</a:t>
@@ -7964,8 +7989,8 @@
         </p:nvSpPr>
         <p:spPr>
           <a:xfrm>
-            <a:off x="1219199" y="1066801"/>
-            <a:ext cx="9405791" cy="5141388"/>
+            <a:off x="609601" y="1066801"/>
+            <a:ext cx="10015390" cy="5141388"/>
           </a:xfrm>
         </p:spPr>
         <p:txBody>
@@ -7975,19 +8000,19 @@
           <a:lstStyle/>
           <a:p>
             <a:r>
-              <a:rPr lang="en-US" sz="2200" dirty="0">
+              <a:rPr lang="en-US" sz="2400" dirty="0">
                 <a:cs typeface="Times New Roman" panose="02020603050405020304" pitchFamily="18" charset="0"/>
               </a:rPr>
               <a:t>Synthetic Ohio is generated from </a:t>
             </a:r>
             <a:r>
-              <a:rPr lang="en-US" sz="2200" b="1" dirty="0">
+              <a:rPr lang="en-US" sz="2400" b="1" dirty="0">
                 <a:cs typeface="Times New Roman" panose="02020603050405020304" pitchFamily="18" charset="0"/>
               </a:rPr>
               <a:t>a convex hull </a:t>
             </a:r>
             <a:r>
-              <a:rPr lang="en-US" sz="2200" dirty="0">
+              <a:rPr lang="en-US" sz="2400" dirty="0">
                 <a:cs typeface="Times New Roman" panose="02020603050405020304" pitchFamily="18" charset="0"/>
               </a:rPr>
               <a:t>of control states</a:t>
@@ -7996,14 +8021,14 @@
           <a:p>
             <a:pPr lvl="1"/>
             <a:r>
-              <a:rPr lang="en-US" sz="2000" dirty="0">
+              <a:rPr lang="en-US" sz="2400" dirty="0">
                 <a:cs typeface="Times New Roman" panose="02020603050405020304" pitchFamily="18" charset="0"/>
               </a:rPr>
               <a:t>Requires some amount of comparability (can’t compare OH to Mars)</a:t>
             </a:r>
           </a:p>
           <a:p>
-            <a:endParaRPr lang="en-US" sz="2200" dirty="0">
+            <a:endParaRPr lang="en-US" sz="2400" dirty="0">
               <a:cs typeface="Times New Roman" panose="02020603050405020304" pitchFamily="18" charset="0"/>
             </a:endParaRPr>
           </a:p>
@@ -8088,8 +8113,8 @@
             </p:nvSpPr>
             <p:spPr>
               <a:xfrm>
-                <a:off x="1219199" y="1066801"/>
-                <a:ext cx="9405791" cy="5141388"/>
+                <a:off x="685801" y="1066801"/>
+                <a:ext cx="9939190" cy="5141388"/>
               </a:xfrm>
             </p:spPr>
             <p:txBody>
@@ -8099,19 +8124,19 @@
               <a:lstStyle/>
               <a:p>
                 <a:r>
-                  <a:rPr lang="en-US" sz="2200" dirty="0">
+                  <a:rPr lang="en-US" sz="2400" dirty="0">
                     <a:cs typeface="Times New Roman" panose="02020603050405020304" pitchFamily="18" charset="0"/>
                   </a:rPr>
                   <a:t>Synthetic Ohio is generated from </a:t>
                 </a:r>
                 <a:r>
-                  <a:rPr lang="en-US" sz="2200" b="1" dirty="0">
+                  <a:rPr lang="en-US" sz="2400" b="1" dirty="0">
                     <a:cs typeface="Times New Roman" panose="02020603050405020304" pitchFamily="18" charset="0"/>
                   </a:rPr>
                   <a:t>a convex hull </a:t>
                 </a:r>
                 <a:r>
-                  <a:rPr lang="en-US" sz="2200" dirty="0">
+                  <a:rPr lang="en-US" sz="2400" dirty="0">
                     <a:cs typeface="Times New Roman" panose="02020603050405020304" pitchFamily="18" charset="0"/>
                   </a:rPr>
                   <a:t>of control states</a:t>
@@ -8120,7 +8145,7 @@
               <a:p>
                 <a:pPr lvl="1"/>
                 <a:r>
-                  <a:rPr lang="en-US" sz="2000" dirty="0">
+                  <a:rPr lang="en-US" sz="2400" dirty="0">
                     <a:cs typeface="Times New Roman" panose="02020603050405020304" pitchFamily="18" charset="0"/>
                   </a:rPr>
                   <a:t>Requires some amount of comparability (can’t compare OH to Mars)</a:t>
@@ -8128,7 +8153,7 @@
               </a:p>
               <a:p>
                 <a:r>
-                  <a:rPr lang="en-US" sz="2200" dirty="0">
+                  <a:rPr lang="en-US" sz="2400" dirty="0">
                     <a:cs typeface="Times New Roman" panose="02020603050405020304" pitchFamily="18" charset="0"/>
                   </a:rPr>
                   <a:t>Goal of model: choose weights </a:t>
@@ -8138,7 +8163,7 @@
                     <m:sSub>
                       <m:sSubPr>
                         <m:ctrlPr>
-                          <a:rPr lang="en-US" sz="2200" b="0" i="1" smtClean="0">
+                          <a:rPr lang="en-US" sz="2400" b="0" i="1" smtClean="0">
                             <a:latin typeface="Cambria Math" panose="02040503050406030204" pitchFamily="18" charset="0"/>
                             <a:cs typeface="Times New Roman" panose="02020603050405020304" pitchFamily="18" charset="0"/>
                           </a:rPr>
@@ -8150,7 +8175,7 @@
                             <m:begChr m:val="{"/>
                             <m:endChr m:val="}"/>
                             <m:ctrlPr>
-                              <a:rPr lang="en-US" sz="2200" b="0" i="1" smtClean="0">
+                              <a:rPr lang="en-US" sz="2400" b="0" i="1" smtClean="0">
                                 <a:latin typeface="Cambria Math" panose="02040503050406030204" pitchFamily="18" charset="0"/>
                                 <a:cs typeface="Times New Roman" panose="02020603050405020304" pitchFamily="18" charset="0"/>
                               </a:rPr>
@@ -8160,7 +8185,7 @@
                             <m:sSub>
                               <m:sSubPr>
                                 <m:ctrlPr>
-                                  <a:rPr lang="en-US" sz="2200" b="0" i="1" smtClean="0">
+                                  <a:rPr lang="en-US" sz="2400" b="0" i="1" smtClean="0">
                                     <a:latin typeface="Cambria Math" panose="02040503050406030204" pitchFamily="18" charset="0"/>
                                     <a:cs typeface="Times New Roman" panose="02020603050405020304" pitchFamily="18" charset="0"/>
                                   </a:rPr>
@@ -8168,7 +8193,7 @@
                               </m:sSubPr>
                               <m:e>
                                 <m:r>
-                                  <a:rPr lang="en-US" sz="2200" b="0" i="1" smtClean="0">
+                                  <a:rPr lang="en-US" sz="2400" b="0" i="1" smtClean="0">
                                     <a:latin typeface="Cambria Math" panose="02040503050406030204" pitchFamily="18" charset="0"/>
                                     <a:cs typeface="Times New Roman" panose="02020603050405020304" pitchFamily="18" charset="0"/>
                                   </a:rPr>
@@ -8177,7 +8202,7 @@
                               </m:e>
                               <m:sub>
                                 <m:r>
-                                  <a:rPr lang="en-US" sz="2200" b="0" i="1" smtClean="0">
+                                  <a:rPr lang="en-US" sz="2400" b="0" i="1" smtClean="0">
                                     <a:latin typeface="Cambria Math" panose="02040503050406030204" pitchFamily="18" charset="0"/>
                                     <a:cs typeface="Times New Roman" panose="02020603050405020304" pitchFamily="18" charset="0"/>
                                   </a:rPr>
@@ -8190,21 +8215,21 @@
                       </m:e>
                       <m:sub>
                         <m:r>
-                          <a:rPr lang="en-US" sz="2200" b="0" i="1" smtClean="0">
+                          <a:rPr lang="en-US" sz="2400" b="0" i="1" smtClean="0">
                             <a:latin typeface="Cambria Math" panose="02040503050406030204" pitchFamily="18" charset="0"/>
                             <a:cs typeface="Times New Roman" panose="02020603050405020304" pitchFamily="18" charset="0"/>
                           </a:rPr>
                           <m:t>𝑗</m:t>
                         </m:r>
                         <m:r>
-                          <a:rPr lang="en-US" sz="2200" b="0" i="1" smtClean="0">
+                          <a:rPr lang="en-US" sz="2400" b="0" i="1" smtClean="0">
                             <a:latin typeface="Cambria Math" panose="02040503050406030204" pitchFamily="18" charset="0"/>
                             <a:cs typeface="Times New Roman" panose="02020603050405020304" pitchFamily="18" charset="0"/>
                           </a:rPr>
                           <m:t>∈</m:t>
                         </m:r>
                         <m:r>
-                          <a:rPr lang="en-US" sz="2200" b="0" i="1" smtClean="0">
+                          <a:rPr lang="en-US" sz="2400" b="0" i="1" smtClean="0">
                             <a:latin typeface="Cambria Math" panose="02040503050406030204" pitchFamily="18" charset="0"/>
                             <a:cs typeface="Times New Roman" panose="02020603050405020304" pitchFamily="18" charset="0"/>
                           </a:rPr>
@@ -8215,7 +8240,7 @@
                   </m:oMath>
                 </a14:m>
                 <a:r>
-                  <a:rPr lang="en-US" sz="2200" dirty="0">
+                  <a:rPr lang="en-US" sz="2400" dirty="0">
                     <a:cs typeface="Times New Roman" panose="02020603050405020304" pitchFamily="18" charset="0"/>
                   </a:rPr>
                   <a:t>for comparison states/variables</a:t>
@@ -8234,7 +8259,7 @@
                       <m:func>
                         <m:funcPr>
                           <m:ctrlPr>
-                            <a:rPr lang="en-US" sz="2200" b="0" i="1" smtClean="0">
+                            <a:rPr lang="en-US" sz="2400" b="0" i="1" smtClean="0">
                               <a:latin typeface="Cambria Math" panose="02040503050406030204" pitchFamily="18" charset="0"/>
                               <a:cs typeface="Times New Roman" panose="02020603050405020304" pitchFamily="18" charset="0"/>
                             </a:rPr>
@@ -8244,7 +8269,7 @@
                           <m:sSubSup>
                             <m:sSubSupPr>
                               <m:ctrlPr>
-                                <a:rPr lang="en-US" sz="2200" b="0" i="0" smtClean="0">
+                                <a:rPr lang="en-US" sz="2400" b="0" i="1" smtClean="0">
                                   <a:latin typeface="Cambria Math" panose="02040503050406030204" pitchFamily="18" charset="0"/>
                                   <a:cs typeface="Times New Roman" panose="02020603050405020304" pitchFamily="18" charset="0"/>
                                 </a:rPr>
@@ -8255,7 +8280,7 @@
                                 <m:rPr>
                                   <m:sty m:val="p"/>
                                 </m:rPr>
-                                <a:rPr lang="en-US" sz="2200" b="0" i="0" smtClean="0">
+                                <a:rPr lang="en-US" sz="2400" b="0" i="0" smtClean="0">
                                   <a:latin typeface="Cambria Math" panose="02040503050406030204" pitchFamily="18" charset="0"/>
                                   <a:cs typeface="Times New Roman" panose="02020603050405020304" pitchFamily="18" charset="0"/>
                                 </a:rPr>
@@ -8267,7 +8292,7 @@
                                 <m:rPr>
                                   <m:sty m:val="p"/>
                                 </m:rPr>
-                                <a:rPr lang="en-US" sz="2200" b="0" i="0" smtClean="0">
+                                <a:rPr lang="en-US" sz="2400" b="0" i="0" smtClean="0">
                                   <a:latin typeface="Cambria Math" panose="02040503050406030204" pitchFamily="18" charset="0"/>
                                   <a:cs typeface="Times New Roman" panose="02020603050405020304" pitchFamily="18" charset="0"/>
                                 </a:rPr>
@@ -8276,7 +8301,7 @@
                             </m:sub>
                             <m:sup>
                               <m:r>
-                                <a:rPr lang="en-US" sz="2200" b="0" i="0" smtClean="0">
+                                <a:rPr lang="en-US" sz="2400" b="0" i="0" smtClean="0">
                                   <a:latin typeface="Cambria Math" panose="02040503050406030204" pitchFamily="18" charset="0"/>
                                   <a:cs typeface="Times New Roman" panose="02020603050405020304" pitchFamily="18" charset="0"/>
                                 </a:rPr>
@@ -8285,7 +8310,7 @@
                             </m:sup>
                           </m:sSubSup>
                           <m:r>
-                            <a:rPr lang="en-US" sz="2200" b="0" i="0" smtClean="0">
+                            <a:rPr lang="en-US" sz="2400" b="0" i="0" smtClean="0">
                               <a:latin typeface="Cambria Math" panose="02040503050406030204" pitchFamily="18" charset="0"/>
                               <a:cs typeface="Times New Roman" panose="02020603050405020304" pitchFamily="18" charset="0"/>
                             </a:rPr>
@@ -8295,7 +8320,7 @@
                             <m:rPr>
                               <m:sty m:val="p"/>
                             </m:rPr>
-                            <a:rPr lang="en-US" sz="2200" b="0" i="0" smtClean="0">
+                            <a:rPr lang="en-US" sz="2400" b="0" i="0" smtClean="0">
                               <a:latin typeface="Cambria Math" panose="02040503050406030204" pitchFamily="18" charset="0"/>
                               <a:cs typeface="Times New Roman" panose="02020603050405020304" pitchFamily="18" charset="0"/>
                             </a:rPr>
@@ -8308,7 +8333,7 @@
                               <m:begChr m:val="|"/>
                               <m:endChr m:val="|"/>
                               <m:ctrlPr>
-                                <a:rPr lang="en-US" sz="2200" b="0" i="1" smtClean="0">
+                                <a:rPr lang="en-US" sz="2400" b="0" i="1" smtClean="0">
                                   <a:latin typeface="Cambria Math" panose="02040503050406030204" pitchFamily="18" charset="0"/>
                                   <a:cs typeface="Times New Roman" panose="02020603050405020304" pitchFamily="18" charset="0"/>
                                 </a:rPr>
@@ -8320,7 +8345,7 @@
                                   <m:begChr m:val="|"/>
                                   <m:endChr m:val="|"/>
                                   <m:ctrlPr>
-                                    <a:rPr lang="en-US" sz="2200" b="0" i="1" smtClean="0">
+                                    <a:rPr lang="en-US" sz="2400" b="0" i="1" smtClean="0">
                                       <a:latin typeface="Cambria Math" panose="02040503050406030204" pitchFamily="18" charset="0"/>
                                       <a:cs typeface="Times New Roman" panose="02020603050405020304" pitchFamily="18" charset="0"/>
                                     </a:rPr>
@@ -8330,7 +8355,7 @@
                                   <m:sSub>
                                     <m:sSubPr>
                                       <m:ctrlPr>
-                                        <a:rPr lang="en-US" sz="2200" b="0" i="1" smtClean="0">
+                                        <a:rPr lang="en-US" sz="2400" b="0" i="1" smtClean="0">
                                           <a:latin typeface="Cambria Math" panose="02040503050406030204" pitchFamily="18" charset="0"/>
                                           <a:cs typeface="Times New Roman" panose="02020603050405020304" pitchFamily="18" charset="0"/>
                                         </a:rPr>
@@ -8338,7 +8363,7 @@
                                     </m:sSubPr>
                                     <m:e>
                                       <m:r>
-                                        <a:rPr lang="en-US" sz="2200" b="0" i="1" smtClean="0">
+                                        <a:rPr lang="en-US" sz="2400" b="0" i="1" smtClean="0">
                                           <a:latin typeface="Cambria Math" panose="02040503050406030204" pitchFamily="18" charset="0"/>
                                           <a:cs typeface="Times New Roman" panose="02020603050405020304" pitchFamily="18" charset="0"/>
                                         </a:rPr>
@@ -8347,7 +8372,7 @@
                                     </m:e>
                                     <m:sub>
                                       <m:r>
-                                        <a:rPr lang="en-US" sz="2200" b="0" i="1" smtClean="0">
+                                        <a:rPr lang="en-US" sz="2400" b="0" i="1" smtClean="0">
                                           <a:latin typeface="Cambria Math" panose="02040503050406030204" pitchFamily="18" charset="0"/>
                                           <a:cs typeface="Times New Roman" panose="02020603050405020304" pitchFamily="18" charset="0"/>
                                         </a:rPr>
@@ -8356,7 +8381,7 @@
                                     </m:sub>
                                   </m:sSub>
                                   <m:r>
-                                    <a:rPr lang="en-US" sz="2200" b="0" i="1" smtClean="0">
+                                    <a:rPr lang="en-US" sz="2400" b="0" i="1" smtClean="0">
                                       <a:latin typeface="Cambria Math" panose="02040503050406030204" pitchFamily="18" charset="0"/>
                                       <a:cs typeface="Times New Roman" panose="02020603050405020304" pitchFamily="18" charset="0"/>
                                     </a:rPr>
@@ -8365,7 +8390,7 @@
                                   <m:sSub>
                                     <m:sSubPr>
                                       <m:ctrlPr>
-                                        <a:rPr lang="en-US" sz="2200" b="0" i="1" smtClean="0">
+                                        <a:rPr lang="en-US" sz="2400" b="0" i="1" smtClean="0">
                                           <a:latin typeface="Cambria Math" panose="02040503050406030204" pitchFamily="18" charset="0"/>
                                           <a:cs typeface="Times New Roman" panose="02020603050405020304" pitchFamily="18" charset="0"/>
                                         </a:rPr>
@@ -8373,7 +8398,7 @@
                                     </m:sSubPr>
                                     <m:e>
                                       <m:r>
-                                        <a:rPr lang="en-US" sz="2200" b="0" i="1" smtClean="0">
+                                        <a:rPr lang="en-US" sz="2400" b="0" i="1" smtClean="0">
                                           <a:latin typeface="Cambria Math" panose="02040503050406030204" pitchFamily="18" charset="0"/>
                                           <a:cs typeface="Times New Roman" panose="02020603050405020304" pitchFamily="18" charset="0"/>
                                         </a:rPr>
@@ -8382,7 +8407,7 @@
                                     </m:e>
                                     <m:sub>
                                       <m:r>
-                                        <a:rPr lang="en-US" sz="2200" b="0" i="1" smtClean="0">
+                                        <a:rPr lang="en-US" sz="2400" b="0" i="1" smtClean="0">
                                           <a:latin typeface="Cambria Math" panose="02040503050406030204" pitchFamily="18" charset="0"/>
                                           <a:cs typeface="Times New Roman" panose="02020603050405020304" pitchFamily="18" charset="0"/>
                                         </a:rPr>
@@ -8391,7 +8416,7 @@
                                     </m:sub>
                                   </m:sSub>
                                   <m:r>
-                                    <a:rPr lang="en-US" sz="2200" b="0" i="1" smtClean="0">
+                                    <a:rPr lang="en-US" sz="2400" b="0" i="1" smtClean="0">
                                       <a:latin typeface="Cambria Math" panose="02040503050406030204" pitchFamily="18" charset="0"/>
                                       <a:cs typeface="Times New Roman" panose="02020603050405020304" pitchFamily="18" charset="0"/>
                                     </a:rPr>
@@ -8404,7 +8429,7 @@
                         </m:e>
                       </m:func>
                       <m:r>
-                        <a:rPr lang="en-US" sz="2200" b="0" i="0" smtClean="0">
+                        <a:rPr lang="en-US" sz="2400" b="0" i="0" smtClean="0">
                           <a:latin typeface="Cambria Math" panose="02040503050406030204" pitchFamily="18" charset="0"/>
                           <a:cs typeface="Times New Roman" panose="02020603050405020304" pitchFamily="18" charset="0"/>
                         </a:rPr>
@@ -8414,14 +8439,14 @@
                         <m:rPr>
                           <m:sty m:val="p"/>
                         </m:rPr>
-                        <a:rPr lang="en-US" sz="2200" b="0" i="0" smtClean="0">
+                        <a:rPr lang="en-US" sz="2400" b="0" i="0" smtClean="0">
                           <a:latin typeface="Cambria Math" panose="02040503050406030204" pitchFamily="18" charset="0"/>
                           <a:cs typeface="Times New Roman" panose="02020603050405020304" pitchFamily="18" charset="0"/>
                         </a:rPr>
                         <m:t>s</m:t>
                       </m:r>
                       <m:r>
-                        <a:rPr lang="en-US" sz="2200" b="0" i="0" smtClean="0">
+                        <a:rPr lang="en-US" sz="2400" b="0" i="0" smtClean="0">
                           <a:latin typeface="Cambria Math" panose="02040503050406030204" pitchFamily="18" charset="0"/>
                           <a:cs typeface="Times New Roman" panose="02020603050405020304" pitchFamily="18" charset="0"/>
                         </a:rPr>
@@ -8431,14 +8456,14 @@
                         <m:rPr>
                           <m:sty m:val="p"/>
                         </m:rPr>
-                        <a:rPr lang="en-US" sz="2200" b="0" i="0" smtClean="0">
+                        <a:rPr lang="en-US" sz="2400" b="0" i="0" smtClean="0">
                           <a:latin typeface="Cambria Math" panose="02040503050406030204" pitchFamily="18" charset="0"/>
                           <a:cs typeface="Times New Roman" panose="02020603050405020304" pitchFamily="18" charset="0"/>
                         </a:rPr>
                         <m:t>t</m:t>
                       </m:r>
                       <m:r>
-                        <a:rPr lang="en-US" sz="2200" b="0" i="0" smtClean="0">
+                        <a:rPr lang="en-US" sz="2400" b="0" i="0" smtClean="0">
                           <a:latin typeface="Cambria Math" panose="02040503050406030204" pitchFamily="18" charset="0"/>
                           <a:cs typeface="Times New Roman" panose="02020603050405020304" pitchFamily="18" charset="0"/>
                         </a:rPr>
@@ -8447,7 +8472,7 @@
                       <m:sSub>
                         <m:sSubPr>
                           <m:ctrlPr>
-                            <a:rPr lang="en-US" sz="2200" b="0" i="0" smtClean="0">
+                            <a:rPr lang="en-US" sz="2400" b="0" i="1" smtClean="0">
                               <a:latin typeface="Cambria Math" panose="02040503050406030204" pitchFamily="18" charset="0"/>
                               <a:cs typeface="Times New Roman" panose="02020603050405020304" pitchFamily="18" charset="0"/>
                             </a:rPr>
@@ -8458,7 +8483,7 @@
                             <m:rPr>
                               <m:sty m:val="p"/>
                             </m:rPr>
-                            <a:rPr lang="en-US" sz="2200" b="0" i="0" smtClean="0">
+                            <a:rPr lang="en-US" sz="2400" b="0" i="0" smtClean="0">
                               <a:latin typeface="Cambria Math" panose="02040503050406030204" pitchFamily="18" charset="0"/>
                               <a:cs typeface="Times New Roman" panose="02020603050405020304" pitchFamily="18" charset="0"/>
                             </a:rPr>
@@ -8470,7 +8495,7 @@
                             <m:rPr>
                               <m:sty m:val="p"/>
                             </m:rPr>
-                            <a:rPr lang="en-US" sz="2200" b="0" i="0" smtClean="0">
+                            <a:rPr lang="en-US" sz="2400" b="0" i="0" smtClean="0">
                               <a:latin typeface="Cambria Math" panose="02040503050406030204" pitchFamily="18" charset="0"/>
                               <a:cs typeface="Times New Roman" panose="02020603050405020304" pitchFamily="18" charset="0"/>
                             </a:rPr>
@@ -8479,7 +8504,7 @@
                         </m:sub>
                       </m:sSub>
                       <m:r>
-                        <a:rPr lang="en-US" sz="2200" b="0" i="1" smtClean="0">
+                        <a:rPr lang="en-US" sz="2400" b="0" i="1" smtClean="0">
                           <a:latin typeface="Cambria Math" panose="02040503050406030204" pitchFamily="18" charset="0"/>
                           <a:cs typeface="Times New Roman" panose="02020603050405020304" pitchFamily="18" charset="0"/>
                         </a:rPr>
@@ -8490,7 +8515,7 @@
                           <m:chr m:val="∑"/>
                           <m:supHide m:val="on"/>
                           <m:ctrlPr>
-                            <a:rPr lang="en-US" sz="2200" b="0" i="1" smtClean="0">
+                            <a:rPr lang="en-US" sz="2400" b="0" i="1" smtClean="0">
                               <a:latin typeface="Cambria Math" panose="02040503050406030204" pitchFamily="18" charset="0"/>
                               <a:cs typeface="Times New Roman" panose="02020603050405020304" pitchFamily="18" charset="0"/>
                             </a:rPr>
@@ -8498,7 +8523,7 @@
                         </m:naryPr>
                         <m:sub>
                           <m:r>
-                            <a:rPr lang="en-US" sz="2200" b="0" i="1" smtClean="0">
+                            <a:rPr lang="en-US" sz="2400" b="0" i="1" smtClean="0">
                               <a:latin typeface="Cambria Math" panose="02040503050406030204" pitchFamily="18" charset="0"/>
                               <a:cs typeface="Times New Roman" panose="02020603050405020304" pitchFamily="18" charset="0"/>
                             </a:rPr>
@@ -8510,7 +8535,7 @@
                           <m:sSub>
                             <m:sSubPr>
                               <m:ctrlPr>
-                                <a:rPr lang="en-US" sz="2200" b="0" i="1" smtClean="0">
+                                <a:rPr lang="en-US" sz="2400" b="0" i="1" smtClean="0">
                                   <a:latin typeface="Cambria Math" panose="02040503050406030204" pitchFamily="18" charset="0"/>
                                   <a:cs typeface="Times New Roman" panose="02020603050405020304" pitchFamily="18" charset="0"/>
                                 </a:rPr>
@@ -8518,7 +8543,7 @@
                             </m:sSubPr>
                             <m:e>
                               <m:r>
-                                <a:rPr lang="en-US" sz="2200" b="0" i="1" smtClean="0">
+                                <a:rPr lang="en-US" sz="2400" b="0" i="1" smtClean="0">
                                   <a:latin typeface="Cambria Math" panose="02040503050406030204" pitchFamily="18" charset="0"/>
                                   <a:cs typeface="Times New Roman" panose="02020603050405020304" pitchFamily="18" charset="0"/>
                                 </a:rPr>
@@ -8527,7 +8552,7 @@
                             </m:e>
                             <m:sub>
                               <m:r>
-                                <a:rPr lang="en-US" sz="2200" b="0" i="1" smtClean="0">
+                                <a:rPr lang="en-US" sz="2400" b="0" i="1" smtClean="0">
                                   <a:latin typeface="Cambria Math" panose="02040503050406030204" pitchFamily="18" charset="0"/>
                                   <a:cs typeface="Times New Roman" panose="02020603050405020304" pitchFamily="18" charset="0"/>
                                 </a:rPr>
@@ -8536,7 +8561,7 @@
                             </m:sub>
                           </m:sSub>
                           <m:r>
-                            <a:rPr lang="en-US" sz="2200" b="0" i="1" smtClean="0">
+                            <a:rPr lang="en-US" sz="2400" b="0" i="1" smtClean="0">
                               <a:latin typeface="Cambria Math" panose="02040503050406030204" pitchFamily="18" charset="0"/>
                               <a:cs typeface="Times New Roman" panose="02020603050405020304" pitchFamily="18" charset="0"/>
                             </a:rPr>
@@ -8547,13 +8572,13 @@
                     </m:oMath>
                   </m:oMathPara>
                 </a14:m>
-                <a:endParaRPr lang="en-US" sz="2200" dirty="0">
+                <a:endParaRPr lang="en-US" sz="2400" dirty="0">
                   <a:cs typeface="Times New Roman" panose="02020603050405020304" pitchFamily="18" charset="0"/>
                 </a:endParaRPr>
               </a:p>
               <a:p>
                 <a:r>
-                  <a:rPr lang="en-US" sz="2200" dirty="0">
+                  <a:rPr lang="en-US" sz="2400" dirty="0">
                     <a:cs typeface="Times New Roman" panose="02020603050405020304" pitchFamily="18" charset="0"/>
                   </a:rPr>
                   <a:t>Then, model causal effect as </a:t>
@@ -8572,7 +8597,7 @@
                       <m:sSub>
                         <m:sSubPr>
                           <m:ctrlPr>
-                            <a:rPr lang="en-US" sz="2200" b="0" i="1" smtClean="0">
+                            <a:rPr lang="en-US" sz="2400" b="0" i="1" smtClean="0">
                               <a:latin typeface="Cambria Math" panose="02040503050406030204" pitchFamily="18" charset="0"/>
                               <a:cs typeface="Times New Roman" panose="02020603050405020304" pitchFamily="18" charset="0"/>
                             </a:rPr>
@@ -8580,7 +8605,7 @@
                         </m:sSubPr>
                         <m:e>
                           <m:r>
-                            <a:rPr lang="en-US" sz="2200" b="0" i="1" smtClean="0">
+                            <a:rPr lang="en-US" sz="2400" b="0" i="1" smtClean="0">
                               <a:latin typeface="Cambria Math" panose="02040503050406030204" pitchFamily="18" charset="0"/>
                               <a:cs typeface="Times New Roman" panose="02020603050405020304" pitchFamily="18" charset="0"/>
                             </a:rPr>
@@ -8589,14 +8614,14 @@
                         </m:e>
                         <m:sub>
                           <m:r>
-                            <a:rPr lang="en-US" sz="2200" b="0" i="1" smtClean="0">
+                            <a:rPr lang="en-US" sz="2400" b="0" i="1" smtClean="0">
                               <a:latin typeface="Cambria Math" panose="02040503050406030204" pitchFamily="18" charset="0"/>
                               <a:cs typeface="Times New Roman" panose="02020603050405020304" pitchFamily="18" charset="0"/>
                             </a:rPr>
                             <m:t>1</m:t>
                           </m:r>
                           <m:r>
-                            <a:rPr lang="en-US" sz="2200" b="0" i="1" smtClean="0">
+                            <a:rPr lang="en-US" sz="2400" b="0" i="1" smtClean="0">
                               <a:latin typeface="Cambria Math" panose="02040503050406030204" pitchFamily="18" charset="0"/>
                               <a:cs typeface="Times New Roman" panose="02020603050405020304" pitchFamily="18" charset="0"/>
                             </a:rPr>
@@ -8605,7 +8630,7 @@
                         </m:sub>
                       </m:sSub>
                       <m:r>
-                        <a:rPr lang="en-US" sz="2200" b="0" i="1" smtClean="0">
+                        <a:rPr lang="en-US" sz="2400" b="0" i="1" smtClean="0">
                           <a:latin typeface="Cambria Math" panose="02040503050406030204" pitchFamily="18" charset="0"/>
                           <a:cs typeface="Times New Roman" panose="02020603050405020304" pitchFamily="18" charset="0"/>
                         </a:rPr>
@@ -8616,7 +8641,7 @@
                           <m:chr m:val="∑"/>
                           <m:supHide m:val="on"/>
                           <m:ctrlPr>
-                            <a:rPr lang="en-US" sz="2200" b="0" i="1" smtClean="0">
+                            <a:rPr lang="en-US" sz="2400" b="0" i="1" smtClean="0">
                               <a:latin typeface="Cambria Math" panose="02040503050406030204" pitchFamily="18" charset="0"/>
                               <a:cs typeface="Times New Roman" panose="02020603050405020304" pitchFamily="18" charset="0"/>
                             </a:rPr>
@@ -8624,7 +8649,7 @@
                         </m:naryPr>
                         <m:sub>
                           <m:r>
-                            <a:rPr lang="en-US" sz="2200" b="0" i="1" smtClean="0">
+                            <a:rPr lang="en-US" sz="2400" b="0" i="1" smtClean="0">
                               <a:latin typeface="Cambria Math" panose="02040503050406030204" pitchFamily="18" charset="0"/>
                               <a:cs typeface="Times New Roman" panose="02020603050405020304" pitchFamily="18" charset="0"/>
                             </a:rPr>
@@ -8636,7 +8661,7 @@
                           <m:sSub>
                             <m:sSubPr>
                               <m:ctrlPr>
-                                <a:rPr lang="en-US" sz="2200" b="0" i="1" smtClean="0">
+                                <a:rPr lang="en-US" sz="2400" b="0" i="1" smtClean="0">
                                   <a:latin typeface="Cambria Math" panose="02040503050406030204" pitchFamily="18" charset="0"/>
                                   <a:cs typeface="Times New Roman" panose="02020603050405020304" pitchFamily="18" charset="0"/>
                                 </a:rPr>
@@ -8644,7 +8669,7 @@
                             </m:sSubPr>
                             <m:e>
                               <m:r>
-                                <a:rPr lang="en-US" sz="2200" b="0" i="1" smtClean="0">
+                                <a:rPr lang="en-US" sz="2400" b="0" i="1" smtClean="0">
                                   <a:latin typeface="Cambria Math" panose="02040503050406030204" pitchFamily="18" charset="0"/>
                                   <a:cs typeface="Times New Roman" panose="02020603050405020304" pitchFamily="18" charset="0"/>
                                 </a:rPr>
@@ -8653,7 +8678,7 @@
                             </m:e>
                             <m:sub>
                               <m:r>
-                                <a:rPr lang="en-US" sz="2200" b="0" i="1" smtClean="0">
+                                <a:rPr lang="en-US" sz="2400" b="0" i="1" smtClean="0">
                                   <a:latin typeface="Cambria Math" panose="02040503050406030204" pitchFamily="18" charset="0"/>
                                   <a:cs typeface="Times New Roman" panose="02020603050405020304" pitchFamily="18" charset="0"/>
                                 </a:rPr>
@@ -8664,7 +8689,7 @@
                           <m:sSub>
                             <m:sSubPr>
                               <m:ctrlPr>
-                                <a:rPr lang="en-US" sz="2200" b="0" i="1" smtClean="0">
+                                <a:rPr lang="en-US" sz="2400" b="0" i="1" smtClean="0">
                                   <a:latin typeface="Cambria Math" panose="02040503050406030204" pitchFamily="18" charset="0"/>
                                   <a:cs typeface="Times New Roman" panose="02020603050405020304" pitchFamily="18" charset="0"/>
                                 </a:rPr>
@@ -8672,7 +8697,7 @@
                             </m:sSubPr>
                             <m:e>
                               <m:r>
-                                <a:rPr lang="en-US" sz="2200" b="0" i="1" smtClean="0">
+                                <a:rPr lang="en-US" sz="2400" b="0" i="1" smtClean="0">
                                   <a:latin typeface="Cambria Math" panose="02040503050406030204" pitchFamily="18" charset="0"/>
                                   <a:cs typeface="Times New Roman" panose="02020603050405020304" pitchFamily="18" charset="0"/>
                                 </a:rPr>
@@ -8681,7 +8706,7 @@
                             </m:e>
                             <m:sub>
                               <m:r>
-                                <a:rPr lang="en-US" sz="2200" b="0" i="1" smtClean="0">
+                                <a:rPr lang="en-US" sz="2400" b="0" i="1" smtClean="0">
                                   <a:latin typeface="Cambria Math" panose="02040503050406030204" pitchFamily="18" charset="0"/>
                                   <a:cs typeface="Times New Roman" panose="02020603050405020304" pitchFamily="18" charset="0"/>
                                 </a:rPr>
@@ -8694,7 +8719,7 @@
                     </m:oMath>
                   </m:oMathPara>
                 </a14:m>
-                <a:endParaRPr lang="en-US" sz="2200" dirty="0">
+                <a:endParaRPr lang="en-US" sz="2400" dirty="0">
                   <a:cs typeface="Times New Roman" panose="02020603050405020304" pitchFamily="18" charset="0"/>
                 </a:endParaRPr>
               </a:p>
@@ -8703,7 +8728,7 @@
                   <a:buNone/>
                 </a:pPr>
                 <a:r>
-                  <a:rPr lang="en-US" sz="2200" dirty="0">
+                  <a:rPr lang="en-US" sz="2400" dirty="0">
                     <a:cs typeface="Times New Roman" panose="02020603050405020304" pitchFamily="18" charset="0"/>
                   </a:rPr>
                   <a:t>Based on weights</a:t>
@@ -8725,13 +8750,13 @@
             </p:nvSpPr>
             <p:spPr>
               <a:xfrm>
-                <a:off x="1219199" y="1066801"/>
-                <a:ext cx="9405791" cy="5141388"/>
+                <a:off x="685801" y="1066801"/>
+                <a:ext cx="9939190" cy="5141388"/>
               </a:xfrm>
               <a:blipFill>
                 <a:blip r:embed="rId3"/>
                 <a:stretch>
-                  <a:fillRect l="-843" t="-1068"/>
+                  <a:fillRect l="-982" t="-1305"/>
                 </a:stretch>
               </a:blipFill>
             </p:spPr>
@@ -9583,8 +9608,8 @@
         </p:nvSpPr>
         <p:spPr>
           <a:xfrm>
-            <a:off x="1219199" y="1066801"/>
-            <a:ext cx="9405791" cy="5141388"/>
+            <a:off x="609601" y="1066801"/>
+            <a:ext cx="10015390" cy="5141388"/>
           </a:xfrm>
         </p:spPr>
         <p:txBody>
@@ -9603,7 +9628,7 @@
           <a:p>
             <a:pPr lvl="1"/>
             <a:r>
-              <a:rPr lang="en-US" sz="2200" dirty="0">
+              <a:rPr lang="en-US" sz="2400" dirty="0">
                 <a:cs typeface="Times New Roman" panose="02020603050405020304" pitchFamily="18" charset="0"/>
               </a:rPr>
               <a:t>Where are the stars? </a:t>
@@ -9626,19 +9651,19 @@
           <a:p>
             <a:pPr lvl="1"/>
             <a:r>
-              <a:rPr lang="en-US" sz="2200" dirty="0">
+              <a:rPr lang="en-US" sz="2400" dirty="0">
                 <a:cs typeface="Times New Roman" panose="02020603050405020304" pitchFamily="18" charset="0"/>
               </a:rPr>
               <a:t>Relies heavily on </a:t>
             </a:r>
             <a:r>
-              <a:rPr lang="en-US" sz="2200" b="1" dirty="0">
+              <a:rPr lang="en-US" sz="2400" b="1" dirty="0">
                 <a:cs typeface="Times New Roman" panose="02020603050405020304" pitchFamily="18" charset="0"/>
               </a:rPr>
               <a:t>placebo tests</a:t>
             </a:r>
             <a:r>
-              <a:rPr lang="en-US" sz="2200" dirty="0">
+              <a:rPr lang="en-US" sz="2400" dirty="0">
                 <a:cs typeface="Times New Roman" panose="02020603050405020304" pitchFamily="18" charset="0"/>
               </a:rPr>
               <a:t> – how does my estimate change if I introduce sampling variation?</a:t>
@@ -9647,13 +9672,13 @@
           <a:p>
             <a:pPr lvl="1"/>
             <a:r>
-              <a:rPr lang="en-US" sz="2200" dirty="0">
+              <a:rPr lang="en-US" sz="2400" dirty="0">
                 <a:cs typeface="Times New Roman" panose="02020603050405020304" pitchFamily="18" charset="0"/>
               </a:rPr>
               <a:t>Also similar intuition to </a:t>
             </a:r>
             <a:r>
-              <a:rPr lang="en-US" sz="2200" b="1" dirty="0">
+              <a:rPr lang="en-US" sz="2400" b="1" dirty="0">
                 <a:cs typeface="Times New Roman" panose="02020603050405020304" pitchFamily="18" charset="0"/>
               </a:rPr>
               <a:t>bootstrapping</a:t>
@@ -9738,8 +9763,8 @@
         </p:nvSpPr>
         <p:spPr>
           <a:xfrm>
-            <a:off x="1219199" y="1066801"/>
-            <a:ext cx="9405791" cy="5141388"/>
+            <a:off x="609601" y="1107012"/>
+            <a:ext cx="10015390" cy="5141388"/>
           </a:xfrm>
         </p:spPr>
         <p:txBody>
@@ -9758,7 +9783,7 @@
           <a:p>
             <a:pPr lvl="1"/>
             <a:r>
-              <a:rPr lang="en-US" sz="2200" dirty="0">
+              <a:rPr lang="en-US" sz="2400" dirty="0">
                 <a:cs typeface="Times New Roman" panose="02020603050405020304" pitchFamily="18" charset="0"/>
               </a:rPr>
               <a:t>Where are the stars? </a:t>
@@ -9781,19 +9806,19 @@
           <a:p>
             <a:pPr lvl="1"/>
             <a:r>
-              <a:rPr lang="en-US" sz="2200" dirty="0">
+              <a:rPr lang="en-US" sz="2400" dirty="0">
                 <a:cs typeface="Times New Roman" panose="02020603050405020304" pitchFamily="18" charset="0"/>
               </a:rPr>
               <a:t>Relies heavily on </a:t>
             </a:r>
             <a:r>
-              <a:rPr lang="en-US" sz="2200" b="1" dirty="0">
+              <a:rPr lang="en-US" sz="2400" b="1" dirty="0">
                 <a:cs typeface="Times New Roman" panose="02020603050405020304" pitchFamily="18" charset="0"/>
               </a:rPr>
               <a:t>placebo tests</a:t>
             </a:r>
             <a:r>
-              <a:rPr lang="en-US" sz="2200" dirty="0">
+              <a:rPr lang="en-US" sz="2400" dirty="0">
                 <a:cs typeface="Times New Roman" panose="02020603050405020304" pitchFamily="18" charset="0"/>
               </a:rPr>
               <a:t> – how does my estimate change if I introduce sampling variation?</a:t>
@@ -9802,13 +9827,13 @@
           <a:p>
             <a:pPr lvl="1"/>
             <a:r>
-              <a:rPr lang="en-US" sz="2200" dirty="0">
+              <a:rPr lang="en-US" sz="2400" dirty="0">
                 <a:cs typeface="Times New Roman" panose="02020603050405020304" pitchFamily="18" charset="0"/>
               </a:rPr>
               <a:t>Also similar intuition to </a:t>
             </a:r>
             <a:r>
-              <a:rPr lang="en-US" sz="2200" b="1" dirty="0">
+              <a:rPr lang="en-US" sz="2400" b="1" dirty="0">
                 <a:cs typeface="Times New Roman" panose="02020603050405020304" pitchFamily="18" charset="0"/>
               </a:rPr>
               <a:t>bootstrapping</a:t>
@@ -9929,7 +9954,7 @@
         <p:spPr>
           <a:xfrm>
             <a:off x="1219199" y="1066801"/>
-            <a:ext cx="9405791" cy="5141388"/>
+            <a:ext cx="9906001" cy="5141388"/>
           </a:xfrm>
         </p:spPr>
         <p:txBody>
@@ -9939,19 +9964,19 @@
           <a:lstStyle/>
           <a:p>
             <a:r>
-              <a:rPr lang="en-US" sz="2200" dirty="0">
+              <a:rPr lang="en-US" sz="2400" dirty="0">
                 <a:cs typeface="Times New Roman" panose="02020603050405020304" pitchFamily="18" charset="0"/>
               </a:rPr>
               <a:t>Exploration of </a:t>
             </a:r>
             <a:r>
-              <a:rPr lang="en-US" sz="2200" b="1" dirty="0">
+              <a:rPr lang="en-US" sz="2400" b="1" dirty="0">
                 <a:cs typeface="Times New Roman" panose="02020603050405020304" pitchFamily="18" charset="0"/>
               </a:rPr>
               <a:t>quasi-experiments </a:t>
             </a:r>
             <a:r>
-              <a:rPr lang="en-US" sz="2200" dirty="0">
+              <a:rPr lang="en-US" sz="2400" dirty="0">
                 <a:cs typeface="Times New Roman" panose="02020603050405020304" pitchFamily="18" charset="0"/>
               </a:rPr>
               <a:t>to assess policy effects</a:t>
@@ -9960,7 +9985,7 @@
           <a:p>
             <a:pPr lvl="1"/>
             <a:r>
-              <a:rPr lang="en-US" sz="2000" dirty="0">
+              <a:rPr lang="en-US" sz="2400" dirty="0">
                 <a:cs typeface="Times New Roman" panose="02020603050405020304" pitchFamily="18" charset="0"/>
               </a:rPr>
               <a:t>Especially useful with decentralized policies and good data collection</a:t>
@@ -9968,19 +9993,19 @@
           </a:p>
           <a:p>
             <a:r>
-              <a:rPr lang="en-US" sz="2200" dirty="0">
+              <a:rPr lang="en-US" sz="2400" dirty="0">
                 <a:cs typeface="Times New Roman" panose="02020603050405020304" pitchFamily="18" charset="0"/>
               </a:rPr>
               <a:t>DID is a classic tool in the policy evaluation toolkit (possibly </a:t>
             </a:r>
             <a:r>
-              <a:rPr lang="en-US" sz="2200" i="1" dirty="0">
+              <a:rPr lang="en-US" sz="2400" i="1" dirty="0">
                 <a:cs typeface="Times New Roman" panose="02020603050405020304" pitchFamily="18" charset="0"/>
               </a:rPr>
               <a:t>the </a:t>
             </a:r>
             <a:r>
-              <a:rPr lang="en-US" sz="2200" dirty="0">
+              <a:rPr lang="en-US" sz="2400" dirty="0">
                 <a:cs typeface="Times New Roman" panose="02020603050405020304" pitchFamily="18" charset="0"/>
               </a:rPr>
               <a:t>tool)</a:t>
@@ -9988,7 +10013,7 @@
           </a:p>
           <a:p>
             <a:r>
-              <a:rPr lang="en-US" sz="2200" dirty="0">
+              <a:rPr lang="en-US" sz="2400" dirty="0">
                 <a:cs typeface="Times New Roman" panose="02020603050405020304" pitchFamily="18" charset="0"/>
               </a:rPr>
               <a:t>Its assumptions aren’t too strong: </a:t>
@@ -9997,7 +10022,7 @@
           <a:p>
             <a:pPr lvl="1"/>
             <a:r>
-              <a:rPr lang="en-US" sz="2200" dirty="0">
+              <a:rPr lang="en-US" sz="2400" dirty="0">
                 <a:cs typeface="Times New Roman" panose="02020603050405020304" pitchFamily="18" charset="0"/>
               </a:rPr>
               <a:t>Parallel trends</a:t>
@@ -10006,7 +10031,7 @@
           <a:p>
             <a:pPr lvl="1"/>
             <a:r>
-              <a:rPr lang="en-US" sz="2200" dirty="0">
+              <a:rPr lang="en-US" sz="2400" dirty="0">
                 <a:cs typeface="Times New Roman" panose="02020603050405020304" pitchFamily="18" charset="0"/>
               </a:rPr>
               <a:t>Homogeneous treatment effects (in at least one dimension) </a:t>
@@ -10014,10 +10039,10 @@
           </a:p>
           <a:p>
             <a:r>
-              <a:rPr lang="en-US" sz="2200" dirty="0">
-                <a:cs typeface="Times New Roman" panose="02020603050405020304" pitchFamily="18" charset="0"/>
-              </a:rPr>
-              <a:t>Can puts lots of bells and whistles on it, but need to be careful about contamination across multiple specifications. </a:t>
+              <a:rPr lang="en-US" sz="2400" dirty="0">
+                <a:cs typeface="Times New Roman" panose="02020603050405020304" pitchFamily="18" charset="0"/>
+              </a:rPr>
+              <a:t>Can puts lots of bells and whistles on it but need to be careful about contamination across multiple specifications. </a:t>
             </a:r>
           </a:p>
           <a:p>
@@ -10039,19 +10064,19 @@
           <a:p>
             <a:pPr lvl="1"/>
             <a:r>
-              <a:rPr lang="en-US" sz="2200" dirty="0">
+              <a:rPr lang="en-US" sz="2400" dirty="0">
                 <a:cs typeface="Times New Roman" panose="02020603050405020304" pitchFamily="18" charset="0"/>
               </a:rPr>
               <a:t>Can we build our own control group? (</a:t>
             </a:r>
             <a:r>
-              <a:rPr lang="en-US" sz="2200" b="1" dirty="0">
+              <a:rPr lang="en-US" sz="2400" b="1" dirty="0">
                 <a:cs typeface="Times New Roman" panose="02020603050405020304" pitchFamily="18" charset="0"/>
               </a:rPr>
               <a:t>Synthetic controls</a:t>
             </a:r>
             <a:r>
-              <a:rPr lang="en-US" sz="2200" dirty="0">
+              <a:rPr lang="en-US" sz="2400" dirty="0">
                 <a:cs typeface="Times New Roman" panose="02020603050405020304" pitchFamily="18" charset="0"/>
               </a:rPr>
               <a:t>)</a:t>
@@ -10060,19 +10085,19 @@
           <a:p>
             <a:pPr lvl="1"/>
             <a:r>
-              <a:rPr lang="en-US" sz="2200" dirty="0">
-                <a:cs typeface="Times New Roman" panose="02020603050405020304" pitchFamily="18" charset="0"/>
-              </a:rPr>
-              <a:t>Can we get a handle on heterogeneous treatment effects? (</a:t>
-            </a:r>
-            <a:r>
-              <a:rPr lang="en-US" sz="2200" b="1" dirty="0">
+              <a:rPr lang="en-US" sz="2400" dirty="0">
+                <a:cs typeface="Times New Roman" panose="02020603050405020304" pitchFamily="18" charset="0"/>
+              </a:rPr>
+              <a:t>Can we recover heterogeneous treatment effects? (</a:t>
+            </a:r>
+            <a:r>
+              <a:rPr lang="en-US" sz="2400" b="1" dirty="0">
                 <a:cs typeface="Times New Roman" panose="02020603050405020304" pitchFamily="18" charset="0"/>
               </a:rPr>
               <a:t>Quantile regression</a:t>
             </a:r>
             <a:r>
-              <a:rPr lang="en-US" sz="2200" dirty="0">
+              <a:rPr lang="en-US" sz="2400" dirty="0">
                 <a:cs typeface="Times New Roman" panose="02020603050405020304" pitchFamily="18" charset="0"/>
               </a:rPr>
               <a:t>)</a:t>
@@ -11096,8 +11121,8 @@
           </a:p>
         </p:txBody>
       </p:sp>
-      <mc:AlternateContent xmlns:mc="http://schemas.openxmlformats.org/markup-compatibility/2006">
-        <mc:Choice xmlns:a14="http://schemas.microsoft.com/office/drawing/2010/main" Requires="a14">
+      <mc:AlternateContent xmlns:mc="http://schemas.openxmlformats.org/markup-compatibility/2006" xmlns:a14="http://schemas.microsoft.com/office/drawing/2010/main">
+        <mc:Choice Requires="a14">
           <p:sp>
             <p:nvSpPr>
               <p:cNvPr id="3" name="Content Placeholder 2"/>
@@ -11419,7 +11444,7 @@
             </p:txBody>
           </p:sp>
         </mc:Choice>
-        <mc:Fallback>
+        <mc:Fallback xmlns="">
           <p:sp>
             <p:nvSpPr>
               <p:cNvPr id="3" name="Content Placeholder 2"/>
@@ -11522,8 +11547,8 @@
           </a:p>
         </p:txBody>
       </p:sp>
-      <mc:AlternateContent xmlns:mc="http://schemas.openxmlformats.org/markup-compatibility/2006">
-        <mc:Choice xmlns:a14="http://schemas.microsoft.com/office/drawing/2010/main" Requires="a14">
+      <mc:AlternateContent xmlns:mc="http://schemas.openxmlformats.org/markup-compatibility/2006" xmlns:a14="http://schemas.microsoft.com/office/drawing/2010/main">
+        <mc:Choice Requires="a14">
           <p:sp>
             <p:nvSpPr>
               <p:cNvPr id="3" name="Content Placeholder 2"/>
@@ -11770,7 +11795,7 @@
             </p:txBody>
           </p:sp>
         </mc:Choice>
-        <mc:Fallback>
+        <mc:Fallback xmlns="">
           <p:sp>
             <p:nvSpPr>
               <p:cNvPr id="3" name="Content Placeholder 2"/>
@@ -11903,8 +11928,8 @@
           </a:p>
         </p:txBody>
       </p:sp>
-      <mc:AlternateContent xmlns:mc="http://schemas.openxmlformats.org/markup-compatibility/2006">
-        <mc:Choice xmlns:a14="http://schemas.microsoft.com/office/drawing/2010/main" Requires="a14">
+      <mc:AlternateContent xmlns:mc="http://schemas.openxmlformats.org/markup-compatibility/2006" xmlns:a14="http://schemas.microsoft.com/office/drawing/2010/main">
+        <mc:Choice Requires="a14">
           <p:sp>
             <p:nvSpPr>
               <p:cNvPr id="3" name="Content Placeholder 2"/>
@@ -12176,7 +12201,7 @@
             </p:txBody>
           </p:sp>
         </mc:Choice>
-        <mc:Fallback>
+        <mc:Fallback xmlns="">
           <p:sp>
             <p:nvSpPr>
               <p:cNvPr id="3" name="Content Placeholder 2"/>
@@ -12279,8 +12304,8 @@
           </a:p>
         </p:txBody>
       </p:sp>
-      <mc:AlternateContent xmlns:mc="http://schemas.openxmlformats.org/markup-compatibility/2006">
-        <mc:Choice xmlns:a14="http://schemas.microsoft.com/office/drawing/2010/main" Requires="a14">
+      <mc:AlternateContent xmlns:mc="http://schemas.openxmlformats.org/markup-compatibility/2006" xmlns:a14="http://schemas.microsoft.com/office/drawing/2010/main">
+        <mc:Choice Requires="a14">
           <p:sp>
             <p:nvSpPr>
               <p:cNvPr id="3" name="Content Placeholder 2"/>
@@ -12591,7 +12616,7 @@
             </p:txBody>
           </p:sp>
         </mc:Choice>
-        <mc:Fallback>
+        <mc:Fallback xmlns="">
           <p:sp>
             <p:nvSpPr>
               <p:cNvPr id="3" name="Content Placeholder 2"/>
@@ -12784,8 +12809,8 @@
           </a:p>
         </p:txBody>
       </p:sp>
-      <mc:AlternateContent xmlns:mc="http://schemas.openxmlformats.org/markup-compatibility/2006">
-        <mc:Choice xmlns:a14="http://schemas.microsoft.com/office/drawing/2010/main" Requires="a14">
+      <mc:AlternateContent xmlns:mc="http://schemas.openxmlformats.org/markup-compatibility/2006" xmlns:a14="http://schemas.microsoft.com/office/drawing/2010/main">
+        <mc:Choice Requires="a14">
           <p:sp>
             <p:nvSpPr>
               <p:cNvPr id="3" name="Content Placeholder 2"/>
@@ -13904,7 +13929,7 @@
             </p:txBody>
           </p:sp>
         </mc:Choice>
-        <mc:Fallback>
+        <mc:Fallback xmlns="">
           <p:sp>
             <p:nvSpPr>
               <p:cNvPr id="3" name="Content Placeholder 2"/>
@@ -14019,8 +14044,8 @@
         </p:nvSpPr>
         <p:spPr>
           <a:xfrm>
-            <a:off x="1219199" y="1066801"/>
-            <a:ext cx="9405791" cy="5141388"/>
+            <a:off x="609601" y="1066801"/>
+            <a:ext cx="10015390" cy="5141388"/>
           </a:xfrm>
         </p:spPr>
         <p:txBody>
@@ -14033,7 +14058,7 @@
               <a:buNone/>
             </a:pPr>
             <a:r>
-              <a:rPr lang="en-US" sz="2200" b="1" dirty="0">
+              <a:rPr lang="en-US" sz="2400" b="1" dirty="0">
                 <a:solidFill>
                   <a:srgbClr val="222222"/>
                 </a:solidFill>
@@ -14044,7 +14069,7 @@
           </a:p>
           <a:p>
             <a:r>
-              <a:rPr lang="en-US" sz="2200" dirty="0">
+              <a:rPr lang="en-US" sz="2400" dirty="0">
                 <a:solidFill>
                   <a:srgbClr val="222222"/>
                 </a:solidFill>
@@ -14055,7 +14080,7 @@
           </a:p>
           <a:p>
             <a:r>
-              <a:rPr lang="en-US" sz="2200" dirty="0">
+              <a:rPr lang="en-US" sz="2400" dirty="0">
                 <a:solidFill>
                   <a:srgbClr val="222222"/>
                 </a:solidFill>
@@ -14064,7 +14089,7 @@
               <a:t>Use “</a:t>
             </a:r>
             <a:r>
-              <a:rPr lang="en-US" sz="2200" dirty="0" err="1">
+              <a:rPr lang="en-US" sz="2400" dirty="0" err="1">
                 <a:solidFill>
                   <a:srgbClr val="222222"/>
                 </a:solidFill>
@@ -14073,7 +14098,7 @@
               <a:t>quantreg</a:t>
             </a:r>
             <a:r>
-              <a:rPr lang="en-US" sz="2200" dirty="0">
+              <a:rPr lang="en-US" sz="2400" dirty="0">
                 <a:solidFill>
                   <a:srgbClr val="222222"/>
                 </a:solidFill>
@@ -14087,7 +14112,7 @@
               <a:buNone/>
             </a:pPr>
             <a:r>
-              <a:rPr lang="en-US" sz="2200" b="1" dirty="0">
+              <a:rPr lang="en-US" sz="2400" b="1" dirty="0">
                 <a:solidFill>
                   <a:srgbClr val="222222"/>
                 </a:solidFill>
@@ -14098,28 +14123,28 @@
           </a:p>
           <a:p>
             <a:r>
-              <a:rPr lang="en-US" sz="2200" dirty="0"/>
+              <a:rPr lang="en-US" sz="2400" dirty="0"/>
               <a:t>A QRC is the marginal effect of x </a:t>
             </a:r>
             <a:r>
-              <a:rPr lang="en-US" sz="2200" b="1" dirty="0"/>
+              <a:rPr lang="en-US" sz="2400" b="1" dirty="0"/>
               <a:t>specifically on the quantile of interest</a:t>
             </a:r>
             <a:r>
-              <a:rPr lang="en-US" sz="2200" b="0" dirty="0"/>
+              <a:rPr lang="en-US" sz="2400" b="0" dirty="0"/>
               <a:t>. </a:t>
             </a:r>
           </a:p>
           <a:p>
             <a:r>
-              <a:rPr lang="en-US" sz="2200" dirty="0"/>
+              <a:rPr lang="en-US" sz="2400" dirty="0"/>
               <a:t>So you can interpret just like in OLS, just for a different moment!</a:t>
             </a:r>
-            <a:endParaRPr lang="en-US" sz="2200" b="0" dirty="0"/>
-          </a:p>
-          <a:p>
-            <a:r>
-              <a:rPr lang="en-US" sz="2200" dirty="0"/>
+            <a:endParaRPr lang="en-US" sz="2400" b="0" dirty="0"/>
+          </a:p>
+          <a:p>
+            <a:r>
+              <a:rPr lang="en-US" sz="2400" dirty="0"/>
               <a:t>Two options for effect interpretation (think carefully): </a:t>
             </a:r>
           </a:p>
@@ -14129,7 +14154,7 @@
               <a:buAutoNum type="arabicPeriod"/>
             </a:pPr>
             <a:r>
-              <a:rPr lang="en-US" sz="2000" dirty="0"/>
+              <a:rPr lang="en-US" sz="2400" dirty="0"/>
               <a:t>Marginal effects</a:t>
             </a:r>
           </a:p>
@@ -14139,12 +14164,12 @@
               <a:buAutoNum type="arabicPeriod"/>
             </a:pPr>
             <a:r>
-              <a:rPr lang="en-US" sz="2000" dirty="0"/>
+              <a:rPr lang="en-US" sz="2400" dirty="0"/>
               <a:t>Scaled as percentage increases of sample quantile </a:t>
             </a:r>
           </a:p>
           <a:p>
-            <a:endParaRPr lang="en-US" sz="2200" dirty="0">
+            <a:endParaRPr lang="en-US" sz="2400" dirty="0">
               <a:solidFill>
                 <a:srgbClr val="222222"/>
               </a:solidFill>
@@ -14360,8 +14385,8 @@
           </a:p>
         </p:txBody>
       </p:sp>
-      <mc:AlternateContent xmlns:mc="http://schemas.openxmlformats.org/markup-compatibility/2006">
-        <mc:Choice xmlns:a14="http://schemas.microsoft.com/office/drawing/2010/main" Requires="a14">
+      <mc:AlternateContent xmlns:mc="http://schemas.openxmlformats.org/markup-compatibility/2006" xmlns:a14="http://schemas.microsoft.com/office/drawing/2010/main">
+        <mc:Choice Requires="a14">
           <p:sp>
             <p:nvSpPr>
               <p:cNvPr id="3" name="Content Placeholder 2"/>
@@ -14706,7 +14731,7 @@
             </p:txBody>
           </p:sp>
         </mc:Choice>
-        <mc:Fallback>
+        <mc:Fallback xmlns="">
           <p:sp>
             <p:nvSpPr>
               <p:cNvPr id="3" name="Content Placeholder 2"/>
@@ -14809,8 +14834,8 @@
           </a:p>
         </p:txBody>
       </p:sp>
-      <mc:AlternateContent xmlns:mc="http://schemas.openxmlformats.org/markup-compatibility/2006">
-        <mc:Choice xmlns:a14="http://schemas.microsoft.com/office/drawing/2010/main" Requires="a14">
+      <mc:AlternateContent xmlns:mc="http://schemas.openxmlformats.org/markup-compatibility/2006" xmlns:a14="http://schemas.microsoft.com/office/drawing/2010/main">
+        <mc:Choice Requires="a14">
           <p:sp>
             <p:nvSpPr>
               <p:cNvPr id="3" name="Content Placeholder 2"/>
@@ -15232,7 +15257,7 @@
             </p:txBody>
           </p:sp>
         </mc:Choice>
-        <mc:Fallback>
+        <mc:Fallback xmlns="">
           <p:sp>
             <p:nvSpPr>
               <p:cNvPr id="3" name="Content Placeholder 2"/>
@@ -15349,8 +15374,8 @@
             </p:nvSpPr>
             <p:spPr>
               <a:xfrm>
-                <a:off x="1219199" y="1066801"/>
-                <a:ext cx="9405791" cy="5141388"/>
+                <a:off x="762001" y="1066801"/>
+                <a:ext cx="9862990" cy="5141388"/>
               </a:xfrm>
             </p:spPr>
             <p:txBody>
@@ -16017,7 +16042,7 @@
               <a:p>
                 <a:pPr lvl="1"/>
                 <a:r>
-                  <a:rPr lang="en-US" sz="2200" dirty="0">
+                  <a:rPr lang="en-US" sz="2400" dirty="0">
                     <a:solidFill>
                       <a:srgbClr val="222222"/>
                     </a:solidFill>
@@ -16030,7 +16055,7 @@
                     <m:sSub>
                       <m:sSubPr>
                         <m:ctrlPr>
-                          <a:rPr lang="en-US" sz="2200" b="0" i="1" smtClean="0">
+                          <a:rPr lang="en-US" sz="2400" b="0" i="1" smtClean="0">
                             <a:solidFill>
                               <a:srgbClr val="222222"/>
                             </a:solidFill>
@@ -16041,7 +16066,7 @@
                       </m:sSubPr>
                       <m:e>
                         <m:r>
-                          <a:rPr lang="en-US" sz="2200" b="0" i="1" smtClean="0">
+                          <a:rPr lang="en-US" sz="2400" b="0" i="1" smtClean="0">
                             <a:solidFill>
                               <a:srgbClr val="222222"/>
                             </a:solidFill>
@@ -16053,7 +16078,7 @@
                       </m:e>
                       <m:sub>
                         <m:r>
-                          <a:rPr lang="en-US" sz="2200" b="0" i="1" smtClean="0">
+                          <a:rPr lang="en-US" sz="2400" b="0" i="1" smtClean="0">
                             <a:solidFill>
                               <a:srgbClr val="222222"/>
                             </a:solidFill>
@@ -16067,7 +16092,7 @@
                   </m:oMath>
                 </a14:m>
                 <a:r>
-                  <a:rPr lang="en-US" sz="2200" dirty="0">
+                  <a:rPr lang="en-US" sz="2400" dirty="0">
                     <a:solidFill>
                       <a:srgbClr val="222222"/>
                     </a:solidFill>
@@ -16080,7 +16105,7 @@
                     <m:sSub>
                       <m:sSubPr>
                         <m:ctrlPr>
-                          <a:rPr lang="en-US" sz="2200" b="0" i="1" smtClean="0">
+                          <a:rPr lang="en-US" sz="2400" b="0" i="1" smtClean="0">
                             <a:solidFill>
                               <a:srgbClr val="222222"/>
                             </a:solidFill>
@@ -16091,7 +16116,7 @@
                       </m:sSubPr>
                       <m:e>
                         <m:r>
-                          <a:rPr lang="en-US" sz="2200" b="0" i="1" smtClean="0">
+                          <a:rPr lang="en-US" sz="2400" b="0" i="1" smtClean="0">
                             <a:solidFill>
                               <a:srgbClr val="222222"/>
                             </a:solidFill>
@@ -16103,7 +16128,7 @@
                       </m:e>
                       <m:sub>
                         <m:r>
-                          <a:rPr lang="en-US" sz="2200" b="0" i="1" smtClean="0">
+                          <a:rPr lang="en-US" sz="2400" b="0" i="1" smtClean="0">
                             <a:solidFill>
                               <a:srgbClr val="222222"/>
                             </a:solidFill>
@@ -16117,7 +16142,7 @@
                   </m:oMath>
                 </a14:m>
                 <a:r>
-                  <a:rPr lang="en-US" sz="2200" dirty="0">
+                  <a:rPr lang="en-US" sz="2400" dirty="0">
                     <a:solidFill>
                       <a:srgbClr val="222222"/>
                     </a:solidFill>
@@ -16129,7 +16154,7 @@
               <a:p>
                 <a:pPr lvl="1"/>
                 <a:r>
-                  <a:rPr lang="en-US" sz="2200" dirty="0">
+                  <a:rPr lang="en-US" sz="2400" dirty="0">
                     <a:solidFill>
                       <a:srgbClr val="222222"/>
                     </a:solidFill>
@@ -16140,7 +16165,7 @@
                 <a14:m>
                   <m:oMath xmlns:m="http://schemas.openxmlformats.org/officeDocument/2006/math">
                     <m:r>
-                      <a:rPr lang="en-US" sz="2200" b="0" i="1" smtClean="0">
+                      <a:rPr lang="en-US" sz="2400" b="0" i="1" smtClean="0">
                         <a:solidFill>
                           <a:srgbClr val="222222"/>
                         </a:solidFill>
@@ -16152,7 +16177,7 @@
                   </m:oMath>
                 </a14:m>
                 <a:r>
-                  <a:rPr lang="en-US" sz="2200" dirty="0">
+                  <a:rPr lang="en-US" sz="2400" dirty="0">
                     <a:solidFill>
                       <a:srgbClr val="222222"/>
                     </a:solidFill>
@@ -16164,7 +16189,7 @@
               <a:p>
                 <a:pPr lvl="1"/>
                 <a:r>
-                  <a:rPr lang="en-US" sz="2200" dirty="0">
+                  <a:rPr lang="en-US" sz="2400" dirty="0">
                     <a:solidFill>
                       <a:srgbClr val="222222"/>
                     </a:solidFill>
@@ -16183,7 +16208,7 @@
               </a:p>
               <a:p>
                 <a:pPr lvl="1"/>
-                <a:endParaRPr lang="en-US" sz="2200" dirty="0">
+                <a:endParaRPr lang="en-US" sz="2400" dirty="0">
                   <a:solidFill>
                     <a:srgbClr val="222222"/>
                   </a:solidFill>
@@ -16206,13 +16231,13 @@
             </p:nvSpPr>
             <p:spPr>
               <a:xfrm>
-                <a:off x="1219199" y="1066801"/>
-                <a:ext cx="9405791" cy="5141388"/>
+                <a:off x="762001" y="1066801"/>
+                <a:ext cx="9862990" cy="5141388"/>
               </a:xfrm>
               <a:blipFill>
                 <a:blip r:embed="rId3"/>
                 <a:stretch>
-                  <a:fillRect l="-454" t="-1305"/>
+                  <a:fillRect l="-433" t="-1305" r="-1112"/>
                 </a:stretch>
               </a:blipFill>
             </p:spPr>
@@ -16355,8 +16380,8 @@
         </p:nvSpPr>
         <p:spPr>
           <a:xfrm>
-            <a:off x="1219199" y="1066801"/>
-            <a:ext cx="9405791" cy="5141388"/>
+            <a:off x="609601" y="1066801"/>
+            <a:ext cx="10015390" cy="5141388"/>
           </a:xfrm>
         </p:spPr>
         <p:txBody>
@@ -16405,7 +16430,7 @@
           <a:p>
             <a:pPr lvl="1"/>
             <a:r>
-              <a:rPr lang="en-US" sz="2200" dirty="0">
+              <a:rPr lang="en-US" sz="2400" dirty="0">
                 <a:solidFill>
                   <a:srgbClr val="222222"/>
                 </a:solidFill>
@@ -16437,7 +16462,7 @@
           <a:p>
             <a:pPr lvl="1"/>
             <a:r>
-              <a:rPr lang="en-US" sz="2200" dirty="0">
+              <a:rPr lang="en-US" sz="2400" dirty="0">
                 <a:solidFill>
                   <a:srgbClr val="222222"/>
                 </a:solidFill>
@@ -16449,7 +16474,7 @@
           <a:p>
             <a:pPr lvl="1"/>
             <a:r>
-              <a:rPr lang="en-US" sz="2200" dirty="0">
+              <a:rPr lang="en-US" sz="2400" dirty="0">
                 <a:solidFill>
                   <a:srgbClr val="222222"/>
                 </a:solidFill>
@@ -16481,7 +16506,7 @@
           <a:p>
             <a:pPr lvl="1"/>
             <a:r>
-              <a:rPr lang="en-US" sz="2200" dirty="0">
+              <a:rPr lang="en-US" sz="2400" dirty="0">
                 <a:solidFill>
                   <a:srgbClr val="222222"/>
                 </a:solidFill>
@@ -16493,7 +16518,7 @@
           <a:p>
             <a:pPr lvl="1"/>
             <a:r>
-              <a:rPr lang="en-US" sz="2200" dirty="0">
+              <a:rPr lang="en-US" sz="2400" dirty="0">
                 <a:solidFill>
                   <a:srgbClr val="222222"/>
                 </a:solidFill>
@@ -16502,7 +16527,7 @@
               <a:t>Trim/</a:t>
             </a:r>
             <a:r>
-              <a:rPr lang="en-US" sz="2200" dirty="0" err="1">
+              <a:rPr lang="en-US" sz="2400" dirty="0" err="1">
                 <a:solidFill>
                   <a:srgbClr val="222222"/>
                 </a:solidFill>
@@ -16511,7 +16536,7 @@
               <a:t>windsorize</a:t>
             </a:r>
             <a:r>
-              <a:rPr lang="en-US" sz="2200" dirty="0">
+              <a:rPr lang="en-US" sz="2400" dirty="0">
                 <a:solidFill>
                   <a:srgbClr val="222222"/>
                 </a:solidFill>
@@ -16522,7 +16547,7 @@
           </a:p>
           <a:p>
             <a:r>
-              <a:rPr lang="en-US" sz="2600" b="1" dirty="0">
+              <a:rPr lang="en-US" sz="2400" b="1" dirty="0">
                 <a:solidFill>
                   <a:srgbClr val="222222"/>
                 </a:solidFill>
@@ -16721,8 +16746,8 @@
             </p:nvSpPr>
             <p:spPr>
               <a:xfrm>
-                <a:off x="1219199" y="1066801"/>
-                <a:ext cx="9405791" cy="5141388"/>
+                <a:off x="609601" y="1066801"/>
+                <a:ext cx="10015390" cy="5141388"/>
               </a:xfrm>
             </p:spPr>
             <p:txBody>
@@ -16854,7 +16879,7 @@
               <a:p>
                 <a:pPr lvl="1"/>
                 <a:r>
-                  <a:rPr lang="en-US" sz="2200" dirty="0">
+                  <a:rPr lang="en-US" sz="2400" dirty="0">
                     <a:solidFill>
                       <a:srgbClr val="222222"/>
                     </a:solidFill>
@@ -16866,7 +16891,7 @@
               <a:p>
                 <a:pPr lvl="1"/>
                 <a:r>
-                  <a:rPr lang="en-US" sz="2200" dirty="0">
+                  <a:rPr lang="en-US" sz="2400" dirty="0">
                     <a:solidFill>
                       <a:srgbClr val="222222"/>
                     </a:solidFill>
@@ -16875,7 +16900,7 @@
                   <a:t>What do we need in order to get back the </a:t>
                 </a:r>
                 <a:r>
-                  <a:rPr lang="en-US" sz="2200" b="1" dirty="0">
+                  <a:rPr lang="en-US" sz="2400" b="1" dirty="0">
                     <a:solidFill>
                       <a:srgbClr val="222222"/>
                     </a:solidFill>
@@ -16907,7 +16932,7 @@
               <a:p>
                 <a:pPr lvl="1"/>
                 <a:r>
-                  <a:rPr lang="en-US" sz="2200" dirty="0">
+                  <a:rPr lang="en-US" sz="2400" dirty="0">
                     <a:solidFill>
                       <a:srgbClr val="222222"/>
                     </a:solidFill>
@@ -16918,7 +16943,7 @@
                 <a14:m>
                   <m:oMath xmlns:m="http://schemas.openxmlformats.org/officeDocument/2006/math">
                     <m:r>
-                      <a:rPr lang="en-US" sz="2200" b="0" i="1" smtClean="0">
+                      <a:rPr lang="en-US" sz="2400" b="0" i="1" smtClean="0">
                         <a:solidFill>
                           <a:srgbClr val="222222"/>
                         </a:solidFill>
@@ -16928,7 +16953,7 @@
                       <m:t>𝐿</m:t>
                     </m:r>
                     <m:r>
-                      <a:rPr lang="en-US" sz="2200" b="0" i="1" smtClean="0">
+                      <a:rPr lang="en-US" sz="2400" b="0" i="1" smtClean="0">
                         <a:solidFill>
                           <a:srgbClr val="222222"/>
                         </a:solidFill>
@@ -16938,7 +16963,7 @@
                       <m:t>(</m:t>
                     </m:r>
                     <m:r>
-                      <a:rPr lang="en-US" sz="2200" b="0" i="1" smtClean="0">
+                      <a:rPr lang="en-US" sz="2400" b="0" i="1" smtClean="0">
                         <a:solidFill>
                           <a:srgbClr val="222222"/>
                         </a:solidFill>
@@ -16948,7 +16973,7 @@
                       <m:t>𝑝</m:t>
                     </m:r>
                     <m:r>
-                      <a:rPr lang="en-US" sz="2200" b="0" i="1" smtClean="0">
+                      <a:rPr lang="en-US" sz="2400" b="0" i="1" smtClean="0">
                         <a:solidFill>
                           <a:srgbClr val="222222"/>
                         </a:solidFill>
@@ -16961,7 +16986,7 @@
                       <m:accPr>
                         <m:chr m:val="̂"/>
                         <m:ctrlPr>
-                          <a:rPr lang="en-US" sz="2200" b="0" i="1" smtClean="0">
+                          <a:rPr lang="en-US" sz="2400" b="0" i="1" smtClean="0">
                             <a:solidFill>
                               <a:srgbClr val="222222"/>
                             </a:solidFill>
@@ -16972,7 +16997,7 @@
                       </m:accPr>
                       <m:e>
                         <m:r>
-                          <a:rPr lang="en-US" sz="2200" b="0" i="1" smtClean="0">
+                          <a:rPr lang="en-US" sz="2400" b="0" i="1" smtClean="0">
                             <a:solidFill>
                               <a:srgbClr val="222222"/>
                             </a:solidFill>
@@ -16984,7 +17009,7 @@
                       </m:e>
                     </m:acc>
                     <m:r>
-                      <a:rPr lang="en-US" sz="2200" b="0" i="1" smtClean="0">
+                      <a:rPr lang="en-US" sz="2400" b="0" i="1" smtClean="0">
                         <a:solidFill>
                           <a:srgbClr val="222222"/>
                         </a:solidFill>
@@ -16996,7 +17021,7 @@
                   </m:oMath>
                 </a14:m>
                 <a:r>
-                  <a:rPr lang="en-US" sz="2200" dirty="0">
+                  <a:rPr lang="en-US" sz="2400" dirty="0">
                     <a:solidFill>
                       <a:srgbClr val="222222"/>
                     </a:solidFill>
@@ -17008,7 +17033,7 @@
               <a:p>
                 <a:pPr lvl="1"/>
                 <a:r>
-                  <a:rPr lang="en-US" sz="2200" dirty="0">
+                  <a:rPr lang="en-US" sz="2400" dirty="0">
                     <a:solidFill>
                       <a:srgbClr val="222222"/>
                     </a:solidFill>
@@ -17019,7 +17044,7 @@
                 <a14:m>
                   <m:oMath xmlns:m="http://schemas.openxmlformats.org/officeDocument/2006/math">
                     <m:r>
-                      <a:rPr lang="en-US" sz="2200" b="0" i="1" smtClean="0">
+                      <a:rPr lang="en-US" sz="2400" b="0" i="1" smtClean="0">
                         <a:solidFill>
                           <a:srgbClr val="222222"/>
                         </a:solidFill>
@@ -17029,7 +17054,7 @@
                       <m:t>𝑝</m:t>
                     </m:r>
                     <m:r>
-                      <a:rPr lang="en-US" sz="2200" b="0" i="1" smtClean="0">
+                      <a:rPr lang="en-US" sz="2400" b="0" i="1" smtClean="0">
                         <a:solidFill>
                           <a:srgbClr val="222222"/>
                         </a:solidFill>
@@ -17039,7 +17064,7 @@
                       <m:t>(</m:t>
                     </m:r>
                     <m:r>
-                      <a:rPr lang="en-US" sz="2200" b="0" i="1" smtClean="0">
+                      <a:rPr lang="en-US" sz="2400" b="0" i="1" smtClean="0">
                         <a:solidFill>
                           <a:srgbClr val="222222"/>
                         </a:solidFill>
@@ -17049,7 +17074,7 @@
                       <m:t>𝑦</m:t>
                     </m:r>
                     <m:r>
-                      <a:rPr lang="en-US" sz="2200" b="0" i="1" smtClean="0">
+                      <a:rPr lang="en-US" sz="2400" b="0" i="1" smtClean="0">
                         <a:solidFill>
                           <a:srgbClr val="222222"/>
                         </a:solidFill>
@@ -17059,7 +17084,7 @@
                       <m:t>|</m:t>
                     </m:r>
                     <m:r>
-                      <a:rPr lang="en-US" sz="2200" b="0" i="1" smtClean="0">
+                      <a:rPr lang="en-US" sz="2400" b="0" i="1" smtClean="0">
                         <a:solidFill>
                           <a:srgbClr val="222222"/>
                         </a:solidFill>
@@ -17069,7 +17094,7 @@
                       <m:t>𝑥</m:t>
                     </m:r>
                     <m:r>
-                      <a:rPr lang="en-US" sz="2200" b="0" i="1" smtClean="0">
+                      <a:rPr lang="en-US" sz="2400" b="0" i="1" smtClean="0">
                         <a:solidFill>
                           <a:srgbClr val="222222"/>
                         </a:solidFill>
@@ -17081,7 +17106,7 @@
                   </m:oMath>
                 </a14:m>
                 <a:r>
-                  <a:rPr lang="en-US" sz="2200" dirty="0">
+                  <a:rPr lang="en-US" sz="2400" dirty="0">
                     <a:solidFill>
                       <a:srgbClr val="222222"/>
                     </a:solidFill>
@@ -17093,7 +17118,7 @@
               <a:p>
                 <a:pPr lvl="1"/>
                 <a:r>
-                  <a:rPr lang="en-US" sz="2200" dirty="0">
+                  <a:rPr lang="en-US" sz="2400" dirty="0">
                     <a:solidFill>
                       <a:srgbClr val="222222"/>
                     </a:solidFill>
@@ -17107,7 +17132,7 @@
                       <m:accPr>
                         <m:chr m:val="̂"/>
                         <m:ctrlPr>
-                          <a:rPr lang="en-US" sz="2200" b="0" i="1" smtClean="0">
+                          <a:rPr lang="en-US" sz="2400" b="0" i="1" smtClean="0">
                             <a:solidFill>
                               <a:srgbClr val="222222"/>
                             </a:solidFill>
@@ -17118,7 +17143,7 @@
                       </m:accPr>
                       <m:e>
                         <m:r>
-                          <a:rPr lang="en-US" sz="2200" b="0" i="1" smtClean="0">
+                          <a:rPr lang="en-US" sz="2400" b="0" i="1" smtClean="0">
                             <a:solidFill>
                               <a:srgbClr val="222222"/>
                             </a:solidFill>
@@ -17130,7 +17155,7 @@
                       </m:e>
                     </m:acc>
                     <m:r>
-                      <a:rPr lang="en-US" sz="2200" b="0" i="1" smtClean="0">
+                      <a:rPr lang="en-US" sz="2400" b="0" i="1" smtClean="0">
                         <a:solidFill>
                           <a:srgbClr val="222222"/>
                         </a:solidFill>
@@ -17140,7 +17165,7 @@
                       <m:t>(</m:t>
                     </m:r>
                     <m:r>
-                      <a:rPr lang="en-US" sz="2200" b="0" i="1" smtClean="0">
+                      <a:rPr lang="en-US" sz="2400" b="0" i="1" smtClean="0">
                         <a:solidFill>
                           <a:srgbClr val="222222"/>
                         </a:solidFill>
@@ -17150,7 +17175,7 @@
                       <m:t>𝑦</m:t>
                     </m:r>
                     <m:r>
-                      <a:rPr lang="en-US" sz="2200" b="0" i="1" smtClean="0">
+                      <a:rPr lang="en-US" sz="2400" b="0" i="1" smtClean="0">
                         <a:solidFill>
                           <a:srgbClr val="222222"/>
                         </a:solidFill>
@@ -17160,7 +17185,7 @@
                       <m:t>|</m:t>
                     </m:r>
                     <m:r>
-                      <a:rPr lang="en-US" sz="2200" b="0" i="1" smtClean="0">
+                      <a:rPr lang="en-US" sz="2400" b="0" i="1" smtClean="0">
                         <a:solidFill>
                           <a:srgbClr val="222222"/>
                         </a:solidFill>
@@ -17170,7 +17195,7 @@
                       <m:t>𝑥</m:t>
                     </m:r>
                     <m:r>
-                      <a:rPr lang="en-US" sz="2200" b="0" i="1" smtClean="0">
+                      <a:rPr lang="en-US" sz="2400" b="0" i="1" smtClean="0">
                         <a:solidFill>
                           <a:srgbClr val="222222"/>
                         </a:solidFill>
@@ -17181,7 +17206,7 @@
                     </m:r>
                   </m:oMath>
                 </a14:m>
-                <a:endParaRPr lang="en-US" sz="2200" dirty="0">
+                <a:endParaRPr lang="en-US" sz="2400" dirty="0">
                   <a:solidFill>
                     <a:srgbClr val="222222"/>
                   </a:solidFill>
@@ -17204,13 +17229,13 @@
             </p:nvSpPr>
             <p:spPr>
               <a:xfrm>
-                <a:off x="1219199" y="1066801"/>
-                <a:ext cx="9405791" cy="5141388"/>
+                <a:off x="609601" y="1066801"/>
+                <a:ext cx="10015390" cy="5141388"/>
               </a:xfrm>
               <a:blipFill>
                 <a:blip r:embed="rId3"/>
                 <a:stretch>
-                  <a:fillRect l="-454" t="-1305"/>
+                  <a:fillRect l="-426" t="-1305"/>
                 </a:stretch>
               </a:blipFill>
             </p:spPr>
@@ -17308,8 +17333,8 @@
             </p:nvSpPr>
             <p:spPr>
               <a:xfrm>
-                <a:off x="1219199" y="1066801"/>
-                <a:ext cx="9829801" cy="5141388"/>
+                <a:off x="685801" y="1066801"/>
+                <a:ext cx="10363200" cy="5141388"/>
               </a:xfrm>
             </p:spPr>
             <p:txBody>
@@ -17441,7 +17466,7 @@
               <a:p>
                 <a:pPr lvl="1"/>
                 <a:r>
-                  <a:rPr lang="en-US" sz="2200" dirty="0">
+                  <a:rPr lang="en-US" sz="2400" dirty="0">
                     <a:solidFill>
                       <a:srgbClr val="222222"/>
                     </a:solidFill>
@@ -17453,7 +17478,7 @@
               <a:p>
                 <a:pPr lvl="1"/>
                 <a:r>
-                  <a:rPr lang="en-US" sz="2200" dirty="0">
+                  <a:rPr lang="en-US" sz="2400" dirty="0">
                     <a:solidFill>
                       <a:srgbClr val="222222"/>
                     </a:solidFill>
@@ -17462,7 +17487,7 @@
                   <a:t>What do we need in order to get back the </a:t>
                 </a:r>
                 <a:r>
-                  <a:rPr lang="en-US" sz="2200" b="1" dirty="0">
+                  <a:rPr lang="en-US" sz="2400" b="1" dirty="0">
                     <a:solidFill>
                       <a:srgbClr val="222222"/>
                     </a:solidFill>
@@ -17496,7 +17521,7 @@
                   <a:buNone/>
                 </a:pPr>
                 <a:r>
-                  <a:rPr lang="en-US" sz="2800" b="1" dirty="0">
+                  <a:rPr lang="en-US" sz="2400" b="1" dirty="0">
                     <a:solidFill>
                       <a:schemeClr val="accent2">
                         <a:lumMod val="75000"/>
@@ -17506,14 +17531,6 @@
                   </a:rPr>
                   <a:t>Some CDE Methods: </a:t>
                 </a:r>
-                <a:endParaRPr lang="en-US" sz="2400" b="1" dirty="0">
-                  <a:solidFill>
-                    <a:schemeClr val="accent2">
-                      <a:lumMod val="75000"/>
-                    </a:schemeClr>
-                  </a:solidFill>
-                  <a:cs typeface="Times New Roman" panose="02020603050405020304" pitchFamily="18" charset="0"/>
-                </a:endParaRPr>
               </a:p>
               <a:p>
                 <a:pPr marL="457200" indent="-457200">
@@ -17652,7 +17669,7 @@
               <a:p>
                 <a:pPr lvl="1"/>
                 <a:r>
-                  <a:rPr lang="en-US" sz="2200" dirty="0">
+                  <a:rPr lang="en-US" sz="2400" dirty="0">
                     <a:solidFill>
                       <a:srgbClr val="222222"/>
                     </a:solidFill>
@@ -17707,13 +17724,13 @@
             </p:nvSpPr>
             <p:spPr>
               <a:xfrm>
-                <a:off x="1219199" y="1066801"/>
-                <a:ext cx="9829801" cy="5141388"/>
+                <a:off x="685801" y="1066801"/>
+                <a:ext cx="10363200" cy="5141388"/>
               </a:xfrm>
               <a:blipFill>
                 <a:blip r:embed="rId3"/>
                 <a:stretch>
-                  <a:fillRect l="-1240" t="-1305"/>
+                  <a:fillRect l="-941" t="-1305"/>
                 </a:stretch>
               </a:blipFill>
             </p:spPr>
@@ -17809,8 +17826,8 @@
         </p:nvSpPr>
         <p:spPr>
           <a:xfrm>
-            <a:off x="1219199" y="1066801"/>
-            <a:ext cx="9829801" cy="5141388"/>
+            <a:off x="609601" y="1066801"/>
+            <a:ext cx="10439400" cy="5141388"/>
           </a:xfrm>
         </p:spPr>
         <p:txBody>
@@ -17850,81 +17867,17 @@
           <a:p>
             <a:pPr lvl="1"/>
             <a:r>
-              <a:rPr lang="en-US" sz="2200" dirty="0">
-                <a:solidFill>
-                  <a:srgbClr val="222222"/>
-                </a:solidFill>
-                <a:cs typeface="Times New Roman" panose="02020603050405020304" pitchFamily="18" charset="0"/>
-              </a:rPr>
-              <a:t>Rather than coefficient estimation based on averages of errors, </a:t>
-            </a:r>
-          </a:p>
-          <a:p>
-            <a:pPr lvl="1"/>
-            <a:r>
-              <a:rPr lang="en-US" sz="2200" dirty="0">
-                <a:solidFill>
-                  <a:srgbClr val="222222"/>
-                </a:solidFill>
-                <a:cs typeface="Times New Roman" panose="02020603050405020304" pitchFamily="18" charset="0"/>
-              </a:rPr>
-              <a:t>Split data into </a:t>
-            </a:r>
-            <a:r>
-              <a:rPr lang="en-US" sz="2200" i="1" dirty="0">
-                <a:solidFill>
-                  <a:srgbClr val="222222"/>
-                </a:solidFill>
-                <a:cs typeface="Times New Roman" panose="02020603050405020304" pitchFamily="18" charset="0"/>
-              </a:rPr>
-              <a:t>trees </a:t>
-            </a:r>
-            <a:r>
-              <a:rPr lang="en-US" sz="2200" dirty="0">
-                <a:solidFill>
-                  <a:srgbClr val="222222"/>
-                </a:solidFill>
-                <a:cs typeface="Times New Roman" panose="02020603050405020304" pitchFamily="18" charset="0"/>
-              </a:rPr>
-              <a:t>based on “cut-points” in data</a:t>
-            </a:r>
-          </a:p>
-          <a:p>
-            <a:pPr lvl="1"/>
-            <a:r>
-              <a:rPr lang="en-US" sz="2200" dirty="0">
-                <a:solidFill>
-                  <a:srgbClr val="222222"/>
-                </a:solidFill>
-                <a:cs typeface="Times New Roman" panose="02020603050405020304" pitchFamily="18" charset="0"/>
-              </a:rPr>
-              <a:t>Trees are chosen in order to maximize predictive power of data</a:t>
-            </a:r>
-          </a:p>
-          <a:p>
-            <a:r>
               <a:rPr lang="en-US" sz="2400" dirty="0">
                 <a:solidFill>
                   <a:srgbClr val="222222"/>
                 </a:solidFill>
                 <a:cs typeface="Times New Roman" panose="02020603050405020304" pitchFamily="18" charset="0"/>
               </a:rPr>
-              <a:t>Forests: bootstrapping over the trees!</a:t>
+              <a:t>Rather than coefficient estimation based on averages of errors, </a:t>
             </a:r>
           </a:p>
           <a:p>
             <a:pPr lvl="1"/>
-            <a:r>
-              <a:rPr lang="en-US" sz="2200" dirty="0">
-                <a:solidFill>
-                  <a:srgbClr val="222222"/>
-                </a:solidFill>
-                <a:cs typeface="Times New Roman" panose="02020603050405020304" pitchFamily="18" charset="0"/>
-              </a:rPr>
-              <a:t>There is new terminology here: bagging, boosting, etc. But the concepts are similar</a:t>
-            </a:r>
-          </a:p>
-          <a:p>
             <a:r>
               <a:rPr lang="en-US" sz="2400" dirty="0">
                 <a:solidFill>
@@ -17932,6 +17885,70 @@
                 </a:solidFill>
                 <a:cs typeface="Times New Roman" panose="02020603050405020304" pitchFamily="18" charset="0"/>
               </a:rPr>
+              <a:t>Split data into </a:t>
+            </a:r>
+            <a:r>
+              <a:rPr lang="en-US" sz="2400" i="1" dirty="0">
+                <a:solidFill>
+                  <a:srgbClr val="222222"/>
+                </a:solidFill>
+                <a:cs typeface="Times New Roman" panose="02020603050405020304" pitchFamily="18" charset="0"/>
+              </a:rPr>
+              <a:t>trees </a:t>
+            </a:r>
+            <a:r>
+              <a:rPr lang="en-US" sz="2400" dirty="0">
+                <a:solidFill>
+                  <a:srgbClr val="222222"/>
+                </a:solidFill>
+                <a:cs typeface="Times New Roman" panose="02020603050405020304" pitchFamily="18" charset="0"/>
+              </a:rPr>
+              <a:t>based on “cut-points” in data</a:t>
+            </a:r>
+          </a:p>
+          <a:p>
+            <a:pPr lvl="1"/>
+            <a:r>
+              <a:rPr lang="en-US" sz="2400" dirty="0">
+                <a:solidFill>
+                  <a:srgbClr val="222222"/>
+                </a:solidFill>
+                <a:cs typeface="Times New Roman" panose="02020603050405020304" pitchFamily="18" charset="0"/>
+              </a:rPr>
+              <a:t>Trees are chosen in order to maximize predictive power of data</a:t>
+            </a:r>
+          </a:p>
+          <a:p>
+            <a:r>
+              <a:rPr lang="en-US" sz="2400" dirty="0">
+                <a:solidFill>
+                  <a:srgbClr val="222222"/>
+                </a:solidFill>
+                <a:cs typeface="Times New Roman" panose="02020603050405020304" pitchFamily="18" charset="0"/>
+              </a:rPr>
+              <a:t>Forests: bootstrapping over the trees!</a:t>
+            </a:r>
+          </a:p>
+          <a:p>
+            <a:pPr lvl="1"/>
+            <a:r>
+              <a:rPr lang="en-US" sz="2400" dirty="0">
+                <a:solidFill>
+                  <a:srgbClr val="222222"/>
+                </a:solidFill>
+                <a:cs typeface="Times New Roman" panose="02020603050405020304" pitchFamily="18" charset="0"/>
+              </a:rPr>
+              <a:t>There is new terminology here: bagging, boosting, etc. But the concepts are similar</a:t>
+            </a:r>
+          </a:p>
+          <a:p>
+            <a:r>
+              <a:rPr lang="en-US" sz="2400" dirty="0">
+                <a:solidFill>
+                  <a:srgbClr val="222222"/>
+                </a:solidFill>
+                <a:cs typeface="Times New Roman" panose="02020603050405020304" pitchFamily="18" charset="0"/>
+              </a:rPr>
               <a:t>These methods were applied best as </a:t>
             </a:r>
             <a:r>
@@ -17956,22 +17973,13 @@
           <a:p>
             <a:pPr lvl="1"/>
             <a:r>
-              <a:rPr lang="en-US" sz="2200" dirty="0">
-                <a:solidFill>
-                  <a:srgbClr val="222222"/>
-                </a:solidFill>
-                <a:cs typeface="Times New Roman" panose="02020603050405020304" pitchFamily="18" charset="0"/>
-              </a:rPr>
-              <a:t>But causal methods are being developed; </a:t>
-            </a:r>
-            <a:r>
               <a:rPr lang="en-US" sz="2400" dirty="0">
                 <a:solidFill>
                   <a:srgbClr val="222222"/>
                 </a:solidFill>
                 <a:cs typeface="Times New Roman" panose="02020603050405020304" pitchFamily="18" charset="0"/>
               </a:rPr>
-              <a:t>see papers in </a:t>
+              <a:t>But causal methods are being developed; see papers in </a:t>
             </a:r>
             <a:r>
               <a:rPr lang="en-US" sz="2400" dirty="0" err="1">
@@ -18130,8 +18138,8 @@
           </a:p>
         </p:txBody>
       </p:sp>
-      <mc:AlternateContent xmlns:mc="http://schemas.openxmlformats.org/markup-compatibility/2006" xmlns:a14="http://schemas.microsoft.com/office/drawing/2010/main">
-        <mc:Choice Requires="a14">
+      <mc:AlternateContent xmlns:mc="http://schemas.openxmlformats.org/markup-compatibility/2006">
+        <mc:Choice xmlns:a14="http://schemas.microsoft.com/office/drawing/2010/main" Requires="a14">
           <p:sp>
             <p:nvSpPr>
               <p:cNvPr id="3" name="Content Placeholder 2"/>
@@ -18155,13 +18163,13 @@
               <a:lstStyle/>
               <a:p>
                 <a:r>
-                  <a:rPr lang="en-US" sz="2200" dirty="0">
+                  <a:rPr lang="en-US" sz="2400" dirty="0">
                     <a:cs typeface="Times New Roman" panose="02020603050405020304" pitchFamily="18" charset="0"/>
                   </a:rPr>
                   <a:t>Typical DID framework is a way to use </a:t>
                 </a:r>
                 <a:r>
-                  <a:rPr lang="en-US" sz="2200" b="1" dirty="0">
+                  <a:rPr lang="en-US" sz="2400" b="1" dirty="0">
                     <a:solidFill>
                       <a:schemeClr val="accent2">
                         <a:lumMod val="75000"/>
@@ -18172,13 +18180,13 @@
                   <a:t>observational data </a:t>
                 </a:r>
                 <a:r>
-                  <a:rPr lang="en-US" sz="2200" dirty="0">
+                  <a:rPr lang="en-US" sz="2400" dirty="0">
                     <a:cs typeface="Times New Roman" panose="02020603050405020304" pitchFamily="18" charset="0"/>
                   </a:rPr>
                   <a:t>to examine </a:t>
                 </a:r>
                 <a:r>
-                  <a:rPr lang="en-US" sz="2200" b="1" dirty="0">
+                  <a:rPr lang="en-US" sz="2400" b="1" dirty="0">
                     <a:solidFill>
                       <a:schemeClr val="accent3">
                         <a:lumMod val="75000"/>
@@ -18191,7 +18199,7 @@
               </a:p>
               <a:p>
                 <a:r>
-                  <a:rPr lang="en-US" sz="2200" dirty="0">
+                  <a:rPr lang="en-US" sz="2400" dirty="0">
                     <a:cs typeface="Times New Roman" panose="02020603050405020304" pitchFamily="18" charset="0"/>
                   </a:rPr>
                   <a:t>We would like to have: </a:t>
@@ -18210,7 +18218,7 @@
                       <m:sSub>
                         <m:sSubPr>
                           <m:ctrlPr>
-                            <a:rPr lang="en-US" sz="2200" b="0" i="1" smtClean="0">
+                            <a:rPr lang="en-US" sz="2400" b="0" i="1" smtClean="0">
                               <a:latin typeface="Cambria Math" panose="02040503050406030204" pitchFamily="18" charset="0"/>
                               <a:cs typeface="Times New Roman" panose="02020603050405020304" pitchFamily="18" charset="0"/>
                             </a:rPr>
@@ -18218,7 +18226,7 @@
                         </m:sSubPr>
                         <m:e>
                           <m:r>
-                            <a:rPr lang="en-US" sz="2200" b="0" i="1" smtClean="0">
+                            <a:rPr lang="en-US" sz="2400" b="0" i="1" smtClean="0">
                               <a:latin typeface="Cambria Math" panose="02040503050406030204" pitchFamily="18" charset="0"/>
                               <a:cs typeface="Times New Roman" panose="02020603050405020304" pitchFamily="18" charset="0"/>
                             </a:rPr>
@@ -18227,7 +18235,7 @@
                         </m:e>
                         <m:sub>
                           <m:r>
-                            <a:rPr lang="en-US" sz="2200" b="0" i="1" smtClean="0">
+                            <a:rPr lang="en-US" sz="2400" b="0" i="1" smtClean="0">
                               <a:latin typeface="Cambria Math" panose="02040503050406030204" pitchFamily="18" charset="0"/>
                               <a:cs typeface="Times New Roman" panose="02020603050405020304" pitchFamily="18" charset="0"/>
                             </a:rPr>
@@ -18236,7 +18244,7 @@
                         </m:sub>
                       </m:sSub>
                       <m:r>
-                        <a:rPr lang="en-US" sz="2200" b="0" i="1" smtClean="0">
+                        <a:rPr lang="en-US" sz="2400" b="0" i="1" smtClean="0">
                           <a:latin typeface="Cambria Math" panose="02040503050406030204" pitchFamily="18" charset="0"/>
                           <a:cs typeface="Times New Roman" panose="02020603050405020304" pitchFamily="18" charset="0"/>
                         </a:rPr>
@@ -18245,7 +18253,7 @@
                       <m:sSubSup>
                         <m:sSubSupPr>
                           <m:ctrlPr>
-                            <a:rPr lang="en-US" sz="2200" b="0" i="1" smtClean="0">
+                            <a:rPr lang="en-US" sz="2400" b="0" i="1" smtClean="0">
                               <a:latin typeface="Cambria Math" panose="02040503050406030204" pitchFamily="18" charset="0"/>
                               <a:cs typeface="Times New Roman" panose="02020603050405020304" pitchFamily="18" charset="0"/>
                             </a:rPr>
@@ -18253,7 +18261,7 @@
                         </m:sSubSupPr>
                         <m:e>
                           <m:r>
-                            <a:rPr lang="en-US" sz="2200" b="0" i="1" smtClean="0">
+                            <a:rPr lang="en-US" sz="2400" b="0" i="1" smtClean="0">
                               <a:latin typeface="Cambria Math" panose="02040503050406030204" pitchFamily="18" charset="0"/>
                               <a:cs typeface="Times New Roman" panose="02020603050405020304" pitchFamily="18" charset="0"/>
                             </a:rPr>
@@ -18262,7 +18270,7 @@
                         </m:e>
                         <m:sub>
                           <m:r>
-                            <a:rPr lang="en-US" sz="2200" b="0" i="1" smtClean="0">
+                            <a:rPr lang="en-US" sz="2400" b="0" i="1" smtClean="0">
                               <a:latin typeface="Cambria Math" panose="02040503050406030204" pitchFamily="18" charset="0"/>
                               <a:cs typeface="Times New Roman" panose="02020603050405020304" pitchFamily="18" charset="0"/>
                             </a:rPr>
@@ -18271,7 +18279,7 @@
                         </m:sub>
                         <m:sup>
                           <m:r>
-                            <a:rPr lang="en-US" sz="2200" b="0" i="1" smtClean="0">
+                            <a:rPr lang="en-US" sz="2400" b="0" i="1" smtClean="0">
                               <a:latin typeface="Cambria Math" panose="02040503050406030204" pitchFamily="18" charset="0"/>
                               <a:cs typeface="Times New Roman" panose="02020603050405020304" pitchFamily="18" charset="0"/>
                             </a:rPr>
@@ -18280,7 +18288,7 @@
                         </m:sup>
                       </m:sSubSup>
                       <m:r>
-                        <a:rPr lang="en-US" sz="2200" b="0" i="1" smtClean="0">
+                        <a:rPr lang="en-US" sz="2400" b="0" i="1" smtClean="0">
                           <a:latin typeface="Cambria Math" panose="02040503050406030204" pitchFamily="18" charset="0"/>
                           <a:cs typeface="Times New Roman" panose="02020603050405020304" pitchFamily="18" charset="0"/>
                         </a:rPr>
@@ -18289,7 +18297,7 @@
                       <m:sSubSup>
                         <m:sSubSupPr>
                           <m:ctrlPr>
-                            <a:rPr lang="en-US" sz="2200" b="0" i="1" smtClean="0">
+                            <a:rPr lang="en-US" sz="2400" b="0" i="1" smtClean="0">
                               <a:latin typeface="Cambria Math" panose="02040503050406030204" pitchFamily="18" charset="0"/>
                               <a:cs typeface="Times New Roman" panose="02020603050405020304" pitchFamily="18" charset="0"/>
                             </a:rPr>
@@ -18297,7 +18305,7 @@
                         </m:sSubSupPr>
                         <m:e>
                           <m:r>
-                            <a:rPr lang="en-US" sz="2200" b="0" i="1" smtClean="0">
+                            <a:rPr lang="en-US" sz="2400" b="0" i="1" smtClean="0">
                               <a:latin typeface="Cambria Math" panose="02040503050406030204" pitchFamily="18" charset="0"/>
                               <a:cs typeface="Times New Roman" panose="02020603050405020304" pitchFamily="18" charset="0"/>
                             </a:rPr>
@@ -18306,7 +18314,7 @@
                         </m:e>
                         <m:sub>
                           <m:r>
-                            <a:rPr lang="en-US" sz="2200" b="0" i="1" smtClean="0">
+                            <a:rPr lang="en-US" sz="2400" b="0" i="1" smtClean="0">
                               <a:latin typeface="Cambria Math" panose="02040503050406030204" pitchFamily="18" charset="0"/>
                               <a:cs typeface="Times New Roman" panose="02020603050405020304" pitchFamily="18" charset="0"/>
                             </a:rPr>
@@ -18315,7 +18323,7 @@
                         </m:sub>
                         <m:sup>
                           <m:r>
-                            <a:rPr lang="en-US" sz="2200" b="0" i="1" smtClean="0">
+                            <a:rPr lang="en-US" sz="2400" b="0" i="1" smtClean="0">
                               <a:latin typeface="Cambria Math" panose="02040503050406030204" pitchFamily="18" charset="0"/>
                               <a:cs typeface="Times New Roman" panose="02020603050405020304" pitchFamily="18" charset="0"/>
                             </a:rPr>
@@ -18326,13 +18334,13 @@
                     </m:oMath>
                   </m:oMathPara>
                 </a14:m>
-                <a:endParaRPr lang="en-US" sz="2200" dirty="0">
+                <a:endParaRPr lang="en-US" sz="2400" dirty="0">
                   <a:cs typeface="Times New Roman" panose="02020603050405020304" pitchFamily="18" charset="0"/>
                 </a:endParaRPr>
               </a:p>
               <a:p>
                 <a:r>
-                  <a:rPr lang="en-US" sz="2200" dirty="0">
+                  <a:rPr lang="en-US" sz="2400" dirty="0">
                     <a:cs typeface="Times New Roman" panose="02020603050405020304" pitchFamily="18" charset="0"/>
                   </a:rPr>
                   <a:t>When </a:t>
@@ -18342,7 +18350,7 @@
                     <m:sSubSup>
                       <m:sSubSupPr>
                         <m:ctrlPr>
-                          <a:rPr lang="en-US" sz="2200" b="0" i="1" smtClean="0">
+                          <a:rPr lang="en-US" sz="2400" b="0" i="1" smtClean="0">
                             <a:latin typeface="Cambria Math" panose="02040503050406030204" pitchFamily="18" charset="0"/>
                             <a:cs typeface="Times New Roman" panose="02020603050405020304" pitchFamily="18" charset="0"/>
                           </a:rPr>
@@ -18350,7 +18358,7 @@
                       </m:sSubSupPr>
                       <m:e>
                         <m:r>
-                          <a:rPr lang="en-US" sz="2200" b="0" i="1" smtClean="0">
+                          <a:rPr lang="en-US" sz="2400" b="0" i="1" smtClean="0">
                             <a:latin typeface="Cambria Math" panose="02040503050406030204" pitchFamily="18" charset="0"/>
                             <a:cs typeface="Times New Roman" panose="02020603050405020304" pitchFamily="18" charset="0"/>
                           </a:rPr>
@@ -18359,7 +18367,7 @@
                       </m:e>
                       <m:sub>
                         <m:r>
-                          <a:rPr lang="en-US" sz="2200" b="0" i="1" smtClean="0">
+                          <a:rPr lang="en-US" sz="2400" b="0" i="1" smtClean="0">
                             <a:latin typeface="Cambria Math" panose="02040503050406030204" pitchFamily="18" charset="0"/>
                             <a:cs typeface="Times New Roman" panose="02020603050405020304" pitchFamily="18" charset="0"/>
                           </a:rPr>
@@ -18368,7 +18376,7 @@
                       </m:sub>
                       <m:sup>
                         <m:r>
-                          <a:rPr lang="en-US" sz="2200" b="0" i="1" smtClean="0">
+                          <a:rPr lang="en-US" sz="2400" b="0" i="1" smtClean="0">
                             <a:latin typeface="Cambria Math" panose="02040503050406030204" pitchFamily="18" charset="0"/>
                             <a:cs typeface="Times New Roman" panose="02020603050405020304" pitchFamily="18" charset="0"/>
                           </a:rPr>
@@ -18379,31 +18387,31 @@
                   </m:oMath>
                 </a14:m>
                 <a:r>
-                  <a:rPr lang="en-US" sz="2200" dirty="0">
+                  <a:rPr lang="en-US" sz="2400" dirty="0">
                     <a:cs typeface="Times New Roman" panose="02020603050405020304" pitchFamily="18" charset="0"/>
                   </a:rPr>
                   <a:t> is unobserved, we </a:t>
                 </a:r>
                 <a:r>
-                  <a:rPr lang="en-US" sz="2200" u="sng" dirty="0">
+                  <a:rPr lang="en-US" sz="2400" u="sng" dirty="0">
                     <a:cs typeface="Times New Roman" panose="02020603050405020304" pitchFamily="18" charset="0"/>
                   </a:rPr>
                   <a:t>proxy it</a:t>
                 </a:r>
                 <a:r>
-                  <a:rPr lang="en-US" sz="2200" b="1" dirty="0">
+                  <a:rPr lang="en-US" sz="2400" b="1" dirty="0">
                     <a:cs typeface="Times New Roman" panose="02020603050405020304" pitchFamily="18" charset="0"/>
                   </a:rPr>
                   <a:t> </a:t>
                 </a:r>
                 <a:r>
-                  <a:rPr lang="en-US" sz="2200" dirty="0">
+                  <a:rPr lang="en-US" sz="2400" dirty="0">
                     <a:cs typeface="Times New Roman" panose="02020603050405020304" pitchFamily="18" charset="0"/>
                   </a:rPr>
                   <a:t>with a </a:t>
                 </a:r>
                 <a:r>
-                  <a:rPr lang="en-US" sz="2200" dirty="0">
+                  <a:rPr lang="en-US" sz="2400" dirty="0">
                     <a:solidFill>
                       <a:schemeClr val="accent2">
                         <a:lumMod val="75000"/>
@@ -18416,7 +18424,7 @@
               </a:p>
               <a:p>
                 <a:r>
-                  <a:rPr lang="en-US" sz="2200" dirty="0">
+                  <a:rPr lang="en-US" sz="2400" dirty="0">
                     <a:cs typeface="Times New Roman" panose="02020603050405020304" pitchFamily="18" charset="0"/>
                   </a:rPr>
                   <a:t>But are we limited to the control groups we observe?</a:t>
@@ -18430,7 +18438,7 @@
             </p:txBody>
           </p:sp>
         </mc:Choice>
-        <mc:Fallback xmlns="">
+        <mc:Fallback>
           <p:sp>
             <p:nvSpPr>
               <p:cNvPr id="3" name="Content Placeholder 2"/>
@@ -18449,7 +18457,7 @@
               <a:blipFill>
                 <a:blip r:embed="rId3"/>
                 <a:stretch>
-                  <a:fillRect l="-389" t="-1068"/>
+                  <a:fillRect l="-454" t="-1305"/>
                 </a:stretch>
               </a:blipFill>
             </p:spPr>
@@ -18545,8 +18553,8 @@
         </p:nvSpPr>
         <p:spPr>
           <a:xfrm>
-            <a:off x="1219199" y="1066801"/>
-            <a:ext cx="9829801" cy="5141388"/>
+            <a:off x="685801" y="1066801"/>
+            <a:ext cx="10363200" cy="5141388"/>
           </a:xfrm>
         </p:spPr>
         <p:txBody>
@@ -18597,54 +18605,54 @@
           <a:p>
             <a:pPr lvl="1"/>
             <a:r>
-              <a:rPr lang="en-US" sz="2200" dirty="0">
-                <a:solidFill>
-                  <a:srgbClr val="222222"/>
-                </a:solidFill>
-                <a:cs typeface="Times New Roman" panose="02020603050405020304" pitchFamily="18" charset="0"/>
-              </a:rPr>
-              <a:t>These neurons process data in “layered” steps</a:t>
-            </a:r>
-          </a:p>
-          <a:p>
-            <a:pPr lvl="1"/>
-            <a:r>
-              <a:rPr lang="en-US" sz="2200" dirty="0">
-                <a:solidFill>
-                  <a:srgbClr val="222222"/>
-                </a:solidFill>
-                <a:cs typeface="Times New Roman" panose="02020603050405020304" pitchFamily="18" charset="0"/>
-              </a:rPr>
-              <a:t>These layers can be unidirectional (feedforward NN) or circular (feedback NN)</a:t>
-            </a:r>
-          </a:p>
-          <a:p>
-            <a:r>
               <a:rPr lang="en-US" sz="2400" dirty="0">
                 <a:solidFill>
                   <a:srgbClr val="222222"/>
                 </a:solidFill>
                 <a:cs typeface="Times New Roman" panose="02020603050405020304" pitchFamily="18" charset="0"/>
               </a:rPr>
-              <a:t>This means that the hyperparameters needed for NN are much more involved</a:t>
+              <a:t>These neurons process data in “layered” steps</a:t>
             </a:r>
           </a:p>
           <a:p>
             <a:pPr lvl="1"/>
             <a:r>
-              <a:rPr lang="en-US" sz="2200" dirty="0">
+              <a:rPr lang="en-US" sz="2400" dirty="0">
                 <a:solidFill>
                   <a:srgbClr val="222222"/>
                 </a:solidFill>
                 <a:cs typeface="Times New Roman" panose="02020603050405020304" pitchFamily="18" charset="0"/>
               </a:rPr>
+              <a:t>These layers can be unidirectional (feedforward NN) or circular (feedback NN)</a:t>
+            </a:r>
+          </a:p>
+          <a:p>
+            <a:r>
+              <a:rPr lang="en-US" sz="2400" dirty="0">
+                <a:solidFill>
+                  <a:srgbClr val="222222"/>
+                </a:solidFill>
+                <a:cs typeface="Times New Roman" panose="02020603050405020304" pitchFamily="18" charset="0"/>
+              </a:rPr>
+              <a:t>This means that the hyperparameters needed for NN are much more involved</a:t>
+            </a:r>
+          </a:p>
+          <a:p>
+            <a:pPr lvl="1"/>
+            <a:r>
+              <a:rPr lang="en-US" sz="2400" dirty="0">
+                <a:solidFill>
+                  <a:srgbClr val="222222"/>
+                </a:solidFill>
+                <a:cs typeface="Times New Roman" panose="02020603050405020304" pitchFamily="18" charset="0"/>
+              </a:rPr>
               <a:t>Makes training these more of an “art” </a:t>
             </a:r>
           </a:p>
           <a:p>
             <a:pPr lvl="1"/>
             <a:r>
-              <a:rPr lang="en-US" sz="2200" dirty="0">
+              <a:rPr lang="en-US" sz="2400" dirty="0">
                 <a:solidFill>
                   <a:srgbClr val="222222"/>
                 </a:solidFill>
@@ -18781,8 +18789,8 @@
             </p:nvSpPr>
             <p:spPr>
               <a:xfrm>
-                <a:off x="1219199" y="1066801"/>
-                <a:ext cx="9405791" cy="5141388"/>
+                <a:off x="609601" y="1066801"/>
+                <a:ext cx="10015390" cy="5141388"/>
               </a:xfrm>
             </p:spPr>
             <p:txBody>
@@ -18795,7 +18803,7 @@
                   <a:buNone/>
                 </a:pPr>
                 <a:r>
-                  <a:rPr lang="en-US" sz="2200" b="1" dirty="0">
+                  <a:rPr lang="en-US" sz="2400" b="1" dirty="0">
                     <a:cs typeface="Times New Roman" panose="02020603050405020304" pitchFamily="18" charset="0"/>
                   </a:rPr>
                   <a:t>Synthetic Control</a:t>
@@ -18806,7 +18814,7 @@
                   <a:buNone/>
                 </a:pPr>
                 <a:r>
-                  <a:rPr lang="en-US" sz="2200" dirty="0">
+                  <a:rPr lang="en-US" sz="2400" dirty="0">
                     <a:cs typeface="Times New Roman" panose="02020603050405020304" pitchFamily="18" charset="0"/>
                   </a:rPr>
                   <a:t>Constructing adequate control groups using matching on pre-intervention characteristics </a:t>
@@ -18814,7 +18822,7 @@
                 <a14:m>
                   <m:oMath xmlns:m="http://schemas.openxmlformats.org/officeDocument/2006/math">
                     <m:r>
-                      <a:rPr lang="en-US" sz="2200" b="0" i="1" smtClean="0">
+                      <a:rPr lang="en-US" sz="2400" b="0" i="1" smtClean="0">
                         <a:latin typeface="Cambria Math" panose="02040503050406030204" pitchFamily="18" charset="0"/>
                         <a:cs typeface="Times New Roman" panose="02020603050405020304" pitchFamily="18" charset="0"/>
                       </a:rPr>
@@ -18823,7 +18831,7 @@
                   </m:oMath>
                 </a14:m>
                 <a:r>
-                  <a:rPr lang="en-US" sz="2200" dirty="0">
+                  <a:rPr lang="en-US" sz="2400" dirty="0">
                     <a:cs typeface="Times New Roman" panose="02020603050405020304" pitchFamily="18" charset="0"/>
                   </a:rPr>
                   <a:t> better (in some ways) comparisons</a:t>
@@ -18834,21 +18842,10 @@
                   <a:buNone/>
                 </a:pPr>
                 <a:r>
-                  <a:rPr lang="en-US" sz="2200" b="1" dirty="0">
+                  <a:rPr lang="en-US" sz="2400" b="1" dirty="0">
                     <a:cs typeface="Times New Roman" panose="02020603050405020304" pitchFamily="18" charset="0"/>
                   </a:rPr>
                   <a:t>Distributional Effects</a:t>
-                </a:r>
-              </a:p>
-              <a:p>
-                <a:pPr marL="0" indent="0">
-                  <a:buNone/>
-                </a:pPr>
-                <a:r>
-                  <a:rPr lang="en-US" sz="2200" dirty="0">
-                    <a:cs typeface="Times New Roman" panose="02020603050405020304" pitchFamily="18" charset="0"/>
-                  </a:rPr>
-                  <a:t>Lots of ways to estimate distributional effects!</a:t>
                 </a:r>
               </a:p>
               <a:p>
@@ -18857,7 +18854,7 @@
                   <a:buAutoNum type="arabicPeriod"/>
                 </a:pPr>
                 <a:r>
-                  <a:rPr lang="en-US" sz="2200" dirty="0">
+                  <a:rPr lang="en-US" sz="2400" dirty="0">
                     <a:cs typeface="Times New Roman" panose="02020603050405020304" pitchFamily="18" charset="0"/>
                   </a:rPr>
                   <a:t>Quantile Regression</a:t>
@@ -18869,7 +18866,7 @@
                   <a:buAutoNum type="arabicPeriod"/>
                 </a:pPr>
                 <a:r>
-                  <a:rPr lang="en-US" sz="2200" dirty="0">
+                  <a:rPr lang="en-US" sz="2400" dirty="0">
                     <a:cs typeface="Times New Roman" panose="02020603050405020304" pitchFamily="18" charset="0"/>
                   </a:rPr>
                   <a:t>Nonparametric Regression</a:t>
@@ -18878,25 +18875,25 @@
               <a:p>
                 <a:pPr lvl="1"/>
                 <a:r>
-                  <a:rPr lang="en-US" sz="2000" dirty="0">
+                  <a:rPr lang="en-US" sz="2400" dirty="0">
                     <a:cs typeface="Times New Roman" panose="02020603050405020304" pitchFamily="18" charset="0"/>
                   </a:rPr>
                   <a:t>Local polynomial regression / </a:t>
                 </a:r>
                 <a:r>
-                  <a:rPr lang="en-US" sz="2000" dirty="0" err="1">
+                  <a:rPr lang="en-US" sz="2400" dirty="0" err="1">
                     <a:cs typeface="Times New Roman" panose="02020603050405020304" pitchFamily="18" charset="0"/>
                   </a:rPr>
                   <a:t>binscatters</a:t>
                 </a:r>
-                <a:endParaRPr lang="en-US" sz="2000" dirty="0">
+                <a:endParaRPr lang="en-US" sz="2400" dirty="0">
                   <a:cs typeface="Times New Roman" panose="02020603050405020304" pitchFamily="18" charset="0"/>
                 </a:endParaRPr>
               </a:p>
               <a:p>
                 <a:pPr lvl="1"/>
                 <a:r>
-                  <a:rPr lang="en-US" sz="2000" dirty="0">
+                  <a:rPr lang="en-US" sz="2400" dirty="0">
                     <a:cs typeface="Times New Roman" panose="02020603050405020304" pitchFamily="18" charset="0"/>
                   </a:rPr>
                   <a:t>Kernel-weighted regressions</a:t>
@@ -18908,7 +18905,7 @@
                   <a:buAutoNum type="arabicPeriod"/>
                 </a:pPr>
                 <a:r>
-                  <a:rPr lang="en-US" sz="2200" dirty="0">
+                  <a:rPr lang="en-US" sz="2400" dirty="0">
                     <a:cs typeface="Times New Roman" panose="02020603050405020304" pitchFamily="18" charset="0"/>
                   </a:rPr>
                   <a:t>Machine Learning Techniques</a:t>
@@ -18917,7 +18914,7 @@
               <a:p>
                 <a:pPr lvl="1"/>
                 <a:r>
-                  <a:rPr lang="en-US" sz="2000" dirty="0">
+                  <a:rPr lang="en-US" sz="2400" dirty="0">
                     <a:cs typeface="Times New Roman" panose="02020603050405020304" pitchFamily="18" charset="0"/>
                   </a:rPr>
                   <a:t>Random forests</a:t>
@@ -18926,7 +18923,7 @@
               <a:p>
                 <a:pPr lvl="1"/>
                 <a:r>
-                  <a:rPr lang="en-US" sz="2000" dirty="0">
+                  <a:rPr lang="en-US" sz="2400" dirty="0">
                     <a:cs typeface="Times New Roman" panose="02020603050405020304" pitchFamily="18" charset="0"/>
                   </a:rPr>
                   <a:t>Neural networks</a:t>
@@ -18948,13 +18945,13 @@
             </p:nvSpPr>
             <p:spPr>
               <a:xfrm>
-                <a:off x="1219199" y="1066801"/>
-                <a:ext cx="9405791" cy="5141388"/>
+                <a:off x="609601" y="1066801"/>
+                <a:ext cx="10015390" cy="5141388"/>
               </a:xfrm>
               <a:blipFill>
                 <a:blip r:embed="rId3"/>
                 <a:stretch>
-                  <a:fillRect l="-843" t="-1068" b="-4270"/>
+                  <a:fillRect l="-913" t="-1305" b="-2966"/>
                 </a:stretch>
               </a:blipFill>
             </p:spPr>
@@ -19050,8 +19047,8 @@
           </a:p>
         </p:txBody>
       </p:sp>
-      <mc:AlternateContent xmlns:mc="http://schemas.openxmlformats.org/markup-compatibility/2006" xmlns:a14="http://schemas.microsoft.com/office/drawing/2010/main">
-        <mc:Choice Requires="a14">
+      <mc:AlternateContent xmlns:mc="http://schemas.openxmlformats.org/markup-compatibility/2006">
+        <mc:Choice xmlns:a14="http://schemas.microsoft.com/office/drawing/2010/main" Requires="a14">
           <p:sp>
             <p:nvSpPr>
               <p:cNvPr id="3" name="Content Placeholder 2"/>
@@ -19065,7 +19062,7 @@
             <p:spPr>
               <a:xfrm>
                 <a:off x="1219199" y="1066801"/>
-                <a:ext cx="9405791" cy="5141388"/>
+                <a:ext cx="9601201" cy="5141388"/>
               </a:xfrm>
             </p:spPr>
             <p:txBody>
@@ -19075,13 +19072,13 @@
               <a:lstStyle/>
               <a:p>
                 <a:r>
-                  <a:rPr lang="en-US" sz="2200" dirty="0">
+                  <a:rPr lang="en-US" sz="2400" dirty="0">
                     <a:cs typeface="Times New Roman" panose="02020603050405020304" pitchFamily="18" charset="0"/>
                   </a:rPr>
                   <a:t>Typical DID framework is a way to use </a:t>
                 </a:r>
                 <a:r>
-                  <a:rPr lang="en-US" sz="2200" b="1" dirty="0">
+                  <a:rPr lang="en-US" sz="2400" b="1" dirty="0">
                     <a:solidFill>
                       <a:schemeClr val="accent2">
                         <a:lumMod val="75000"/>
@@ -19092,13 +19089,13 @@
                   <a:t>observational data </a:t>
                 </a:r>
                 <a:r>
-                  <a:rPr lang="en-US" sz="2200" dirty="0">
+                  <a:rPr lang="en-US" sz="2400" dirty="0">
                     <a:cs typeface="Times New Roman" panose="02020603050405020304" pitchFamily="18" charset="0"/>
                   </a:rPr>
                   <a:t>to examine </a:t>
                 </a:r>
                 <a:r>
-                  <a:rPr lang="en-US" sz="2200" b="1" dirty="0">
+                  <a:rPr lang="en-US" sz="2400" b="1" dirty="0">
                     <a:solidFill>
                       <a:schemeClr val="accent3">
                         <a:lumMod val="75000"/>
@@ -19111,7 +19108,7 @@
               </a:p>
               <a:p>
                 <a:r>
-                  <a:rPr lang="en-US" sz="2200" dirty="0">
+                  <a:rPr lang="en-US" sz="2400" dirty="0">
                     <a:cs typeface="Times New Roman" panose="02020603050405020304" pitchFamily="18" charset="0"/>
                   </a:rPr>
                   <a:t>We would like to have: </a:t>
@@ -19130,7 +19127,7 @@
                       <m:sSub>
                         <m:sSubPr>
                           <m:ctrlPr>
-                            <a:rPr lang="en-US" sz="2200" b="0" i="1" smtClean="0">
+                            <a:rPr lang="en-US" sz="2400" b="0" i="1" smtClean="0">
                               <a:latin typeface="Cambria Math" panose="02040503050406030204" pitchFamily="18" charset="0"/>
                               <a:cs typeface="Times New Roman" panose="02020603050405020304" pitchFamily="18" charset="0"/>
                             </a:rPr>
@@ -19138,7 +19135,7 @@
                         </m:sSubPr>
                         <m:e>
                           <m:r>
-                            <a:rPr lang="en-US" sz="2200" b="0" i="1" smtClean="0">
+                            <a:rPr lang="en-US" sz="2400" b="0" i="1" smtClean="0">
                               <a:latin typeface="Cambria Math" panose="02040503050406030204" pitchFamily="18" charset="0"/>
                               <a:cs typeface="Times New Roman" panose="02020603050405020304" pitchFamily="18" charset="0"/>
                             </a:rPr>
@@ -19147,7 +19144,7 @@
                         </m:e>
                         <m:sub>
                           <m:r>
-                            <a:rPr lang="en-US" sz="2200" b="0" i="1" smtClean="0">
+                            <a:rPr lang="en-US" sz="2400" b="0" i="1" smtClean="0">
                               <a:latin typeface="Cambria Math" panose="02040503050406030204" pitchFamily="18" charset="0"/>
                               <a:cs typeface="Times New Roman" panose="02020603050405020304" pitchFamily="18" charset="0"/>
                             </a:rPr>
@@ -19156,7 +19153,7 @@
                         </m:sub>
                       </m:sSub>
                       <m:r>
-                        <a:rPr lang="en-US" sz="2200" b="0" i="1" smtClean="0">
+                        <a:rPr lang="en-US" sz="2400" b="0" i="1" smtClean="0">
                           <a:latin typeface="Cambria Math" panose="02040503050406030204" pitchFamily="18" charset="0"/>
                           <a:cs typeface="Times New Roman" panose="02020603050405020304" pitchFamily="18" charset="0"/>
                         </a:rPr>
@@ -19165,7 +19162,7 @@
                       <m:sSubSup>
                         <m:sSubSupPr>
                           <m:ctrlPr>
-                            <a:rPr lang="en-US" sz="2200" b="0" i="1" smtClean="0">
+                            <a:rPr lang="en-US" sz="2400" b="0" i="1" smtClean="0">
                               <a:latin typeface="Cambria Math" panose="02040503050406030204" pitchFamily="18" charset="0"/>
                               <a:cs typeface="Times New Roman" panose="02020603050405020304" pitchFamily="18" charset="0"/>
                             </a:rPr>
@@ -19173,7 +19170,7 @@
                         </m:sSubSupPr>
                         <m:e>
                           <m:r>
-                            <a:rPr lang="en-US" sz="2200" b="0" i="1" smtClean="0">
+                            <a:rPr lang="en-US" sz="2400" b="0" i="1" smtClean="0">
                               <a:latin typeface="Cambria Math" panose="02040503050406030204" pitchFamily="18" charset="0"/>
                               <a:cs typeface="Times New Roman" panose="02020603050405020304" pitchFamily="18" charset="0"/>
                             </a:rPr>
@@ -19182,7 +19179,7 @@
                         </m:e>
                         <m:sub>
                           <m:r>
-                            <a:rPr lang="en-US" sz="2200" b="0" i="1" smtClean="0">
+                            <a:rPr lang="en-US" sz="2400" b="0" i="1" smtClean="0">
                               <a:latin typeface="Cambria Math" panose="02040503050406030204" pitchFamily="18" charset="0"/>
                               <a:cs typeface="Times New Roman" panose="02020603050405020304" pitchFamily="18" charset="0"/>
                             </a:rPr>
@@ -19191,7 +19188,7 @@
                         </m:sub>
                         <m:sup>
                           <m:r>
-                            <a:rPr lang="en-US" sz="2200" b="0" i="1" smtClean="0">
+                            <a:rPr lang="en-US" sz="2400" b="0" i="1" smtClean="0">
                               <a:latin typeface="Cambria Math" panose="02040503050406030204" pitchFamily="18" charset="0"/>
                               <a:cs typeface="Times New Roman" panose="02020603050405020304" pitchFamily="18" charset="0"/>
                             </a:rPr>
@@ -19200,7 +19197,7 @@
                         </m:sup>
                       </m:sSubSup>
                       <m:r>
-                        <a:rPr lang="en-US" sz="2200" b="0" i="1" smtClean="0">
+                        <a:rPr lang="en-US" sz="2400" b="0" i="1" smtClean="0">
                           <a:latin typeface="Cambria Math" panose="02040503050406030204" pitchFamily="18" charset="0"/>
                           <a:cs typeface="Times New Roman" panose="02020603050405020304" pitchFamily="18" charset="0"/>
                         </a:rPr>
@@ -19209,7 +19206,7 @@
                       <m:sSubSup>
                         <m:sSubSupPr>
                           <m:ctrlPr>
-                            <a:rPr lang="en-US" sz="2200" b="0" i="1" smtClean="0">
+                            <a:rPr lang="en-US" sz="2400" b="0" i="1" smtClean="0">
                               <a:latin typeface="Cambria Math" panose="02040503050406030204" pitchFamily="18" charset="0"/>
                               <a:cs typeface="Times New Roman" panose="02020603050405020304" pitchFamily="18" charset="0"/>
                             </a:rPr>
@@ -19217,7 +19214,7 @@
                         </m:sSubSupPr>
                         <m:e>
                           <m:r>
-                            <a:rPr lang="en-US" sz="2200" b="0" i="1" smtClean="0">
+                            <a:rPr lang="en-US" sz="2400" b="0" i="1" smtClean="0">
                               <a:latin typeface="Cambria Math" panose="02040503050406030204" pitchFamily="18" charset="0"/>
                               <a:cs typeface="Times New Roman" panose="02020603050405020304" pitchFamily="18" charset="0"/>
                             </a:rPr>
@@ -19226,7 +19223,7 @@
                         </m:e>
                         <m:sub>
                           <m:r>
-                            <a:rPr lang="en-US" sz="2200" b="0" i="1" smtClean="0">
+                            <a:rPr lang="en-US" sz="2400" b="0" i="1" smtClean="0">
                               <a:latin typeface="Cambria Math" panose="02040503050406030204" pitchFamily="18" charset="0"/>
                               <a:cs typeface="Times New Roman" panose="02020603050405020304" pitchFamily="18" charset="0"/>
                             </a:rPr>
@@ -19235,7 +19232,7 @@
                         </m:sub>
                         <m:sup>
                           <m:r>
-                            <a:rPr lang="en-US" sz="2200" b="0" i="1" smtClean="0">
+                            <a:rPr lang="en-US" sz="2400" b="0" i="1" smtClean="0">
                               <a:latin typeface="Cambria Math" panose="02040503050406030204" pitchFamily="18" charset="0"/>
                               <a:cs typeface="Times New Roman" panose="02020603050405020304" pitchFamily="18" charset="0"/>
                             </a:rPr>
@@ -19246,13 +19243,13 @@
                     </m:oMath>
                   </m:oMathPara>
                 </a14:m>
-                <a:endParaRPr lang="en-US" sz="2200" dirty="0">
+                <a:endParaRPr lang="en-US" sz="2400" dirty="0">
                   <a:cs typeface="Times New Roman" panose="02020603050405020304" pitchFamily="18" charset="0"/>
                 </a:endParaRPr>
               </a:p>
               <a:p>
                 <a:r>
-                  <a:rPr lang="en-US" sz="2200" dirty="0">
+                  <a:rPr lang="en-US" sz="2400" dirty="0">
                     <a:cs typeface="Times New Roman" panose="02020603050405020304" pitchFamily="18" charset="0"/>
                   </a:rPr>
                   <a:t>When </a:t>
@@ -19262,7 +19259,7 @@
                     <m:sSubSup>
                       <m:sSubSupPr>
                         <m:ctrlPr>
-                          <a:rPr lang="en-US" sz="2200" b="0" i="1" smtClean="0">
+                          <a:rPr lang="en-US" sz="2400" b="0" i="1" smtClean="0">
                             <a:latin typeface="Cambria Math" panose="02040503050406030204" pitchFamily="18" charset="0"/>
                             <a:cs typeface="Times New Roman" panose="02020603050405020304" pitchFamily="18" charset="0"/>
                           </a:rPr>
@@ -19270,7 +19267,7 @@
                       </m:sSubSupPr>
                       <m:e>
                         <m:r>
-                          <a:rPr lang="en-US" sz="2200" b="0" i="1" smtClean="0">
+                          <a:rPr lang="en-US" sz="2400" b="0" i="1" smtClean="0">
                             <a:latin typeface="Cambria Math" panose="02040503050406030204" pitchFamily="18" charset="0"/>
                             <a:cs typeface="Times New Roman" panose="02020603050405020304" pitchFamily="18" charset="0"/>
                           </a:rPr>
@@ -19279,7 +19276,7 @@
                       </m:e>
                       <m:sub>
                         <m:r>
-                          <a:rPr lang="en-US" sz="2200" b="0" i="1" smtClean="0">
+                          <a:rPr lang="en-US" sz="2400" b="0" i="1" smtClean="0">
                             <a:latin typeface="Cambria Math" panose="02040503050406030204" pitchFamily="18" charset="0"/>
                             <a:cs typeface="Times New Roman" panose="02020603050405020304" pitchFamily="18" charset="0"/>
                           </a:rPr>
@@ -19288,7 +19285,7 @@
                       </m:sub>
                       <m:sup>
                         <m:r>
-                          <a:rPr lang="en-US" sz="2200" b="0" i="1" smtClean="0">
+                          <a:rPr lang="en-US" sz="2400" b="0" i="1" smtClean="0">
                             <a:latin typeface="Cambria Math" panose="02040503050406030204" pitchFamily="18" charset="0"/>
                             <a:cs typeface="Times New Roman" panose="02020603050405020304" pitchFamily="18" charset="0"/>
                           </a:rPr>
@@ -19299,31 +19296,31 @@
                   </m:oMath>
                 </a14:m>
                 <a:r>
-                  <a:rPr lang="en-US" sz="2200" dirty="0">
+                  <a:rPr lang="en-US" sz="2400" dirty="0">
                     <a:cs typeface="Times New Roman" panose="02020603050405020304" pitchFamily="18" charset="0"/>
                   </a:rPr>
                   <a:t> is unobserved, we </a:t>
                 </a:r>
                 <a:r>
-                  <a:rPr lang="en-US" sz="2200" u="sng" dirty="0">
+                  <a:rPr lang="en-US" sz="2400" u="sng" dirty="0">
                     <a:cs typeface="Times New Roman" panose="02020603050405020304" pitchFamily="18" charset="0"/>
                   </a:rPr>
                   <a:t>proxy it</a:t>
                 </a:r>
                 <a:r>
-                  <a:rPr lang="en-US" sz="2200" b="1" dirty="0">
+                  <a:rPr lang="en-US" sz="2400" b="1" dirty="0">
                     <a:cs typeface="Times New Roman" panose="02020603050405020304" pitchFamily="18" charset="0"/>
                   </a:rPr>
                   <a:t> </a:t>
                 </a:r>
                 <a:r>
-                  <a:rPr lang="en-US" sz="2200" dirty="0">
+                  <a:rPr lang="en-US" sz="2400" dirty="0">
                     <a:cs typeface="Times New Roman" panose="02020603050405020304" pitchFamily="18" charset="0"/>
                   </a:rPr>
                   <a:t>with a </a:t>
                 </a:r>
                 <a:r>
-                  <a:rPr lang="en-US" sz="2200" dirty="0">
+                  <a:rPr lang="en-US" sz="2400" dirty="0">
                     <a:solidFill>
                       <a:schemeClr val="accent2">
                         <a:lumMod val="75000"/>
@@ -19336,7 +19333,7 @@
               </a:p>
               <a:p>
                 <a:r>
-                  <a:rPr lang="en-US" sz="2200" dirty="0">
+                  <a:rPr lang="en-US" sz="2400" dirty="0">
                     <a:cs typeface="Times New Roman" panose="02020603050405020304" pitchFamily="18" charset="0"/>
                   </a:rPr>
                   <a:t>But are we limited to the control groups we observe?</a:t>
@@ -19367,7 +19364,7 @@
               </a:p>
               <a:p>
                 <a:r>
-                  <a:rPr lang="en-US" sz="2200" dirty="0">
+                  <a:rPr lang="en-US" sz="2400" dirty="0">
                     <a:cs typeface="Times New Roman" panose="02020603050405020304" pitchFamily="18" charset="0"/>
                   </a:rPr>
                   <a:t>A suitable counterfactual to treated group</a:t>
@@ -19375,7 +19372,7 @@
               </a:p>
               <a:p>
                 <a:r>
-                  <a:rPr lang="en-US" sz="2200" dirty="0">
+                  <a:rPr lang="en-US" sz="2400" dirty="0">
                     <a:cs typeface="Times New Roman" panose="02020603050405020304" pitchFamily="18" charset="0"/>
                   </a:rPr>
                   <a:t>Think of this as matching + parallel trends assumption </a:t>
@@ -19383,19 +19380,19 @@
               </a:p>
               <a:p>
                 <a:r>
-                  <a:rPr lang="en-US" sz="2200" dirty="0">
+                  <a:rPr lang="en-US" sz="2400" dirty="0">
                     <a:cs typeface="Times New Roman" panose="02020603050405020304" pitchFamily="18" charset="0"/>
                   </a:rPr>
                   <a:t>The weighted average may be a </a:t>
                 </a:r>
                 <a:r>
-                  <a:rPr lang="en-US" sz="2200" b="1" dirty="0">
+                  <a:rPr lang="en-US" sz="2400" b="1" dirty="0">
                     <a:cs typeface="Times New Roman" panose="02020603050405020304" pitchFamily="18" charset="0"/>
                   </a:rPr>
                   <a:t>superior control group </a:t>
                 </a:r>
                 <a:r>
-                  <a:rPr lang="en-US" sz="2200" dirty="0">
+                  <a:rPr lang="en-US" sz="2400" dirty="0">
                     <a:cs typeface="Times New Roman" panose="02020603050405020304" pitchFamily="18" charset="0"/>
                   </a:rPr>
                   <a:t>than any one unit</a:t>
@@ -19409,7 +19406,7 @@
             </p:txBody>
           </p:sp>
         </mc:Choice>
-        <mc:Fallback xmlns="">
+        <mc:Fallback>
           <p:sp>
             <p:nvSpPr>
               <p:cNvPr id="3" name="Content Placeholder 2"/>
@@ -19423,12 +19420,12 @@
             <p:spPr>
               <a:xfrm>
                 <a:off x="1219199" y="1066801"/>
-                <a:ext cx="9405791" cy="5141388"/>
+                <a:ext cx="9601201" cy="5141388"/>
               </a:xfrm>
               <a:blipFill>
                 <a:blip r:embed="rId3"/>
                 <a:stretch>
-                  <a:fillRect l="-972" t="-1068"/>
+                  <a:fillRect l="-952" t="-1305" b="-1186"/>
                 </a:stretch>
               </a:blipFill>
             </p:spPr>
@@ -19535,7 +19532,7 @@
           <a:lstStyle/>
           <a:p>
             <a:r>
-              <a:rPr lang="en-US" sz="2200" dirty="0">
+              <a:rPr lang="en-US" sz="2400" dirty="0">
                 <a:cs typeface="Times New Roman" panose="02020603050405020304" pitchFamily="18" charset="0"/>
               </a:rPr>
               <a:t>Recall Ohio’s vaccine lottery: </a:t>
@@ -19544,7 +19541,7 @@
           <a:p>
             <a:pPr lvl="1"/>
             <a:r>
-              <a:rPr lang="en-US" sz="2000" dirty="0">
+              <a:rPr lang="en-US" sz="2400" dirty="0">
                 <a:cs typeface="Times New Roman" panose="02020603050405020304" pitchFamily="18" charset="0"/>
               </a:rPr>
               <a:t>Million-USD lottery for vaccinated individuals</a:t>
@@ -19553,7 +19550,7 @@
           <a:p>
             <a:pPr lvl="1"/>
             <a:r>
-              <a:rPr lang="en-US" sz="2000" dirty="0">
+              <a:rPr lang="en-US" sz="2400" dirty="0">
                 <a:cs typeface="Times New Roman" panose="02020603050405020304" pitchFamily="18" charset="0"/>
               </a:rPr>
               <a:t>Announced on May 12, 2021</a:t>
@@ -19562,7 +19559,7 @@
           <a:p>
             <a:pPr lvl="1"/>
             <a:r>
-              <a:rPr lang="en-US" sz="2000" dirty="0">
+              <a:rPr lang="en-US" sz="2400" dirty="0">
                 <a:cs typeface="Times New Roman" panose="02020603050405020304" pitchFamily="18" charset="0"/>
               </a:rPr>
               <a:t>Lotteries drawn weekly until June 23, 2021</a:t>
@@ -19570,18 +19567,18 @@
           </a:p>
           <a:p>
             <a:r>
-              <a:rPr lang="en-US" sz="2200" dirty="0">
+              <a:rPr lang="en-US" sz="2400" dirty="0">
                 <a:cs typeface="Times New Roman" panose="02020603050405020304" pitchFamily="18" charset="0"/>
               </a:rPr>
               <a:t>Main question: </a:t>
             </a:r>
             <a:r>
-              <a:rPr lang="en-US" sz="2200" b="1" dirty="0">
+              <a:rPr lang="en-US" sz="2400" b="1" dirty="0">
                 <a:cs typeface="Times New Roman" panose="02020603050405020304" pitchFamily="18" charset="0"/>
               </a:rPr>
               <a:t>what is the effect of this lottery on vaccination rates?</a:t>
             </a:r>
-            <a:endParaRPr lang="en-US" sz="2200" dirty="0">
+            <a:endParaRPr lang="en-US" sz="2400" dirty="0">
               <a:cs typeface="Times New Roman" panose="02020603050405020304" pitchFamily="18" charset="0"/>
             </a:endParaRPr>
           </a:p>
@@ -19675,7 +19672,7 @@
           <a:lstStyle/>
           <a:p>
             <a:r>
-              <a:rPr lang="en-US" sz="2200" dirty="0">
+              <a:rPr lang="en-US" sz="2400" dirty="0">
                 <a:cs typeface="Times New Roman" panose="02020603050405020304" pitchFamily="18" charset="0"/>
               </a:rPr>
               <a:t>Recall Ohio’s vaccine lottery: </a:t>
@@ -19684,7 +19681,7 @@
           <a:p>
             <a:pPr lvl="1"/>
             <a:r>
-              <a:rPr lang="en-US" sz="2000" dirty="0">
+              <a:rPr lang="en-US" sz="2400" dirty="0">
                 <a:cs typeface="Times New Roman" panose="02020603050405020304" pitchFamily="18" charset="0"/>
               </a:rPr>
               <a:t>Million-USD lottery for vaccinated individuals</a:t>
@@ -19693,7 +19690,7 @@
           <a:p>
             <a:pPr lvl="1"/>
             <a:r>
-              <a:rPr lang="en-US" sz="2000" dirty="0">
+              <a:rPr lang="en-US" sz="2400" dirty="0">
                 <a:cs typeface="Times New Roman" panose="02020603050405020304" pitchFamily="18" charset="0"/>
               </a:rPr>
               <a:t>Announced on May 12, 2021</a:t>
@@ -19702,7 +19699,7 @@
           <a:p>
             <a:pPr lvl="1"/>
             <a:r>
-              <a:rPr lang="en-US" sz="2000" dirty="0">
+              <a:rPr lang="en-US" sz="2400" dirty="0">
                 <a:cs typeface="Times New Roman" panose="02020603050405020304" pitchFamily="18" charset="0"/>
               </a:rPr>
               <a:t>Lotteries drawn weekly until June 23, 2021</a:t>
@@ -19710,13 +19707,13 @@
           </a:p>
           <a:p>
             <a:r>
-              <a:rPr lang="en-US" sz="2200" dirty="0">
+              <a:rPr lang="en-US" sz="2400" dirty="0">
                 <a:cs typeface="Times New Roman" panose="02020603050405020304" pitchFamily="18" charset="0"/>
               </a:rPr>
               <a:t>Main question: </a:t>
             </a:r>
             <a:r>
-              <a:rPr lang="en-US" sz="2200" b="1" dirty="0">
+              <a:rPr lang="en-US" sz="2400" b="1" dirty="0">
                 <a:cs typeface="Times New Roman" panose="02020603050405020304" pitchFamily="18" charset="0"/>
               </a:rPr>
               <a:t>what is the effect of this lottery on vaccination rates?</a:t>
@@ -19724,13 +19721,13 @@
           </a:p>
           <a:p>
             <a:r>
-              <a:rPr lang="en-US" sz="2200" b="1" dirty="0">
+              <a:rPr lang="en-US" sz="2400" b="1" dirty="0">
                 <a:cs typeface="Times New Roman" panose="02020603050405020304" pitchFamily="18" charset="0"/>
               </a:rPr>
               <a:t>Main problem: </a:t>
             </a:r>
             <a:r>
-              <a:rPr lang="en-US" sz="2200" dirty="0">
+              <a:rPr lang="en-US" sz="2400" dirty="0">
                 <a:cs typeface="Times New Roman" panose="02020603050405020304" pitchFamily="18" charset="0"/>
               </a:rPr>
               <a:t>which state should we use as Ohio’s potential outcome? </a:t>
@@ -19739,7 +19736,7 @@
           <a:p>
             <a:pPr lvl="1"/>
             <a:r>
-              <a:rPr lang="en-US" sz="2000" dirty="0">
+              <a:rPr lang="en-US" sz="2400" dirty="0">
                 <a:cs typeface="Times New Roman" panose="02020603050405020304" pitchFamily="18" charset="0"/>
               </a:rPr>
               <a:t>Neighboring states? </a:t>
@@ -19748,7 +19745,7 @@
           <a:p>
             <a:pPr lvl="1"/>
             <a:r>
-              <a:rPr lang="en-US" sz="2000" dirty="0">
+              <a:rPr lang="en-US" sz="2400" dirty="0">
                 <a:cs typeface="Times New Roman" panose="02020603050405020304" pitchFamily="18" charset="0"/>
               </a:rPr>
               <a:t>Full US? </a:t>
@@ -19778,7 +19775,7 @@
             <a:pPr marL="0" indent="0">
               <a:buNone/>
             </a:pPr>
-            <a:endParaRPr lang="en-US" sz="2200" dirty="0">
+            <a:endParaRPr lang="en-US" sz="2400" dirty="0">
               <a:cs typeface="Times New Roman" panose="02020603050405020304" pitchFamily="18" charset="0"/>
             </a:endParaRPr>
           </a:p>
@@ -19984,8 +19981,8 @@
         </p:nvSpPr>
         <p:spPr>
           <a:xfrm>
-            <a:off x="1219199" y="1066801"/>
-            <a:ext cx="9405791" cy="5141388"/>
+            <a:off x="609601" y="1066801"/>
+            <a:ext cx="10210800" cy="5141388"/>
           </a:xfrm>
         </p:spPr>
         <p:txBody>
@@ -19995,13 +19992,13 @@
           <a:lstStyle/>
           <a:p>
             <a:r>
-              <a:rPr lang="en-US" sz="2200" dirty="0">
+              <a:rPr lang="en-US" sz="2400" dirty="0">
                 <a:cs typeface="Times New Roman" panose="02020603050405020304" pitchFamily="18" charset="0"/>
               </a:rPr>
               <a:t>To get around the problem: </a:t>
             </a:r>
             <a:r>
-              <a:rPr lang="en-US" sz="2200" b="1" dirty="0">
+              <a:rPr lang="en-US" sz="2400" b="1" dirty="0">
                 <a:cs typeface="Times New Roman" panose="02020603050405020304" pitchFamily="18" charset="0"/>
               </a:rPr>
               <a:t>throw in the kitchen sink!</a:t>
@@ -20009,7 +20006,7 @@
           </a:p>
           <a:p>
             <a:r>
-              <a:rPr lang="en-US" sz="2200" dirty="0">
+              <a:rPr lang="en-US" sz="2400" dirty="0">
                 <a:cs typeface="Times New Roman" panose="02020603050405020304" pitchFamily="18" charset="0"/>
               </a:rPr>
               <a:t>Main advantage: data-driven way to construct weighted average </a:t>
@@ -20018,7 +20015,7 @@
           <a:p>
             <a:pPr lvl="1"/>
             <a:r>
-              <a:rPr lang="en-US" sz="2000" dirty="0">
+              <a:rPr lang="en-US" sz="2400" dirty="0">
                 <a:cs typeface="Times New Roman" panose="02020603050405020304" pitchFamily="18" charset="0"/>
               </a:rPr>
               <a:t>Researcher doesn’t choose weights</a:t>
@@ -20026,7 +20023,7 @@
           </a:p>
           <a:p>
             <a:r>
-              <a:rPr lang="en-US" sz="2200" dirty="0">
+              <a:rPr lang="en-US" sz="2400" dirty="0">
                 <a:cs typeface="Times New Roman" panose="02020603050405020304" pitchFamily="18" charset="0"/>
               </a:rPr>
               <a:t>Researcher chooses: </a:t>
@@ -20038,13 +20035,13 @@
               <a:buAutoNum type="arabicPeriod"/>
             </a:pPr>
             <a:r>
-              <a:rPr lang="en-US" sz="2000" b="1" dirty="0">
+              <a:rPr lang="en-US" sz="2400" b="1" dirty="0">
                 <a:cs typeface="Times New Roman" panose="02020603050405020304" pitchFamily="18" charset="0"/>
               </a:rPr>
               <a:t>Donor pool</a:t>
             </a:r>
             <a:r>
-              <a:rPr lang="en-US" sz="2000" dirty="0">
+              <a:rPr lang="en-US" sz="2400" dirty="0">
                 <a:cs typeface="Times New Roman" panose="02020603050405020304" pitchFamily="18" charset="0"/>
               </a:rPr>
               <a:t>: possible states for control group (algorithm may assign weight 0)</a:t>
@@ -20056,13 +20053,13 @@
               <a:buAutoNum type="arabicPeriod"/>
             </a:pPr>
             <a:r>
-              <a:rPr lang="en-US" sz="2000" b="1" dirty="0">
+              <a:rPr lang="en-US" sz="2400" b="1" dirty="0">
                 <a:cs typeface="Times New Roman" panose="02020603050405020304" pitchFamily="18" charset="0"/>
               </a:rPr>
               <a:t>Matching variables: </a:t>
             </a:r>
             <a:r>
-              <a:rPr lang="en-US" sz="2000" dirty="0">
+              <a:rPr lang="en-US" sz="2400" dirty="0">
                 <a:cs typeface="Times New Roman" panose="02020603050405020304" pitchFamily="18" charset="0"/>
               </a:rPr>
               <a:t>should include pre-treatment trends + any other covariates</a:t>
@@ -20073,7 +20070,7 @@
               <a:buFont typeface="+mj-lt"/>
               <a:buAutoNum type="arabicPeriod"/>
             </a:pPr>
-            <a:endParaRPr lang="en-US" sz="2000" dirty="0">
+            <a:endParaRPr lang="en-US" sz="2400" dirty="0">
               <a:cs typeface="Times New Roman" panose="02020603050405020304" pitchFamily="18" charset="0"/>
             </a:endParaRPr>
           </a:p>

</xml_diff>

<commit_message>
Lecture 11: first pass
</commit_message>
<xml_diff>
--- a/Lecture10_SyntheticControl_QuantileRegression/Lecture10_SyntheticControl_QuantileRegression.pptx
+++ b/Lecture10_SyntheticControl_QuantileRegression/Lecture10_SyntheticControl_QuantileRegression.pptx
@@ -5,7 +5,7 @@
     <p:sldMasterId id="2147483738" r:id="rId1"/>
   </p:sldMasterIdLst>
   <p:notesMasterIdLst>
-    <p:notesMasterId r:id="rId43"/>
+    <p:notesMasterId r:id="rId44"/>
   </p:notesMasterIdLst>
   <p:sldIdLst>
     <p:sldId id="256" r:id="rId2"/>
@@ -35,20 +35,21 @@
     <p:sldId id="616" r:id="rId26"/>
     <p:sldId id="615" r:id="rId27"/>
     <p:sldId id="617" r:id="rId28"/>
-    <p:sldId id="618" r:id="rId29"/>
-    <p:sldId id="619" r:id="rId30"/>
-    <p:sldId id="620" r:id="rId31"/>
-    <p:sldId id="622" r:id="rId32"/>
-    <p:sldId id="624" r:id="rId33"/>
-    <p:sldId id="625" r:id="rId34"/>
-    <p:sldId id="629" r:id="rId35"/>
-    <p:sldId id="630" r:id="rId36"/>
-    <p:sldId id="628" r:id="rId37"/>
-    <p:sldId id="626" r:id="rId38"/>
-    <p:sldId id="627" r:id="rId39"/>
-    <p:sldId id="631" r:id="rId40"/>
-    <p:sldId id="632" r:id="rId41"/>
-    <p:sldId id="586" r:id="rId42"/>
+    <p:sldId id="633" r:id="rId29"/>
+    <p:sldId id="618" r:id="rId30"/>
+    <p:sldId id="619" r:id="rId31"/>
+    <p:sldId id="620" r:id="rId32"/>
+    <p:sldId id="622" r:id="rId33"/>
+    <p:sldId id="624" r:id="rId34"/>
+    <p:sldId id="625" r:id="rId35"/>
+    <p:sldId id="629" r:id="rId36"/>
+    <p:sldId id="630" r:id="rId37"/>
+    <p:sldId id="628" r:id="rId38"/>
+    <p:sldId id="626" r:id="rId39"/>
+    <p:sldId id="627" r:id="rId40"/>
+    <p:sldId id="631" r:id="rId41"/>
+    <p:sldId id="632" r:id="rId42"/>
+    <p:sldId id="586" r:id="rId43"/>
   </p:sldIdLst>
   <p:sldSz cx="12192000" cy="6858000"/>
   <p:notesSz cx="7010400" cy="9296400"/>
@@ -2241,7 +2242,7 @@
           <a:p>
             <a:r>
               <a:rPr lang="en-US" dirty="0"/>
-              <a:t>This targets the conditional mean by setting beta to minimize the average deviations from the regression line (sum of squared errors)</a:t>
+              <a:t>This targets the conditional mean by setting beta to minimize the average deviations from the regression line (sum of squared errors). Note graph shows homogenous impact across a distribution (e.g., education and income)</a:t>
             </a:r>
           </a:p>
         </p:txBody>
@@ -2328,15 +2329,7 @@
           <a:p>
             <a:r>
               <a:rPr lang="en-US" dirty="0"/>
-              <a:t>Quantile: splits the distribution into the bottom tau% and the remainder of the distribution. Quantiles and percentiles are codefined; the median, for example, is the 50</a:t>
-            </a:r>
-            <a:r>
-              <a:rPr lang="en-US" baseline="30000" dirty="0"/>
-              <a:t>th</a:t>
-            </a:r>
-            <a:r>
-              <a:rPr lang="en-US" dirty="0"/>
-              <a:t> percentile. So targeting a quantile lets you target any point in a distribution. </a:t>
+              <a:t>What if effect differs across distribution? </a:t>
             </a:r>
           </a:p>
         </p:txBody>
@@ -2367,7 +2360,7 @@
     </p:spTree>
     <p:extLst>
       <p:ext uri="{BB962C8B-B14F-4D97-AF65-F5344CB8AC3E}">
-        <p14:creationId xmlns:p14="http://schemas.microsoft.com/office/powerpoint/2010/main" val="1631310871"/>
+        <p14:creationId xmlns:p14="http://schemas.microsoft.com/office/powerpoint/2010/main" val="1818158558"/>
       </p:ext>
     </p:extLst>
   </p:cSld>
@@ -2423,7 +2416,15 @@
           <a:p>
             <a:r>
               <a:rPr lang="en-US" dirty="0"/>
-              <a:t>LAD = least absolute deviation. How is this different than the traditional OLS? </a:t>
+              <a:t>Quantile: splits the distribution into the bottom tau% and the remainder of the distribution. Quantiles and percentiles are codefined; the median, for example, is the 50</a:t>
+            </a:r>
+            <a:r>
+              <a:rPr lang="en-US" baseline="30000" dirty="0"/>
+              <a:t>th</a:t>
+            </a:r>
+            <a:r>
+              <a:rPr lang="en-US" dirty="0"/>
+              <a:t> percentile. So targeting a quantile lets you target any point in a distribution. </a:t>
             </a:r>
           </a:p>
         </p:txBody>
@@ -2454,7 +2455,7 @@
     </p:spTree>
     <p:extLst>
       <p:ext uri="{BB962C8B-B14F-4D97-AF65-F5344CB8AC3E}">
-        <p14:creationId xmlns:p14="http://schemas.microsoft.com/office/powerpoint/2010/main" val="1763450857"/>
+        <p14:creationId xmlns:p14="http://schemas.microsoft.com/office/powerpoint/2010/main" val="1631310871"/>
       </p:ext>
     </p:extLst>
   </p:cSld>
@@ -2510,7 +2511,15 @@
           <a:p>
             <a:r>
               <a:rPr lang="en-US" dirty="0"/>
-              <a:t>This in the brackets is called the “check function” that sorts observations into above/below a sample quantile. </a:t>
+              <a:t>LAD = least absolute deviation. How is this different than the traditional OLS? Median regression is actually older than OLS! (</a:t>
+            </a:r>
+            <a:r>
+              <a:rPr lang="en-US" dirty="0" err="1"/>
+              <a:t>Boscovitch</a:t>
+            </a:r>
+            <a:r>
+              <a:rPr lang="en-US" dirty="0"/>
+              <a:t> 1760; OLS in 1789 by Laplace)</a:t>
             </a:r>
           </a:p>
         </p:txBody>
@@ -2541,7 +2550,7 @@
     </p:spTree>
     <p:extLst>
       <p:ext uri="{BB962C8B-B14F-4D97-AF65-F5344CB8AC3E}">
-        <p14:creationId xmlns:p14="http://schemas.microsoft.com/office/powerpoint/2010/main" val="1652781160"/>
+        <p14:creationId xmlns:p14="http://schemas.microsoft.com/office/powerpoint/2010/main" val="1763450857"/>
       </p:ext>
     </p:extLst>
   </p:cSld>
@@ -2682,7 +2691,10 @@
           <a:bodyPr/>
           <a:lstStyle/>
           <a:p>
-            <a:endParaRPr lang="en-US" dirty="0"/>
+            <a:r>
+              <a:rPr lang="en-US" dirty="0"/>
+              <a:t>This in the brackets is called the “check function” that sorts observations into above/below a sample quantile. </a:t>
+            </a:r>
           </a:p>
         </p:txBody>
       </p:sp>
@@ -2712,7 +2724,7 @@
     </p:spTree>
     <p:extLst>
       <p:ext uri="{BB962C8B-B14F-4D97-AF65-F5344CB8AC3E}">
-        <p14:creationId xmlns:p14="http://schemas.microsoft.com/office/powerpoint/2010/main" val="1520615147"/>
+        <p14:creationId xmlns:p14="http://schemas.microsoft.com/office/powerpoint/2010/main" val="1652781160"/>
       </p:ext>
     </p:extLst>
   </p:cSld>
@@ -2768,39 +2780,8 @@
           <a:p>
             <a:r>
               <a:rPr lang="en-US" dirty="0"/>
-              <a:t>Note that </a:t>
-            </a:r>
-            <a:r>
-              <a:rPr lang="en-US" b="0" i="0" dirty="0">
-                <a:solidFill>
-                  <a:srgbClr val="002A5C"/>
-                </a:solidFill>
-                <a:effectLst/>
-                <a:latin typeface="Graphik @FontFace"/>
-              </a:rPr>
-              <a:t>Zahra </a:t>
-            </a:r>
-            <a:r>
-              <a:rPr lang="en-US" b="0" i="0" dirty="0" err="1">
-                <a:solidFill>
-                  <a:srgbClr val="002A5C"/>
-                </a:solidFill>
-                <a:effectLst/>
-                <a:latin typeface="Graphik @FontFace"/>
-              </a:rPr>
-              <a:t>Shakeri</a:t>
-            </a:r>
-            <a:r>
-              <a:rPr lang="en-US" b="0" i="0" dirty="0">
-                <a:solidFill>
-                  <a:srgbClr val="002A5C"/>
-                </a:solidFill>
-                <a:effectLst/>
-                <a:latin typeface="Graphik @FontFace"/>
-              </a:rPr>
-              <a:t> is developing machine learning and data visualization courses for IHPME; I highly recommend looking into these and / or reaching out to her if you are interested in some of these methods. </a:t>
-            </a:r>
-            <a:endParaRPr lang="en-US" dirty="0"/>
+              <a:t>Technically, this interpretation requires a rank invariance condition (e.g., if you give everyone treatment, the ordering of individuals will stay the same). </a:t>
+            </a:r>
           </a:p>
         </p:txBody>
       </p:sp>
@@ -2830,7 +2811,7 @@
     </p:spTree>
     <p:extLst>
       <p:ext uri="{BB962C8B-B14F-4D97-AF65-F5344CB8AC3E}">
-        <p14:creationId xmlns:p14="http://schemas.microsoft.com/office/powerpoint/2010/main" val="3185086095"/>
+        <p14:creationId xmlns:p14="http://schemas.microsoft.com/office/powerpoint/2010/main" val="1520615147"/>
       </p:ext>
     </p:extLst>
   </p:cSld>
@@ -2886,16 +2867,39 @@
           <a:p>
             <a:r>
               <a:rPr lang="en-US" dirty="0"/>
-              <a:t>Goal: functional form with no restrictions on what f() looks like (i.e., not linear). I did add some notes on nonparametric regression to the </a:t>
-            </a:r>
-            <a:r>
-              <a:rPr lang="en-US" dirty="0" err="1"/>
-              <a:t>Github</a:t>
-            </a:r>
-            <a:r>
-              <a:rPr lang="en-US" dirty="0"/>
-              <a:t>, but there are whole textbooks you can use. </a:t>
-            </a:r>
+              <a:t>Note that </a:t>
+            </a:r>
+            <a:r>
+              <a:rPr lang="en-US" b="0" i="0" dirty="0">
+                <a:solidFill>
+                  <a:srgbClr val="002A5C"/>
+                </a:solidFill>
+                <a:effectLst/>
+                <a:latin typeface="Graphik @FontFace"/>
+              </a:rPr>
+              <a:t>Zahra </a:t>
+            </a:r>
+            <a:r>
+              <a:rPr lang="en-US" b="0" i="0" dirty="0" err="1">
+                <a:solidFill>
+                  <a:srgbClr val="002A5C"/>
+                </a:solidFill>
+                <a:effectLst/>
+                <a:latin typeface="Graphik @FontFace"/>
+              </a:rPr>
+              <a:t>Shakeri</a:t>
+            </a:r>
+            <a:r>
+              <a:rPr lang="en-US" b="0" i="0" dirty="0">
+                <a:solidFill>
+                  <a:srgbClr val="002A5C"/>
+                </a:solidFill>
+                <a:effectLst/>
+                <a:latin typeface="Graphik @FontFace"/>
+              </a:rPr>
+              <a:t> is developing machine learning and data visualization courses for IHPME; I highly recommend looking into these and / or reaching out to her if you are interested in some of these methods. </a:t>
+            </a:r>
+            <a:endParaRPr lang="en-US" dirty="0"/>
           </a:p>
         </p:txBody>
       </p:sp>
@@ -2925,7 +2929,7 @@
     </p:spTree>
     <p:extLst>
       <p:ext uri="{BB962C8B-B14F-4D97-AF65-F5344CB8AC3E}">
-        <p14:creationId xmlns:p14="http://schemas.microsoft.com/office/powerpoint/2010/main" val="3238735277"/>
+        <p14:creationId xmlns:p14="http://schemas.microsoft.com/office/powerpoint/2010/main" val="3185086095"/>
       </p:ext>
     </p:extLst>
   </p:cSld>
@@ -2981,7 +2985,15 @@
           <a:p>
             <a:r>
               <a:rPr lang="en-US" dirty="0"/>
-              <a:t>Note: lots of choices for nonparametric regression! Could be its own course. On (1) note that this is the bias-variance tradeoff; (2) is the choice of kernel; and (3) is the curse of dimensionality</a:t>
+              <a:t>Goal: functional form with no restrictions on what f() looks like (i.e., not linear). I did add some notes on nonparametric regression to the </a:t>
+            </a:r>
+            <a:r>
+              <a:rPr lang="en-US" dirty="0" err="1"/>
+              <a:t>Github</a:t>
+            </a:r>
+            <a:r>
+              <a:rPr lang="en-US" dirty="0"/>
+              <a:t>, but there are whole textbooks you can use. </a:t>
             </a:r>
           </a:p>
         </p:txBody>
@@ -3012,7 +3024,7 @@
     </p:spTree>
     <p:extLst>
       <p:ext uri="{BB962C8B-B14F-4D97-AF65-F5344CB8AC3E}">
-        <p14:creationId xmlns:p14="http://schemas.microsoft.com/office/powerpoint/2010/main" val="760652552"/>
+        <p14:creationId xmlns:p14="http://schemas.microsoft.com/office/powerpoint/2010/main" val="3238735277"/>
       </p:ext>
     </p:extLst>
   </p:cSld>
@@ -3068,7 +3080,7 @@
           <a:p>
             <a:r>
               <a:rPr lang="en-US" dirty="0"/>
-              <a:t>The focal point varies across bins. </a:t>
+              <a:t>Note: lots of choices for nonparametric regression! Could be its own course. On (1) note that this is the bias-variance tradeoff; (2) is the choice of kernel; and (3) is the curse of dimensionality</a:t>
             </a:r>
           </a:p>
         </p:txBody>
@@ -3099,7 +3111,7 @@
     </p:spTree>
     <p:extLst>
       <p:ext uri="{BB962C8B-B14F-4D97-AF65-F5344CB8AC3E}">
-        <p14:creationId xmlns:p14="http://schemas.microsoft.com/office/powerpoint/2010/main" val="964766668"/>
+        <p14:creationId xmlns:p14="http://schemas.microsoft.com/office/powerpoint/2010/main" val="760652552"/>
       </p:ext>
     </p:extLst>
   </p:cSld>
@@ -3155,7 +3167,7 @@
           <a:p>
             <a:r>
               <a:rPr lang="en-US" dirty="0"/>
-              <a:t>Goal: functional form with no restrictions on what f() looks like (i.e., not linear)</a:t>
+              <a:t>The focal point varies across bins. </a:t>
             </a:r>
           </a:p>
         </p:txBody>
@@ -3186,7 +3198,7 @@
     </p:spTree>
     <p:extLst>
       <p:ext uri="{BB962C8B-B14F-4D97-AF65-F5344CB8AC3E}">
-        <p14:creationId xmlns:p14="http://schemas.microsoft.com/office/powerpoint/2010/main" val="1044557314"/>
+        <p14:creationId xmlns:p14="http://schemas.microsoft.com/office/powerpoint/2010/main" val="964766668"/>
       </p:ext>
     </p:extLst>
   </p:cSld>
@@ -3242,17 +3254,8 @@
           <a:p>
             <a:r>
               <a:rPr lang="en-US" dirty="0"/>
-              <a:t>Note: there isn’t much difference between CDE and nonparametric regression – we are looking either for prediction of y given x (moments) or functional form F(x), but those are obviously intertwined. The difference is that there are additional </a:t>
-            </a:r>
-            <a:r>
-              <a:rPr lang="en-US" b="1" dirty="0"/>
-              <a:t>methods </a:t>
-            </a:r>
-            <a:r>
-              <a:rPr lang="en-US" b="0" dirty="0"/>
-              <a:t>in this literature that are useful. </a:t>
-            </a:r>
-            <a:endParaRPr lang="en-US" dirty="0"/>
+              <a:t>Goal: functional form with no restrictions on what f() looks like (i.e., not linear)</a:t>
+            </a:r>
           </a:p>
         </p:txBody>
       </p:sp>
@@ -3282,7 +3285,7 @@
     </p:spTree>
     <p:extLst>
       <p:ext uri="{BB962C8B-B14F-4D97-AF65-F5344CB8AC3E}">
-        <p14:creationId xmlns:p14="http://schemas.microsoft.com/office/powerpoint/2010/main" val="1506519752"/>
+        <p14:creationId xmlns:p14="http://schemas.microsoft.com/office/powerpoint/2010/main" val="1044557314"/>
       </p:ext>
     </p:extLst>
   </p:cSld>
@@ -3336,6 +3339,18 @@
           <a:bodyPr/>
           <a:lstStyle/>
           <a:p>
+            <a:r>
+              <a:rPr lang="en-US" dirty="0"/>
+              <a:t>Note: there isn’t much difference between CDE and nonparametric regression – we are looking either for prediction of y given x (moments) or functional form F(x), but those are obviously intertwined. The difference is that there are additional </a:t>
+            </a:r>
+            <a:r>
+              <a:rPr lang="en-US" b="1" dirty="0"/>
+              <a:t>methods </a:t>
+            </a:r>
+            <a:r>
+              <a:rPr lang="en-US" b="0" dirty="0"/>
+              <a:t>in this literature that are useful. </a:t>
+            </a:r>
             <a:endParaRPr lang="en-US" dirty="0"/>
           </a:p>
         </p:txBody>
@@ -3366,7 +3381,7 @@
     </p:spTree>
     <p:extLst>
       <p:ext uri="{BB962C8B-B14F-4D97-AF65-F5344CB8AC3E}">
-        <p14:creationId xmlns:p14="http://schemas.microsoft.com/office/powerpoint/2010/main" val="717166347"/>
+        <p14:creationId xmlns:p14="http://schemas.microsoft.com/office/powerpoint/2010/main" val="1506519752"/>
       </p:ext>
     </p:extLst>
   </p:cSld>
@@ -3420,10 +3435,7 @@
           <a:bodyPr/>
           <a:lstStyle/>
           <a:p>
-            <a:r>
-              <a:rPr lang="en-US" dirty="0"/>
-              <a:t>Cut-points – rules for how to bin data in order to assign prediction (e.g., if we’re predicting expenses, at what age do expenses go down (2?) and then up again (50?). Once we’ve done that cut, what’s the next best way to cut – by sex (older men versus older women)? And so on.)</a:t>
-            </a:r>
+            <a:endParaRPr lang="en-US" dirty="0"/>
           </a:p>
         </p:txBody>
       </p:sp>
@@ -3453,7 +3465,7 @@
     </p:spTree>
     <p:extLst>
       <p:ext uri="{BB962C8B-B14F-4D97-AF65-F5344CB8AC3E}">
-        <p14:creationId xmlns:p14="http://schemas.microsoft.com/office/powerpoint/2010/main" val="2040611805"/>
+        <p14:creationId xmlns:p14="http://schemas.microsoft.com/office/powerpoint/2010/main" val="717166347"/>
       </p:ext>
     </p:extLst>
   </p:cSld>
@@ -3509,7 +3521,7 @@
           <a:p>
             <a:r>
               <a:rPr lang="en-US" dirty="0"/>
-              <a:t>Neurons are similar to trees</a:t>
+              <a:t>Cut-points – rules for how to bin data in order to assign prediction (e.g., if we’re predicting expenses, at what age do expenses go down (2?) and then up again (50?). Once we’ve done that cut, what’s the next best way to cut – by sex (older men versus older women)? And so on.)</a:t>
             </a:r>
           </a:p>
         </p:txBody>
@@ -3540,7 +3552,7 @@
     </p:spTree>
     <p:extLst>
       <p:ext uri="{BB962C8B-B14F-4D97-AF65-F5344CB8AC3E}">
-        <p14:creationId xmlns:p14="http://schemas.microsoft.com/office/powerpoint/2010/main" val="817311110"/>
+        <p14:creationId xmlns:p14="http://schemas.microsoft.com/office/powerpoint/2010/main" val="2040611805"/>
       </p:ext>
     </p:extLst>
   </p:cSld>
@@ -3678,6 +3690,93 @@
           <a:bodyPr/>
           <a:lstStyle/>
           <a:p>
+            <a:r>
+              <a:rPr lang="en-US" dirty="0"/>
+              <a:t>Neurons are similar to trees</a:t>
+            </a:r>
+          </a:p>
+        </p:txBody>
+      </p:sp>
+      <p:sp>
+        <p:nvSpPr>
+          <p:cNvPr id="4" name="Slide Number Placeholder 3"/>
+          <p:cNvSpPr>
+            <a:spLocks noGrp="1"/>
+          </p:cNvSpPr>
+          <p:nvPr>
+            <p:ph type="sldNum" sz="quarter" idx="5"/>
+          </p:nvPr>
+        </p:nvSpPr>
+        <p:spPr/>
+        <p:txBody>
+          <a:bodyPr/>
+          <a:lstStyle/>
+          <a:p>
+            <a:fld id="{4AF79E1B-2C51-4B9B-8EA4-26DE9E345AFF}" type="slidenum">
+              <a:rPr lang="en-US" smtClean="0"/>
+              <a:t>41</a:t>
+            </a:fld>
+            <a:endParaRPr lang="en-US"/>
+          </a:p>
+        </p:txBody>
+      </p:sp>
+    </p:spTree>
+    <p:extLst>
+      <p:ext uri="{BB962C8B-B14F-4D97-AF65-F5344CB8AC3E}">
+        <p14:creationId xmlns:p14="http://schemas.microsoft.com/office/powerpoint/2010/main" val="817311110"/>
+      </p:ext>
+    </p:extLst>
+  </p:cSld>
+  <p:clrMapOvr>
+    <a:masterClrMapping/>
+  </p:clrMapOvr>
+</p:notes>
+</file>
+
+<file path=ppt/notesSlides/notesSlide41.xml><?xml version="1.0" encoding="utf-8"?>
+<p:notes xmlns:a="http://schemas.openxmlformats.org/drawingml/2006/main" xmlns:r="http://schemas.openxmlformats.org/officeDocument/2006/relationships" xmlns:p="http://schemas.openxmlformats.org/presentationml/2006/main">
+  <p:cSld>
+    <p:spTree>
+      <p:nvGrpSpPr>
+        <p:cNvPr id="1" name=""/>
+        <p:cNvGrpSpPr/>
+        <p:nvPr/>
+      </p:nvGrpSpPr>
+      <p:grpSpPr>
+        <a:xfrm>
+          <a:off x="0" y="0"/>
+          <a:ext cx="0" cy="0"/>
+          <a:chOff x="0" y="0"/>
+          <a:chExt cx="0" cy="0"/>
+        </a:xfrm>
+      </p:grpSpPr>
+      <p:sp>
+        <p:nvSpPr>
+          <p:cNvPr id="2" name="Slide Image Placeholder 1"/>
+          <p:cNvSpPr>
+            <a:spLocks noGrp="1" noRot="1" noChangeAspect="1"/>
+          </p:cNvSpPr>
+          <p:nvPr>
+            <p:ph type="sldImg"/>
+          </p:nvPr>
+        </p:nvSpPr>
+        <p:spPr/>
+      </p:sp>
+      <p:sp>
+        <p:nvSpPr>
+          <p:cNvPr id="3" name="Notes Placeholder 2"/>
+          <p:cNvSpPr>
+            <a:spLocks noGrp="1"/>
+          </p:cNvSpPr>
+          <p:nvPr>
+            <p:ph type="body" idx="1"/>
+          </p:nvPr>
+        </p:nvSpPr>
+        <p:spPr/>
+        <p:txBody>
+          <a:bodyPr/>
+          <a:lstStyle/>
+          <a:p>
             <a:pPr marL="0" marR="0" lvl="0" indent="0" algn="l" defTabSz="914400" rtl="0" eaLnBrk="1" fontAlgn="auto" latinLnBrk="0" hangingPunct="1">
               <a:lnSpc>
                 <a:spcPct val="100000"/>
@@ -3724,7 +3823,7 @@
           <a:p>
             <a:fld id="{4AF79E1B-2C51-4B9B-8EA4-26DE9E345AFF}" type="slidenum">
               <a:rPr lang="en-US" smtClean="0"/>
-              <a:t>41</a:t>
+              <a:t>42</a:t>
             </a:fld>
             <a:endParaRPr lang="en-US"/>
           </a:p>
@@ -8099,8 +8198,8 @@
           </a:p>
         </p:txBody>
       </p:sp>
-      <mc:AlternateContent xmlns:mc="http://schemas.openxmlformats.org/markup-compatibility/2006">
-        <mc:Choice xmlns:a14="http://schemas.microsoft.com/office/drawing/2010/main" Requires="a14">
+      <mc:AlternateContent xmlns:mc="http://schemas.openxmlformats.org/markup-compatibility/2006" xmlns:a14="http://schemas.microsoft.com/office/drawing/2010/main">
+        <mc:Choice Requires="a14">
           <p:sp>
             <p:nvSpPr>
               <p:cNvPr id="3" name="Content Placeholder 2"/>
@@ -8737,7 +8836,7 @@
             </p:txBody>
           </p:sp>
         </mc:Choice>
-        <mc:Fallback>
+        <mc:Fallback xmlns="">
           <p:sp>
             <p:nvSpPr>
               <p:cNvPr id="3" name="Content Placeholder 2"/>
@@ -11498,6 +11597,14 @@
 <file path=ppt/slides/slide27.xml><?xml version="1.0" encoding="utf-8"?>
 <p:sld xmlns:a="http://schemas.openxmlformats.org/drawingml/2006/main" xmlns:r="http://schemas.openxmlformats.org/officeDocument/2006/relationships" xmlns:p="http://schemas.openxmlformats.org/presentationml/2006/main">
   <p:cSld>
+    <p:bg>
+      <p:bgPr>
+        <a:solidFill>
+          <a:schemeClr val="bg1"/>
+        </a:solidFill>
+        <a:effectLst/>
+      </p:bgPr>
+    </p:bg>
     <p:spTree>
       <p:nvGrpSpPr>
         <p:cNvPr id="1" name=""/>
@@ -11512,43 +11619,37 @@
           <a:chExt cx="0" cy="0"/>
         </a:xfrm>
       </p:grpSpPr>
-      <p:sp>
-        <p:nvSpPr>
-          <p:cNvPr id="2" name="Title 1"/>
-          <p:cNvSpPr>
-            <a:spLocks noGrp="1"/>
-          </p:cNvSpPr>
-          <p:nvPr>
-            <p:ph type="title"/>
-          </p:nvPr>
-        </p:nvSpPr>
+      <p:pic>
+        <p:nvPicPr>
+          <p:cNvPr id="5" name="Picture 4">
+            <a:extLst>
+              <a:ext uri="{FF2B5EF4-FFF2-40B4-BE49-F238E27FC236}">
+                <a16:creationId xmlns:a16="http://schemas.microsoft.com/office/drawing/2014/main" id="{CE1C9616-3BE9-F3D5-A7BD-F2DEC429C0AF}"/>
+              </a:ext>
+            </a:extLst>
+          </p:cNvPr>
+          <p:cNvPicPr>
+            <a:picLocks noChangeAspect="1"/>
+          </p:cNvPicPr>
+          <p:nvPr/>
+        </p:nvPicPr>
+        <p:blipFill rotWithShape="1">
+          <a:blip r:embed="rId3"/>
+          <a:srcRect r="7127"/>
+          <a:stretch/>
+        </p:blipFill>
         <p:spPr>
           <a:xfrm>
-            <a:off x="609600" y="337392"/>
-            <a:ext cx="10439400" cy="624840"/>
+            <a:off x="4953000" y="962231"/>
+            <a:ext cx="6324601" cy="5022360"/>
           </a:xfrm>
+          <a:prstGeom prst="rect">
+            <a:avLst/>
+          </a:prstGeom>
         </p:spPr>
-        <p:txBody>
-          <a:bodyPr>
-            <a:noAutofit/>
-          </a:bodyPr>
-          <a:lstStyle/>
-          <a:p>
-            <a:r>
-              <a:rPr lang="en-US" sz="3600" dirty="0">
-                <a:cs typeface="Times New Roman" panose="02020603050405020304" pitchFamily="18" charset="0"/>
-              </a:rPr>
-              <a:t>Quantile Regression: Distributional Effects</a:t>
-            </a:r>
-            <a:endParaRPr lang="en-US" sz="3600" dirty="0">
-              <a:latin typeface="Times New Roman" panose="02020603050405020304" pitchFamily="18" charset="0"/>
-              <a:cs typeface="Times New Roman" panose="02020603050405020304" pitchFamily="18" charset="0"/>
-            </a:endParaRPr>
-          </a:p>
-        </p:txBody>
-      </p:sp>
-      <mc:AlternateContent xmlns:mc="http://schemas.openxmlformats.org/markup-compatibility/2006" xmlns:a14="http://schemas.microsoft.com/office/drawing/2010/main">
-        <mc:Choice Requires="a14">
+      </p:pic>
+      <mc:AlternateContent xmlns:mc="http://schemas.openxmlformats.org/markup-compatibility/2006">
+        <mc:Choice xmlns:a14="http://schemas.microsoft.com/office/drawing/2010/main" Requires="a14">
           <p:sp>
             <p:nvSpPr>
               <p:cNvPr id="3" name="Content Placeholder 2"/>
@@ -11561,38 +11662,29 @@
             </p:nvSpPr>
             <p:spPr>
               <a:xfrm>
-                <a:off x="1219199" y="1066801"/>
-                <a:ext cx="9405791" cy="5141388"/>
+                <a:off x="856095" y="962232"/>
+                <a:ext cx="4744606" cy="5217905"/>
               </a:xfrm>
             </p:spPr>
             <p:txBody>
               <a:bodyPr>
-                <a:noAutofit/>
+                <a:normAutofit/>
               </a:bodyPr>
               <a:lstStyle/>
               <a:p>
                 <a:r>
                   <a:rPr lang="en-US" sz="2400" dirty="0">
-                    <a:solidFill>
-                      <a:srgbClr val="222222"/>
-                    </a:solidFill>
                     <a:cs typeface="Times New Roman" panose="02020603050405020304" pitchFamily="18" charset="0"/>
                   </a:rPr>
                   <a:t>Linear regression implies </a:t>
                 </a:r>
                 <a:r>
                   <a:rPr lang="en-US" sz="2400" b="1" dirty="0">
-                    <a:solidFill>
-                      <a:srgbClr val="222222"/>
-                    </a:solidFill>
                     <a:cs typeface="Times New Roman" panose="02020603050405020304" pitchFamily="18" charset="0"/>
                   </a:rPr>
                   <a:t>homogeneous effects:</a:t>
                 </a:r>
                 <a:endParaRPr lang="en-US" sz="2400" dirty="0">
-                  <a:solidFill>
-                    <a:srgbClr val="222222"/>
-                  </a:solidFill>
                   <a:cs typeface="Times New Roman" panose="02020603050405020304" pitchFamily="18" charset="0"/>
                 </a:endParaRPr>
               </a:p>
@@ -11608,9 +11700,6 @@
                     <m:oMath xmlns:m="http://schemas.openxmlformats.org/officeDocument/2006/math">
                       <m:r>
                         <a:rPr lang="en-US" sz="2400" b="0" i="1" smtClean="0">
-                          <a:solidFill>
-                            <a:srgbClr val="222222"/>
-                          </a:solidFill>
                           <a:latin typeface="Cambria Math" panose="02040503050406030204" pitchFamily="18" charset="0"/>
                           <a:cs typeface="Times New Roman" panose="02020603050405020304" pitchFamily="18" charset="0"/>
                         </a:rPr>
@@ -11618,9 +11707,6 @@
                       </m:r>
                       <m:r>
                         <a:rPr lang="en-US" sz="2400" b="0" i="1" smtClean="0">
-                          <a:solidFill>
-                            <a:srgbClr val="222222"/>
-                          </a:solidFill>
                           <a:latin typeface="Cambria Math" panose="02040503050406030204" pitchFamily="18" charset="0"/>
                           <a:cs typeface="Times New Roman" panose="02020603050405020304" pitchFamily="18" charset="0"/>
                         </a:rPr>
@@ -11628,9 +11714,6 @@
                       </m:r>
                       <m:r>
                         <a:rPr lang="en-US" sz="2400" b="0" i="1" smtClean="0">
-                          <a:solidFill>
-                            <a:srgbClr val="222222"/>
-                          </a:solidFill>
                           <a:latin typeface="Cambria Math" panose="02040503050406030204" pitchFamily="18" charset="0"/>
                           <a:cs typeface="Times New Roman" panose="02020603050405020304" pitchFamily="18" charset="0"/>
                         </a:rPr>
@@ -11638,9 +11721,6 @@
                       </m:r>
                       <m:r>
                         <a:rPr lang="en-US" sz="2400" b="0" i="1" smtClean="0">
-                          <a:solidFill>
-                            <a:srgbClr val="222222"/>
-                          </a:solidFill>
                           <a:latin typeface="Cambria Math" panose="02040503050406030204" pitchFamily="18" charset="0"/>
                           <a:cs typeface="Times New Roman" panose="02020603050405020304" pitchFamily="18" charset="0"/>
                         </a:rPr>
@@ -11648,9 +11728,6 @@
                       </m:r>
                       <m:r>
                         <a:rPr lang="en-US" sz="2400" b="0" i="1" smtClean="0">
-                          <a:solidFill>
-                            <a:srgbClr val="222222"/>
-                          </a:solidFill>
                           <a:latin typeface="Cambria Math" panose="02040503050406030204" pitchFamily="18" charset="0"/>
                           <a:cs typeface="Times New Roman" panose="02020603050405020304" pitchFamily="18" charset="0"/>
                         </a:rPr>
@@ -11658,9 +11735,6 @@
                       </m:r>
                       <m:r>
                         <a:rPr lang="en-US" sz="2400" b="0" i="1" smtClean="0">
-                          <a:solidFill>
-                            <a:srgbClr val="222222"/>
-                          </a:solidFill>
                           <a:latin typeface="Cambria Math" panose="02040503050406030204" pitchFamily="18" charset="0"/>
                           <a:cs typeface="Times New Roman" panose="02020603050405020304" pitchFamily="18" charset="0"/>
                         </a:rPr>
@@ -11670,27 +11744,18 @@
                   </m:oMathPara>
                 </a14:m>
                 <a:endParaRPr lang="en-US" sz="2400" dirty="0">
-                  <a:solidFill>
-                    <a:srgbClr val="222222"/>
-                  </a:solidFill>
                   <a:cs typeface="Times New Roman" panose="02020603050405020304" pitchFamily="18" charset="0"/>
                 </a:endParaRPr>
               </a:p>
               <a:p>
                 <a:r>
                   <a:rPr lang="en-US" sz="2400" dirty="0">
-                    <a:solidFill>
-                      <a:srgbClr val="222222"/>
-                    </a:solidFill>
                     <a:cs typeface="Times New Roman" panose="02020603050405020304" pitchFamily="18" charset="0"/>
                   </a:rPr>
                   <a:t>All we need to care about here is the </a:t>
                 </a:r>
                 <a:r>
                   <a:rPr lang="en-US" sz="2400" b="1" dirty="0">
-                    <a:solidFill>
-                      <a:srgbClr val="222222"/>
-                    </a:solidFill>
                     <a:cs typeface="Times New Roman" panose="02020603050405020304" pitchFamily="18" charset="0"/>
                   </a:rPr>
                   <a:t>conditional mean </a:t>
@@ -11699,9 +11764,6 @@
                   <m:oMath xmlns:m="http://schemas.openxmlformats.org/officeDocument/2006/math">
                     <m:r>
                       <a:rPr lang="en-US" sz="2400" b="1" i="1" smtClean="0">
-                        <a:solidFill>
-                          <a:srgbClr val="222222"/>
-                        </a:solidFill>
                         <a:latin typeface="Cambria Math" panose="02040503050406030204" pitchFamily="18" charset="0"/>
                         <a:cs typeface="Times New Roman" panose="02020603050405020304" pitchFamily="18" charset="0"/>
                       </a:rPr>
@@ -11709,9 +11771,6 @@
                     </m:r>
                     <m:r>
                       <a:rPr lang="en-US" sz="2400" b="1" i="1" smtClean="0">
-                        <a:solidFill>
-                          <a:srgbClr val="222222"/>
-                        </a:solidFill>
                         <a:latin typeface="Cambria Math" panose="02040503050406030204" pitchFamily="18" charset="0"/>
                         <a:cs typeface="Times New Roman" panose="02020603050405020304" pitchFamily="18" charset="0"/>
                       </a:rPr>
@@ -11719,9 +11778,6 @@
                     </m:r>
                     <m:r>
                       <a:rPr lang="en-US" sz="2400" b="1" i="1" smtClean="0">
-                        <a:solidFill>
-                          <a:srgbClr val="222222"/>
-                        </a:solidFill>
                         <a:latin typeface="Cambria Math" panose="02040503050406030204" pitchFamily="18" charset="0"/>
                         <a:cs typeface="Times New Roman" panose="02020603050405020304" pitchFamily="18" charset="0"/>
                       </a:rPr>
@@ -11729,9 +11785,6 @@
                     </m:r>
                     <m:r>
                       <a:rPr lang="en-US" sz="2400" b="1" i="1" smtClean="0">
-                        <a:solidFill>
-                          <a:srgbClr val="222222"/>
-                        </a:solidFill>
                         <a:latin typeface="Cambria Math" panose="02040503050406030204" pitchFamily="18" charset="0"/>
                         <a:cs typeface="Times New Roman" panose="02020603050405020304" pitchFamily="18" charset="0"/>
                       </a:rPr>
@@ -11739,9 +11792,6 @@
                     </m:r>
                     <m:r>
                       <a:rPr lang="en-US" sz="2400" b="1" i="1" smtClean="0">
-                        <a:solidFill>
-                          <a:srgbClr val="222222"/>
-                        </a:solidFill>
                         <a:latin typeface="Cambria Math" panose="02040503050406030204" pitchFamily="18" charset="0"/>
                         <a:cs typeface="Times New Roman" panose="02020603050405020304" pitchFamily="18" charset="0"/>
                       </a:rPr>
@@ -11749,9 +11799,6 @@
                     </m:r>
                     <m:r>
                       <a:rPr lang="en-US" sz="2400" b="1" i="1" smtClean="0">
-                        <a:solidFill>
-                          <a:srgbClr val="222222"/>
-                        </a:solidFill>
                         <a:latin typeface="Cambria Math" panose="02040503050406030204" pitchFamily="18" charset="0"/>
                         <a:cs typeface="Times New Roman" panose="02020603050405020304" pitchFamily="18" charset="0"/>
                       </a:rPr>
@@ -11760,42 +11807,13 @@
                   </m:oMath>
                 </a14:m>
                 <a:endParaRPr lang="en-US" sz="2400" dirty="0">
-                  <a:solidFill>
-                    <a:srgbClr val="222222"/>
-                  </a:solidFill>
-                  <a:cs typeface="Times New Roman" panose="02020603050405020304" pitchFamily="18" charset="0"/>
-                </a:endParaRPr>
-              </a:p>
-              <a:p>
-                <a:r>
-                  <a:rPr lang="en-US" sz="2400" dirty="0">
-                    <a:solidFill>
-                      <a:srgbClr val="222222"/>
-                    </a:solidFill>
-                    <a:cs typeface="Times New Roman" panose="02020603050405020304" pitchFamily="18" charset="0"/>
-                  </a:rPr>
-                  <a:t>But what if an effect differs for individuals </a:t>
-                </a:r>
-                <a:r>
-                  <a:rPr lang="en-US" sz="2400" i="1" dirty="0">
-                    <a:solidFill>
-                      <a:srgbClr val="222222"/>
-                    </a:solidFill>
-                    <a:cs typeface="Times New Roman" panose="02020603050405020304" pitchFamily="18" charset="0"/>
-                  </a:rPr>
-                  <a:t>along the distribution of x?</a:t>
-                </a:r>
-                <a:endParaRPr lang="en-US" sz="2400" dirty="0">
-                  <a:solidFill>
-                    <a:srgbClr val="222222"/>
-                  </a:solidFill>
                   <a:cs typeface="Times New Roman" panose="02020603050405020304" pitchFamily="18" charset="0"/>
                 </a:endParaRPr>
               </a:p>
             </p:txBody>
           </p:sp>
         </mc:Choice>
-        <mc:Fallback xmlns="">
+        <mc:Fallback>
           <p:sp>
             <p:nvSpPr>
               <p:cNvPr id="3" name="Content Placeholder 2"/>
@@ -11808,13 +11826,13 @@
             </p:nvSpPr>
             <p:spPr>
               <a:xfrm>
-                <a:off x="1219199" y="1066801"/>
-                <a:ext cx="9405791" cy="5141388"/>
+                <a:off x="856095" y="962232"/>
+                <a:ext cx="4744606" cy="5217905"/>
               </a:xfrm>
               <a:blipFill>
-                <a:blip r:embed="rId3"/>
+                <a:blip r:embed="rId4"/>
                 <a:stretch>
-                  <a:fillRect l="-454" t="-1305"/>
+                  <a:fillRect l="-899" t="-1285"/>
                 </a:stretch>
               </a:blipFill>
             </p:spPr>
@@ -11833,6 +11851,62 @@
           </p:sp>
         </mc:Fallback>
       </mc:AlternateContent>
+      <p:sp>
+        <p:nvSpPr>
+          <p:cNvPr id="6" name="Title 1">
+            <a:extLst>
+              <a:ext uri="{FF2B5EF4-FFF2-40B4-BE49-F238E27FC236}">
+                <a16:creationId xmlns:a16="http://schemas.microsoft.com/office/drawing/2014/main" id="{F4D68C9B-0AC4-FAAC-1DD9-41E0AF93018E}"/>
+              </a:ext>
+            </a:extLst>
+          </p:cNvPr>
+          <p:cNvSpPr txBox="1">
+            <a:spLocks/>
+          </p:cNvSpPr>
+          <p:nvPr/>
+        </p:nvSpPr>
+        <p:spPr>
+          <a:xfrm>
+            <a:off x="609600" y="337392"/>
+            <a:ext cx="10439400" cy="624840"/>
+          </a:xfrm>
+          <a:prstGeom prst="rect">
+            <a:avLst/>
+          </a:prstGeom>
+        </p:spPr>
+        <p:txBody>
+          <a:bodyPr vert="horz" lIns="91440" tIns="45720" rIns="91440" bIns="45720" rtlCol="0" anchor="b">
+            <a:noAutofit/>
+          </a:bodyPr>
+          <a:lstStyle>
+            <a:lvl1pPr algn="l" defTabSz="914400" rtl="0" eaLnBrk="1" latinLnBrk="0" hangingPunct="1">
+              <a:lnSpc>
+                <a:spcPct val="90000"/>
+              </a:lnSpc>
+              <a:spcBef>
+                <a:spcPct val="0"/>
+              </a:spcBef>
+              <a:buNone/>
+              <a:defRPr sz="4400" kern="1200" spc="-50" baseline="0">
+                <a:solidFill>
+                  <a:schemeClr val="tx1"/>
+                </a:solidFill>
+                <a:latin typeface="Times New Roman" panose="02020603050405020304" pitchFamily="18" charset="0"/>
+                <a:ea typeface="+mj-ea"/>
+                <a:cs typeface="+mj-cs"/>
+              </a:defRPr>
+            </a:lvl1pPr>
+          </a:lstStyle>
+          <a:p>
+            <a:r>
+              <a:rPr lang="en-US" sz="3600" dirty="0">
+                <a:cs typeface="Times New Roman" panose="02020603050405020304" pitchFamily="18" charset="0"/>
+              </a:rPr>
+              <a:t>Quantile Regression: Distributional Effects</a:t>
+            </a:r>
+          </a:p>
+        </p:txBody>
+      </p:sp>
     </p:spTree>
     <p:extLst>
       <p:ext uri="{BB962C8B-B14F-4D97-AF65-F5344CB8AC3E}">
@@ -11847,6 +11921,342 @@
 </file>
 
 <file path=ppt/slides/slide28.xml><?xml version="1.0" encoding="utf-8"?>
+<p:sld xmlns:a="http://schemas.openxmlformats.org/drawingml/2006/main" xmlns:r="http://schemas.openxmlformats.org/officeDocument/2006/relationships" xmlns:p="http://schemas.openxmlformats.org/presentationml/2006/main">
+  <p:cSld>
+    <p:spTree>
+      <p:nvGrpSpPr>
+        <p:cNvPr id="1" name=""/>
+        <p:cNvGrpSpPr/>
+        <p:nvPr/>
+      </p:nvGrpSpPr>
+      <p:grpSpPr>
+        <a:xfrm>
+          <a:off x="0" y="0"/>
+          <a:ext cx="0" cy="0"/>
+          <a:chOff x="0" y="0"/>
+          <a:chExt cx="0" cy="0"/>
+        </a:xfrm>
+      </p:grpSpPr>
+      <mc:AlternateContent xmlns:mc="http://schemas.openxmlformats.org/markup-compatibility/2006">
+        <mc:Choice xmlns:a14="http://schemas.microsoft.com/office/drawing/2010/main" Requires="a14">
+          <p:sp>
+            <p:nvSpPr>
+              <p:cNvPr id="3" name="Content Placeholder 2"/>
+              <p:cNvSpPr>
+                <a:spLocks noGrp="1"/>
+              </p:cNvSpPr>
+              <p:nvPr>
+                <p:ph idx="1"/>
+              </p:nvPr>
+            </p:nvSpPr>
+            <p:spPr>
+              <a:xfrm>
+                <a:off x="856095" y="962232"/>
+                <a:ext cx="4744606" cy="5217905"/>
+              </a:xfrm>
+            </p:spPr>
+            <p:txBody>
+              <a:bodyPr>
+                <a:normAutofit/>
+              </a:bodyPr>
+              <a:lstStyle/>
+              <a:p>
+                <a:r>
+                  <a:rPr lang="en-US" sz="2400" dirty="0">
+                    <a:cs typeface="Times New Roman" panose="02020603050405020304" pitchFamily="18" charset="0"/>
+                  </a:rPr>
+                  <a:t>Linear regression implies </a:t>
+                </a:r>
+                <a:r>
+                  <a:rPr lang="en-US" sz="2400" b="1" dirty="0">
+                    <a:cs typeface="Times New Roman" panose="02020603050405020304" pitchFamily="18" charset="0"/>
+                  </a:rPr>
+                  <a:t>homogeneous effects:</a:t>
+                </a:r>
+                <a:endParaRPr lang="en-US" sz="2400" dirty="0">
+                  <a:cs typeface="Times New Roman" panose="02020603050405020304" pitchFamily="18" charset="0"/>
+                </a:endParaRPr>
+              </a:p>
+              <a:p>
+                <a:pPr marL="0" indent="0">
+                  <a:buNone/>
+                </a:pPr>
+                <a14:m>
+                  <m:oMathPara xmlns:m="http://schemas.openxmlformats.org/officeDocument/2006/math">
+                    <m:oMathParaPr>
+                      <m:jc m:val="centerGroup"/>
+                    </m:oMathParaPr>
+                    <m:oMath xmlns:m="http://schemas.openxmlformats.org/officeDocument/2006/math">
+                      <m:r>
+                        <a:rPr lang="en-US" sz="2400" b="0" i="1" smtClean="0">
+                          <a:latin typeface="Cambria Math" panose="02040503050406030204" pitchFamily="18" charset="0"/>
+                          <a:cs typeface="Times New Roman" panose="02020603050405020304" pitchFamily="18" charset="0"/>
+                        </a:rPr>
+                        <m:t>𝑦</m:t>
+                      </m:r>
+                      <m:r>
+                        <a:rPr lang="en-US" sz="2400" b="0" i="1" smtClean="0">
+                          <a:latin typeface="Cambria Math" panose="02040503050406030204" pitchFamily="18" charset="0"/>
+                          <a:cs typeface="Times New Roman" panose="02020603050405020304" pitchFamily="18" charset="0"/>
+                        </a:rPr>
+                        <m:t>=</m:t>
+                      </m:r>
+                      <m:r>
+                        <a:rPr lang="en-US" sz="2400" b="0" i="1" smtClean="0">
+                          <a:latin typeface="Cambria Math" panose="02040503050406030204" pitchFamily="18" charset="0"/>
+                          <a:cs typeface="Times New Roman" panose="02020603050405020304" pitchFamily="18" charset="0"/>
+                        </a:rPr>
+                        <m:t>𝛽</m:t>
+                      </m:r>
+                      <m:r>
+                        <a:rPr lang="en-US" sz="2400" b="0" i="1" smtClean="0">
+                          <a:latin typeface="Cambria Math" panose="02040503050406030204" pitchFamily="18" charset="0"/>
+                          <a:cs typeface="Times New Roman" panose="02020603050405020304" pitchFamily="18" charset="0"/>
+                        </a:rPr>
+                        <m:t>𝑥</m:t>
+                      </m:r>
+                      <m:r>
+                        <a:rPr lang="en-US" sz="2400" b="0" i="1" smtClean="0">
+                          <a:latin typeface="Cambria Math" panose="02040503050406030204" pitchFamily="18" charset="0"/>
+                          <a:cs typeface="Times New Roman" panose="02020603050405020304" pitchFamily="18" charset="0"/>
+                        </a:rPr>
+                        <m:t>+</m:t>
+                      </m:r>
+                      <m:r>
+                        <a:rPr lang="en-US" sz="2400" b="0" i="1" smtClean="0">
+                          <a:latin typeface="Cambria Math" panose="02040503050406030204" pitchFamily="18" charset="0"/>
+                          <a:cs typeface="Times New Roman" panose="02020603050405020304" pitchFamily="18" charset="0"/>
+                        </a:rPr>
+                        <m:t>𝜀</m:t>
+                      </m:r>
+                    </m:oMath>
+                  </m:oMathPara>
+                </a14:m>
+                <a:endParaRPr lang="en-US" sz="2400" dirty="0">
+                  <a:cs typeface="Times New Roman" panose="02020603050405020304" pitchFamily="18" charset="0"/>
+                </a:endParaRPr>
+              </a:p>
+              <a:p>
+                <a:r>
+                  <a:rPr lang="en-US" sz="2400" dirty="0">
+                    <a:cs typeface="Times New Roman" panose="02020603050405020304" pitchFamily="18" charset="0"/>
+                  </a:rPr>
+                  <a:t>All we need to care about here is the </a:t>
+                </a:r>
+                <a:r>
+                  <a:rPr lang="en-US" sz="2400" b="1" dirty="0">
+                    <a:cs typeface="Times New Roman" panose="02020603050405020304" pitchFamily="18" charset="0"/>
+                  </a:rPr>
+                  <a:t>conditional mean </a:t>
+                </a:r>
+                <a14:m>
+                  <m:oMath xmlns:m="http://schemas.openxmlformats.org/officeDocument/2006/math">
+                    <m:r>
+                      <a:rPr lang="en-US" sz="2400" b="1" i="1" smtClean="0">
+                        <a:latin typeface="Cambria Math" panose="02040503050406030204" pitchFamily="18" charset="0"/>
+                        <a:cs typeface="Times New Roman" panose="02020603050405020304" pitchFamily="18" charset="0"/>
+                      </a:rPr>
+                      <m:t>𝔼</m:t>
+                    </m:r>
+                    <m:r>
+                      <a:rPr lang="en-US" sz="2400" b="1" i="1" smtClean="0">
+                        <a:latin typeface="Cambria Math" panose="02040503050406030204" pitchFamily="18" charset="0"/>
+                        <a:cs typeface="Times New Roman" panose="02020603050405020304" pitchFamily="18" charset="0"/>
+                      </a:rPr>
+                      <m:t>[</m:t>
+                    </m:r>
+                    <m:r>
+                      <a:rPr lang="en-US" sz="2400" b="1" i="1" smtClean="0">
+                        <a:latin typeface="Cambria Math" panose="02040503050406030204" pitchFamily="18" charset="0"/>
+                        <a:cs typeface="Times New Roman" panose="02020603050405020304" pitchFamily="18" charset="0"/>
+                      </a:rPr>
+                      <m:t>𝒚</m:t>
+                    </m:r>
+                    <m:r>
+                      <a:rPr lang="en-US" sz="2400" b="1" i="1" smtClean="0">
+                        <a:latin typeface="Cambria Math" panose="02040503050406030204" pitchFamily="18" charset="0"/>
+                        <a:cs typeface="Times New Roman" panose="02020603050405020304" pitchFamily="18" charset="0"/>
+                      </a:rPr>
+                      <m:t>|</m:t>
+                    </m:r>
+                    <m:r>
+                      <a:rPr lang="en-US" sz="2400" b="1" i="1" smtClean="0">
+                        <a:latin typeface="Cambria Math" panose="02040503050406030204" pitchFamily="18" charset="0"/>
+                        <a:cs typeface="Times New Roman" panose="02020603050405020304" pitchFamily="18" charset="0"/>
+                      </a:rPr>
+                      <m:t>𝒙</m:t>
+                    </m:r>
+                    <m:r>
+                      <a:rPr lang="en-US" sz="2400" b="1" i="1" smtClean="0">
+                        <a:latin typeface="Cambria Math" panose="02040503050406030204" pitchFamily="18" charset="0"/>
+                        <a:cs typeface="Times New Roman" panose="02020603050405020304" pitchFamily="18" charset="0"/>
+                      </a:rPr>
+                      <m:t>]</m:t>
+                    </m:r>
+                  </m:oMath>
+                </a14:m>
+                <a:endParaRPr lang="en-US" sz="2400" dirty="0">
+                  <a:cs typeface="Times New Roman" panose="02020603050405020304" pitchFamily="18" charset="0"/>
+                </a:endParaRPr>
+              </a:p>
+              <a:p>
+                <a:r>
+                  <a:rPr lang="en-US" sz="2400" dirty="0">
+                    <a:cs typeface="Times New Roman" panose="02020603050405020304" pitchFamily="18" charset="0"/>
+                  </a:rPr>
+                  <a:t>But what if an effect differs for individuals </a:t>
+                </a:r>
+                <a:r>
+                  <a:rPr lang="en-US" sz="2400" i="1" dirty="0">
+                    <a:cs typeface="Times New Roman" panose="02020603050405020304" pitchFamily="18" charset="0"/>
+                  </a:rPr>
+                  <a:t>along distribution of x?</a:t>
+                </a:r>
+                <a:endParaRPr lang="en-US" sz="2400" dirty="0">
+                  <a:cs typeface="Times New Roman" panose="02020603050405020304" pitchFamily="18" charset="0"/>
+                </a:endParaRPr>
+              </a:p>
+            </p:txBody>
+          </p:sp>
+        </mc:Choice>
+        <mc:Fallback>
+          <p:sp>
+            <p:nvSpPr>
+              <p:cNvPr id="3" name="Content Placeholder 2"/>
+              <p:cNvSpPr>
+                <a:spLocks noGrp="1" noRot="1" noChangeAspect="1" noMove="1" noResize="1" noEditPoints="1" noAdjustHandles="1" noChangeArrowheads="1" noChangeShapeType="1" noTextEdit="1"/>
+              </p:cNvSpPr>
+              <p:nvPr>
+                <p:ph idx="1"/>
+              </p:nvPr>
+            </p:nvSpPr>
+            <p:spPr>
+              <a:xfrm>
+                <a:off x="856095" y="962232"/>
+                <a:ext cx="4744606" cy="5217905"/>
+              </a:xfrm>
+              <a:blipFill>
+                <a:blip r:embed="rId3"/>
+                <a:stretch>
+                  <a:fillRect l="-899" t="-1285" r="-1155"/>
+                </a:stretch>
+              </a:blipFill>
+            </p:spPr>
+            <p:txBody>
+              <a:bodyPr/>
+              <a:lstStyle/>
+              <a:p>
+                <a:r>
+                  <a:rPr lang="en-US">
+                    <a:noFill/>
+                  </a:rPr>
+                  <a:t> </a:t>
+                </a:r>
+              </a:p>
+            </p:txBody>
+          </p:sp>
+        </mc:Fallback>
+      </mc:AlternateContent>
+      <p:sp>
+        <p:nvSpPr>
+          <p:cNvPr id="6" name="Title 1">
+            <a:extLst>
+              <a:ext uri="{FF2B5EF4-FFF2-40B4-BE49-F238E27FC236}">
+                <a16:creationId xmlns:a16="http://schemas.microsoft.com/office/drawing/2014/main" id="{F4D68C9B-0AC4-FAAC-1DD9-41E0AF93018E}"/>
+              </a:ext>
+            </a:extLst>
+          </p:cNvPr>
+          <p:cNvSpPr txBox="1">
+            <a:spLocks/>
+          </p:cNvSpPr>
+          <p:nvPr/>
+        </p:nvSpPr>
+        <p:spPr>
+          <a:xfrm>
+            <a:off x="609600" y="337392"/>
+            <a:ext cx="10439400" cy="624840"/>
+          </a:xfrm>
+          <a:prstGeom prst="rect">
+            <a:avLst/>
+          </a:prstGeom>
+        </p:spPr>
+        <p:txBody>
+          <a:bodyPr vert="horz" lIns="91440" tIns="45720" rIns="91440" bIns="45720" rtlCol="0" anchor="b">
+            <a:noAutofit/>
+          </a:bodyPr>
+          <a:lstStyle>
+            <a:lvl1pPr algn="l" defTabSz="914400" rtl="0" eaLnBrk="1" latinLnBrk="0" hangingPunct="1">
+              <a:lnSpc>
+                <a:spcPct val="90000"/>
+              </a:lnSpc>
+              <a:spcBef>
+                <a:spcPct val="0"/>
+              </a:spcBef>
+              <a:buNone/>
+              <a:defRPr sz="4400" kern="1200" spc="-50" baseline="0">
+                <a:solidFill>
+                  <a:schemeClr val="tx1"/>
+                </a:solidFill>
+                <a:latin typeface="Times New Roman" panose="02020603050405020304" pitchFamily="18" charset="0"/>
+                <a:ea typeface="+mj-ea"/>
+                <a:cs typeface="+mj-cs"/>
+              </a:defRPr>
+            </a:lvl1pPr>
+          </a:lstStyle>
+          <a:p>
+            <a:r>
+              <a:rPr lang="en-US" sz="3600" dirty="0">
+                <a:cs typeface="Times New Roman" panose="02020603050405020304" pitchFamily="18" charset="0"/>
+              </a:rPr>
+              <a:t>Quantile Regression: Distributional Effects</a:t>
+            </a:r>
+          </a:p>
+        </p:txBody>
+      </p:sp>
+      <p:pic>
+        <p:nvPicPr>
+          <p:cNvPr id="4" name="Picture 3">
+            <a:extLst>
+              <a:ext uri="{FF2B5EF4-FFF2-40B4-BE49-F238E27FC236}">
+                <a16:creationId xmlns:a16="http://schemas.microsoft.com/office/drawing/2014/main" id="{B7976A07-4F47-BC28-9286-8987EE41BE58}"/>
+              </a:ext>
+            </a:extLst>
+          </p:cNvPr>
+          <p:cNvPicPr>
+            <a:picLocks noChangeAspect="1"/>
+          </p:cNvPicPr>
+          <p:nvPr/>
+        </p:nvPicPr>
+        <p:blipFill>
+          <a:blip r:embed="rId4"/>
+          <a:stretch>
+            <a:fillRect/>
+          </a:stretch>
+        </p:blipFill>
+        <p:spPr>
+          <a:xfrm>
+            <a:off x="5510415" y="1127324"/>
+            <a:ext cx="5814060" cy="4603352"/>
+          </a:xfrm>
+          <a:prstGeom prst="rect">
+            <a:avLst/>
+          </a:prstGeom>
+        </p:spPr>
+      </p:pic>
+    </p:spTree>
+    <p:extLst>
+      <p:ext uri="{BB962C8B-B14F-4D97-AF65-F5344CB8AC3E}">
+        <p14:creationId xmlns:p14="http://schemas.microsoft.com/office/powerpoint/2010/main" val="3301846513"/>
+      </p:ext>
+    </p:extLst>
+  </p:cSld>
+  <p:clrMapOvr>
+    <a:masterClrMapping/>
+  </p:clrMapOvr>
+</p:sld>
+</file>
+
+<file path=ppt/slides/slide29.xml><?xml version="1.0" encoding="utf-8"?>
 <p:sld xmlns:a="http://schemas.openxmlformats.org/drawingml/2006/main" xmlns:r="http://schemas.openxmlformats.org/officeDocument/2006/relationships" xmlns:p="http://schemas.openxmlformats.org/presentationml/2006/main">
   <p:cSld>
     <p:spTree>
@@ -12252,7 +12662,97 @@
 </p:sld>
 </file>
 
-<file path=ppt/slides/slide29.xml><?xml version="1.0" encoding="utf-8"?>
+<file path=ppt/slides/slide3.xml><?xml version="1.0" encoding="utf-8"?>
+<p:sld xmlns:a="http://schemas.openxmlformats.org/drawingml/2006/main" xmlns:r="http://schemas.openxmlformats.org/officeDocument/2006/relationships" xmlns:p="http://schemas.openxmlformats.org/presentationml/2006/main">
+  <p:cSld>
+    <p:spTree>
+      <p:nvGrpSpPr>
+        <p:cNvPr id="1" name=""/>
+        <p:cNvGrpSpPr/>
+        <p:nvPr/>
+      </p:nvGrpSpPr>
+      <p:grpSpPr>
+        <a:xfrm>
+          <a:off x="0" y="0"/>
+          <a:ext cx="0" cy="0"/>
+          <a:chOff x="0" y="0"/>
+          <a:chExt cx="0" cy="0"/>
+        </a:xfrm>
+      </p:grpSpPr>
+      <p:sp>
+        <p:nvSpPr>
+          <p:cNvPr id="2" name="Title 1">
+            <a:extLst>
+              <a:ext uri="{FF2B5EF4-FFF2-40B4-BE49-F238E27FC236}">
+                <a16:creationId xmlns:a16="http://schemas.microsoft.com/office/drawing/2014/main" id="{F6693EDF-660D-4391-A114-A6C54268E445}"/>
+              </a:ext>
+            </a:extLst>
+          </p:cNvPr>
+          <p:cNvSpPr>
+            <a:spLocks noGrp="1"/>
+          </p:cNvSpPr>
+          <p:nvPr>
+            <p:ph type="ctrTitle"/>
+          </p:nvPr>
+        </p:nvSpPr>
+        <p:spPr>
+          <a:xfrm>
+            <a:off x="1261872" y="758952"/>
+            <a:ext cx="10549128" cy="4041648"/>
+          </a:xfrm>
+        </p:spPr>
+        <p:txBody>
+          <a:bodyPr/>
+          <a:lstStyle/>
+          <a:p>
+            <a:r>
+              <a:rPr lang="en-US" dirty="0"/>
+              <a:t>Synthetic Controls </a:t>
+            </a:r>
+          </a:p>
+        </p:txBody>
+      </p:sp>
+      <p:sp>
+        <p:nvSpPr>
+          <p:cNvPr id="3" name="Subtitle 2">
+            <a:extLst>
+              <a:ext uri="{FF2B5EF4-FFF2-40B4-BE49-F238E27FC236}">
+                <a16:creationId xmlns:a16="http://schemas.microsoft.com/office/drawing/2014/main" id="{9A7FADE3-4D7C-4B3A-B023-71CD85AECCCB}"/>
+              </a:ext>
+            </a:extLst>
+          </p:cNvPr>
+          <p:cNvSpPr>
+            <a:spLocks noGrp="1"/>
+          </p:cNvSpPr>
+          <p:nvPr>
+            <p:ph type="subTitle" idx="1"/>
+          </p:nvPr>
+        </p:nvSpPr>
+        <p:spPr/>
+        <p:txBody>
+          <a:bodyPr>
+            <a:normAutofit/>
+          </a:bodyPr>
+          <a:lstStyle/>
+          <a:p>
+            <a:endParaRPr lang="en-US" sz="4400" dirty="0"/>
+          </a:p>
+        </p:txBody>
+      </p:sp>
+    </p:spTree>
+    <p:extLst>
+      <p:ext uri="{BB962C8B-B14F-4D97-AF65-F5344CB8AC3E}">
+        <p14:creationId xmlns:p14="http://schemas.microsoft.com/office/powerpoint/2010/main" val="2953910715"/>
+      </p:ext>
+    </p:extLst>
+  </p:cSld>
+  <p:clrMapOvr>
+    <a:masterClrMapping/>
+  </p:clrMapOvr>
+</p:sld>
+</file>
+
+<file path=ppt/slides/slide30.xml><?xml version="1.0" encoding="utf-8"?>
 <p:sld xmlns:a="http://schemas.openxmlformats.org/drawingml/2006/main" xmlns:r="http://schemas.openxmlformats.org/officeDocument/2006/relationships" xmlns:p="http://schemas.openxmlformats.org/presentationml/2006/main">
   <p:cSld>
     <p:spTree>
@@ -12667,97 +13167,7 @@
 </p:sld>
 </file>
 
-<file path=ppt/slides/slide3.xml><?xml version="1.0" encoding="utf-8"?>
-<p:sld xmlns:a="http://schemas.openxmlformats.org/drawingml/2006/main" xmlns:r="http://schemas.openxmlformats.org/officeDocument/2006/relationships" xmlns:p="http://schemas.openxmlformats.org/presentationml/2006/main">
-  <p:cSld>
-    <p:spTree>
-      <p:nvGrpSpPr>
-        <p:cNvPr id="1" name=""/>
-        <p:cNvGrpSpPr/>
-        <p:nvPr/>
-      </p:nvGrpSpPr>
-      <p:grpSpPr>
-        <a:xfrm>
-          <a:off x="0" y="0"/>
-          <a:ext cx="0" cy="0"/>
-          <a:chOff x="0" y="0"/>
-          <a:chExt cx="0" cy="0"/>
-        </a:xfrm>
-      </p:grpSpPr>
-      <p:sp>
-        <p:nvSpPr>
-          <p:cNvPr id="2" name="Title 1">
-            <a:extLst>
-              <a:ext uri="{FF2B5EF4-FFF2-40B4-BE49-F238E27FC236}">
-                <a16:creationId xmlns:a16="http://schemas.microsoft.com/office/drawing/2014/main" id="{F6693EDF-660D-4391-A114-A6C54268E445}"/>
-              </a:ext>
-            </a:extLst>
-          </p:cNvPr>
-          <p:cNvSpPr>
-            <a:spLocks noGrp="1"/>
-          </p:cNvSpPr>
-          <p:nvPr>
-            <p:ph type="ctrTitle"/>
-          </p:nvPr>
-        </p:nvSpPr>
-        <p:spPr>
-          <a:xfrm>
-            <a:off x="1261872" y="758952"/>
-            <a:ext cx="10549128" cy="4041648"/>
-          </a:xfrm>
-        </p:spPr>
-        <p:txBody>
-          <a:bodyPr/>
-          <a:lstStyle/>
-          <a:p>
-            <a:r>
-              <a:rPr lang="en-US" dirty="0"/>
-              <a:t>Synthetic Controls </a:t>
-            </a:r>
-          </a:p>
-        </p:txBody>
-      </p:sp>
-      <p:sp>
-        <p:nvSpPr>
-          <p:cNvPr id="3" name="Subtitle 2">
-            <a:extLst>
-              <a:ext uri="{FF2B5EF4-FFF2-40B4-BE49-F238E27FC236}">
-                <a16:creationId xmlns:a16="http://schemas.microsoft.com/office/drawing/2014/main" id="{9A7FADE3-4D7C-4B3A-B023-71CD85AECCCB}"/>
-              </a:ext>
-            </a:extLst>
-          </p:cNvPr>
-          <p:cNvSpPr>
-            <a:spLocks noGrp="1"/>
-          </p:cNvSpPr>
-          <p:nvPr>
-            <p:ph type="subTitle" idx="1"/>
-          </p:nvPr>
-        </p:nvSpPr>
-        <p:spPr/>
-        <p:txBody>
-          <a:bodyPr>
-            <a:normAutofit/>
-          </a:bodyPr>
-          <a:lstStyle/>
-          <a:p>
-            <a:endParaRPr lang="en-US" sz="4400" dirty="0"/>
-          </a:p>
-        </p:txBody>
-      </p:sp>
-    </p:spTree>
-    <p:extLst>
-      <p:ext uri="{BB962C8B-B14F-4D97-AF65-F5344CB8AC3E}">
-        <p14:creationId xmlns:p14="http://schemas.microsoft.com/office/powerpoint/2010/main" val="2953910715"/>
-      </p:ext>
-    </p:extLst>
-  </p:cSld>
-  <p:clrMapOvr>
-    <a:masterClrMapping/>
-  </p:clrMapOvr>
-</p:sld>
-</file>
-
-<file path=ppt/slides/slide30.xml><?xml version="1.0" encoding="utf-8"?>
+<file path=ppt/slides/slide31.xml><?xml version="1.0" encoding="utf-8"?>
 <p:sld xmlns:a="http://schemas.openxmlformats.org/drawingml/2006/main" xmlns:r="http://schemas.openxmlformats.org/officeDocument/2006/relationships" xmlns:p="http://schemas.openxmlformats.org/presentationml/2006/main">
   <p:cSld>
     <p:spTree>
@@ -13980,7 +14390,7 @@
 </p:sld>
 </file>
 
-<file path=ppt/slides/slide31.xml><?xml version="1.0" encoding="utf-8"?>
+<file path=ppt/slides/slide32.xml><?xml version="1.0" encoding="utf-8"?>
 <p:sld xmlns:a="http://schemas.openxmlformats.org/drawingml/2006/main" xmlns:r="http://schemas.openxmlformats.org/officeDocument/2006/relationships" xmlns:p="http://schemas.openxmlformats.org/presentationml/2006/main">
   <p:cSld>
     <p:spTree>
@@ -14167,6 +14577,17 @@
               <a:rPr lang="en-US" sz="2400" dirty="0"/>
               <a:t>Scaled as percentage increases of sample quantile </a:t>
             </a:r>
+          </a:p>
+          <a:p>
+            <a:r>
+              <a:rPr lang="en-US" sz="2600" dirty="0"/>
+              <a:t>Bootstrapped standard errors work best without </a:t>
+            </a:r>
+            <a:r>
+              <a:rPr lang="en-US" sz="2600"/>
+              <a:t>rank invariance</a:t>
+            </a:r>
+            <a:endParaRPr lang="en-US" sz="2600" dirty="0"/>
           </a:p>
           <a:p>
             <a:endParaRPr lang="en-US" sz="2400" dirty="0">
@@ -14238,7 +14659,7 @@
 </p:sld>
 </file>
 
-<file path=ppt/slides/slide32.xml><?xml version="1.0" encoding="utf-8"?>
+<file path=ppt/slides/slide33.xml><?xml version="1.0" encoding="utf-8"?>
 <p:sld xmlns:a="http://schemas.openxmlformats.org/drawingml/2006/main" xmlns:r="http://schemas.openxmlformats.org/officeDocument/2006/relationships" xmlns:p="http://schemas.openxmlformats.org/presentationml/2006/main">
   <p:cSld>
     <p:spTree>
@@ -14333,7 +14754,7 @@
 </p:sld>
 </file>
 
-<file path=ppt/slides/slide33.xml><?xml version="1.0" encoding="utf-8"?>
+<file path=ppt/slides/slide34.xml><?xml version="1.0" encoding="utf-8"?>
 <p:sld xmlns:a="http://schemas.openxmlformats.org/drawingml/2006/main" xmlns:r="http://schemas.openxmlformats.org/officeDocument/2006/relationships" xmlns:p="http://schemas.openxmlformats.org/presentationml/2006/main">
   <p:cSld>
     <p:spTree>
@@ -14782,7 +15203,7 @@
 </p:sld>
 </file>
 
-<file path=ppt/slides/slide34.xml><?xml version="1.0" encoding="utf-8"?>
+<file path=ppt/slides/slide35.xml><?xml version="1.0" encoding="utf-8"?>
 <p:sld xmlns:a="http://schemas.openxmlformats.org/drawingml/2006/main" xmlns:r="http://schemas.openxmlformats.org/officeDocument/2006/relationships" xmlns:p="http://schemas.openxmlformats.org/presentationml/2006/main">
   <p:cSld>
     <p:spTree>
@@ -15308,7 +15729,7 @@
 </p:sld>
 </file>
 
-<file path=ppt/slides/slide35.xml><?xml version="1.0" encoding="utf-8"?>
+<file path=ppt/slides/slide36.xml><?xml version="1.0" encoding="utf-8"?>
 <p:sld xmlns:a="http://schemas.openxmlformats.org/drawingml/2006/main" xmlns:r="http://schemas.openxmlformats.org/officeDocument/2006/relationships" xmlns:p="http://schemas.openxmlformats.org/presentationml/2006/main">
   <p:cSld>
     <p:spTree>
@@ -15360,8 +15781,8 @@
           </a:p>
         </p:txBody>
       </p:sp>
-      <mc:AlternateContent xmlns:mc="http://schemas.openxmlformats.org/markup-compatibility/2006">
-        <mc:Choice xmlns:a14="http://schemas.microsoft.com/office/drawing/2010/main" Requires="a14">
+      <mc:AlternateContent xmlns:mc="http://schemas.openxmlformats.org/markup-compatibility/2006" xmlns:a14="http://schemas.microsoft.com/office/drawing/2010/main">
+        <mc:Choice Requires="a14">
           <p:sp>
             <p:nvSpPr>
               <p:cNvPr id="3" name="Content Placeholder 2"/>
@@ -16218,7 +16639,7 @@
             </p:txBody>
           </p:sp>
         </mc:Choice>
-        <mc:Fallback>
+        <mc:Fallback xmlns="">
           <p:sp>
             <p:nvSpPr>
               <p:cNvPr id="3" name="Content Placeholder 2"/>
@@ -16316,7 +16737,7 @@
 </p:sld>
 </file>
 
-<file path=ppt/slides/slide36.xml><?xml version="1.0" encoding="utf-8"?>
+<file path=ppt/slides/slide37.xml><?xml version="1.0" encoding="utf-8"?>
 <p:sld xmlns:a="http://schemas.openxmlformats.org/drawingml/2006/main" xmlns:r="http://schemas.openxmlformats.org/officeDocument/2006/relationships" xmlns:p="http://schemas.openxmlformats.org/presentationml/2006/main">
   <p:cSld>
     <p:spTree>
@@ -16680,7 +17101,7 @@
 </p:sld>
 </file>
 
-<file path=ppt/slides/slide37.xml><?xml version="1.0" encoding="utf-8"?>
+<file path=ppt/slides/slide38.xml><?xml version="1.0" encoding="utf-8"?>
 <p:sld xmlns:a="http://schemas.openxmlformats.org/drawingml/2006/main" xmlns:r="http://schemas.openxmlformats.org/officeDocument/2006/relationships" xmlns:p="http://schemas.openxmlformats.org/presentationml/2006/main">
   <p:cSld>
     <p:spTree>
@@ -16732,8 +17153,8 @@
           </a:p>
         </p:txBody>
       </p:sp>
-      <mc:AlternateContent xmlns:mc="http://schemas.openxmlformats.org/markup-compatibility/2006">
-        <mc:Choice xmlns:a14="http://schemas.microsoft.com/office/drawing/2010/main" Requires="a14">
+      <mc:AlternateContent xmlns:mc="http://schemas.openxmlformats.org/markup-compatibility/2006" xmlns:a14="http://schemas.microsoft.com/office/drawing/2010/main">
+        <mc:Choice Requires="a14">
           <p:sp>
             <p:nvSpPr>
               <p:cNvPr id="3" name="Content Placeholder 2"/>
@@ -17216,7 +17637,7 @@
             </p:txBody>
           </p:sp>
         </mc:Choice>
-        <mc:Fallback>
+        <mc:Fallback xmlns="">
           <p:sp>
             <p:nvSpPr>
               <p:cNvPr id="3" name="Content Placeholder 2"/>
@@ -17267,7 +17688,7 @@
 </p:sld>
 </file>
 
-<file path=ppt/slides/slide38.xml><?xml version="1.0" encoding="utf-8"?>
+<file path=ppt/slides/slide39.xml><?xml version="1.0" encoding="utf-8"?>
 <p:sld xmlns:a="http://schemas.openxmlformats.org/drawingml/2006/main" xmlns:r="http://schemas.openxmlformats.org/officeDocument/2006/relationships" xmlns:p="http://schemas.openxmlformats.org/presentationml/2006/main">
   <p:cSld>
     <p:spTree>
@@ -17319,8 +17740,8 @@
           </a:p>
         </p:txBody>
       </p:sp>
-      <mc:AlternateContent xmlns:mc="http://schemas.openxmlformats.org/markup-compatibility/2006">
-        <mc:Choice xmlns:a14="http://schemas.microsoft.com/office/drawing/2010/main" Requires="a14">
+      <mc:AlternateContent xmlns:mc="http://schemas.openxmlformats.org/markup-compatibility/2006" xmlns:a14="http://schemas.microsoft.com/office/drawing/2010/main">
+        <mc:Choice Requires="a14">
           <p:sp>
             <p:nvSpPr>
               <p:cNvPr id="3" name="Content Placeholder 2"/>
@@ -17711,7 +18132,7 @@
             </p:txBody>
           </p:sp>
         </mc:Choice>
-        <mc:Fallback>
+        <mc:Fallback xmlns="">
           <p:sp>
             <p:nvSpPr>
               <p:cNvPr id="3" name="Content Placeholder 2"/>
@@ -17762,318 +18183,6 @@
 </p:sld>
 </file>
 
-<file path=ppt/slides/slide39.xml><?xml version="1.0" encoding="utf-8"?>
-<p:sld xmlns:a="http://schemas.openxmlformats.org/drawingml/2006/main" xmlns:r="http://schemas.openxmlformats.org/officeDocument/2006/relationships" xmlns:p="http://schemas.openxmlformats.org/presentationml/2006/main">
-  <p:cSld>
-    <p:spTree>
-      <p:nvGrpSpPr>
-        <p:cNvPr id="1" name=""/>
-        <p:cNvGrpSpPr/>
-        <p:nvPr/>
-      </p:nvGrpSpPr>
-      <p:grpSpPr>
-        <a:xfrm>
-          <a:off x="0" y="0"/>
-          <a:ext cx="0" cy="0"/>
-          <a:chOff x="0" y="0"/>
-          <a:chExt cx="0" cy="0"/>
-        </a:xfrm>
-      </p:grpSpPr>
-      <p:sp>
-        <p:nvSpPr>
-          <p:cNvPr id="2" name="Title 1"/>
-          <p:cNvSpPr>
-            <a:spLocks noGrp="1"/>
-          </p:cNvSpPr>
-          <p:nvPr>
-            <p:ph type="title"/>
-          </p:nvPr>
-        </p:nvSpPr>
-        <p:spPr>
-          <a:xfrm>
-            <a:off x="609600" y="337392"/>
-            <a:ext cx="10439400" cy="624840"/>
-          </a:xfrm>
-        </p:spPr>
-        <p:txBody>
-          <a:bodyPr>
-            <a:noAutofit/>
-          </a:bodyPr>
-          <a:lstStyle/>
-          <a:p>
-            <a:r>
-              <a:rPr lang="en-US" sz="3600" dirty="0">
-                <a:cs typeface="Times New Roman" panose="02020603050405020304" pitchFamily="18" charset="0"/>
-              </a:rPr>
-              <a:t>Random Forests</a:t>
-            </a:r>
-            <a:endParaRPr lang="en-US" sz="3600" dirty="0">
-              <a:latin typeface="Times New Roman" panose="02020603050405020304" pitchFamily="18" charset="0"/>
-              <a:cs typeface="Times New Roman" panose="02020603050405020304" pitchFamily="18" charset="0"/>
-            </a:endParaRPr>
-          </a:p>
-        </p:txBody>
-      </p:sp>
-      <p:sp>
-        <p:nvSpPr>
-          <p:cNvPr id="3" name="Content Placeholder 2"/>
-          <p:cNvSpPr>
-            <a:spLocks noGrp="1"/>
-          </p:cNvSpPr>
-          <p:nvPr>
-            <p:ph idx="1"/>
-          </p:nvPr>
-        </p:nvSpPr>
-        <p:spPr>
-          <a:xfrm>
-            <a:off x="609601" y="1066801"/>
-            <a:ext cx="10439400" cy="5141388"/>
-          </a:xfrm>
-        </p:spPr>
-        <p:txBody>
-          <a:bodyPr>
-            <a:noAutofit/>
-          </a:bodyPr>
-          <a:lstStyle/>
-          <a:p>
-            <a:r>
-              <a:rPr lang="en-US" sz="2400" dirty="0">
-                <a:solidFill>
-                  <a:srgbClr val="222222"/>
-                </a:solidFill>
-                <a:cs typeface="Times New Roman" panose="02020603050405020304" pitchFamily="18" charset="0"/>
-              </a:rPr>
-              <a:t>A more </a:t>
-            </a:r>
-            <a:r>
-              <a:rPr lang="en-US" sz="2400" b="1" dirty="0">
-                <a:solidFill>
-                  <a:srgbClr val="222222"/>
-                </a:solidFill>
-                <a:cs typeface="Times New Roman" panose="02020603050405020304" pitchFamily="18" charset="0"/>
-              </a:rPr>
-              <a:t>computer science / prediction </a:t>
-            </a:r>
-            <a:r>
-              <a:rPr lang="en-US" sz="2400" dirty="0">
-                <a:solidFill>
-                  <a:srgbClr val="222222"/>
-                </a:solidFill>
-                <a:cs typeface="Times New Roman" panose="02020603050405020304" pitchFamily="18" charset="0"/>
-              </a:rPr>
-              <a:t>approach to regression</a:t>
-            </a:r>
-          </a:p>
-          <a:p>
-            <a:pPr lvl="1"/>
-            <a:r>
-              <a:rPr lang="en-US" sz="2400" dirty="0">
-                <a:solidFill>
-                  <a:srgbClr val="222222"/>
-                </a:solidFill>
-                <a:cs typeface="Times New Roman" panose="02020603050405020304" pitchFamily="18" charset="0"/>
-              </a:rPr>
-              <a:t>Rather than coefficient estimation based on averages of errors, </a:t>
-            </a:r>
-          </a:p>
-          <a:p>
-            <a:pPr lvl="1"/>
-            <a:r>
-              <a:rPr lang="en-US" sz="2400" dirty="0">
-                <a:solidFill>
-                  <a:srgbClr val="222222"/>
-                </a:solidFill>
-                <a:cs typeface="Times New Roman" panose="02020603050405020304" pitchFamily="18" charset="0"/>
-              </a:rPr>
-              <a:t>Split data into </a:t>
-            </a:r>
-            <a:r>
-              <a:rPr lang="en-US" sz="2400" i="1" dirty="0">
-                <a:solidFill>
-                  <a:srgbClr val="222222"/>
-                </a:solidFill>
-                <a:cs typeface="Times New Roman" panose="02020603050405020304" pitchFamily="18" charset="0"/>
-              </a:rPr>
-              <a:t>trees </a:t>
-            </a:r>
-            <a:r>
-              <a:rPr lang="en-US" sz="2400" dirty="0">
-                <a:solidFill>
-                  <a:srgbClr val="222222"/>
-                </a:solidFill>
-                <a:cs typeface="Times New Roman" panose="02020603050405020304" pitchFamily="18" charset="0"/>
-              </a:rPr>
-              <a:t>based on “cut-points” in data</a:t>
-            </a:r>
-          </a:p>
-          <a:p>
-            <a:pPr lvl="1"/>
-            <a:r>
-              <a:rPr lang="en-US" sz="2400" dirty="0">
-                <a:solidFill>
-                  <a:srgbClr val="222222"/>
-                </a:solidFill>
-                <a:cs typeface="Times New Roman" panose="02020603050405020304" pitchFamily="18" charset="0"/>
-              </a:rPr>
-              <a:t>Trees are chosen in order to maximize predictive power of data</a:t>
-            </a:r>
-          </a:p>
-          <a:p>
-            <a:r>
-              <a:rPr lang="en-US" sz="2400" dirty="0">
-                <a:solidFill>
-                  <a:srgbClr val="222222"/>
-                </a:solidFill>
-                <a:cs typeface="Times New Roman" panose="02020603050405020304" pitchFamily="18" charset="0"/>
-              </a:rPr>
-              <a:t>Forests: bootstrapping over the trees!</a:t>
-            </a:r>
-          </a:p>
-          <a:p>
-            <a:pPr lvl="1"/>
-            <a:r>
-              <a:rPr lang="en-US" sz="2400" dirty="0">
-                <a:solidFill>
-                  <a:srgbClr val="222222"/>
-                </a:solidFill>
-                <a:cs typeface="Times New Roman" panose="02020603050405020304" pitchFamily="18" charset="0"/>
-              </a:rPr>
-              <a:t>There is new terminology here: bagging, boosting, etc. But the concepts are similar</a:t>
-            </a:r>
-          </a:p>
-          <a:p>
-            <a:r>
-              <a:rPr lang="en-US" sz="2400" dirty="0">
-                <a:solidFill>
-                  <a:srgbClr val="222222"/>
-                </a:solidFill>
-                <a:cs typeface="Times New Roman" panose="02020603050405020304" pitchFamily="18" charset="0"/>
-              </a:rPr>
-              <a:t>These methods were applied best as </a:t>
-            </a:r>
-            <a:r>
-              <a:rPr lang="en-US" sz="2400" b="1" dirty="0">
-                <a:solidFill>
-                  <a:srgbClr val="222222"/>
-                </a:solidFill>
-                <a:cs typeface="Times New Roman" panose="02020603050405020304" pitchFamily="18" charset="0"/>
-              </a:rPr>
-              <a:t>predictive methods</a:t>
-            </a:r>
-            <a:r>
-              <a:rPr lang="en-US" sz="2400" dirty="0">
-                <a:solidFill>
-                  <a:srgbClr val="222222"/>
-                </a:solidFill>
-                <a:cs typeface="Times New Roman" panose="02020603050405020304" pitchFamily="18" charset="0"/>
-              </a:rPr>
-              <a:t>, so causality is not always apparent</a:t>
-            </a:r>
-          </a:p>
-          <a:p>
-            <a:pPr lvl="1"/>
-            <a:r>
-              <a:rPr lang="en-US" sz="2400" dirty="0">
-                <a:solidFill>
-                  <a:srgbClr val="222222"/>
-                </a:solidFill>
-                <a:cs typeface="Times New Roman" panose="02020603050405020304" pitchFamily="18" charset="0"/>
-              </a:rPr>
-              <a:t>But causal methods are being developed; see papers in </a:t>
-            </a:r>
-            <a:r>
-              <a:rPr lang="en-US" sz="2400" dirty="0" err="1">
-                <a:solidFill>
-                  <a:srgbClr val="222222"/>
-                </a:solidFill>
-                <a:cs typeface="Times New Roman" panose="02020603050405020304" pitchFamily="18" charset="0"/>
-              </a:rPr>
-              <a:t>Github</a:t>
-            </a:r>
-            <a:r>
-              <a:rPr lang="en-US" sz="2400" dirty="0">
-                <a:solidFill>
-                  <a:srgbClr val="222222"/>
-                </a:solidFill>
-                <a:cs typeface="Times New Roman" panose="02020603050405020304" pitchFamily="18" charset="0"/>
-              </a:rPr>
-              <a:t> repo </a:t>
-            </a:r>
-          </a:p>
-          <a:p>
-            <a:pPr lvl="1"/>
-            <a:r>
-              <a:rPr lang="en-US" sz="2400" dirty="0">
-                <a:solidFill>
-                  <a:srgbClr val="222222"/>
-                </a:solidFill>
-                <a:cs typeface="Times New Roman" panose="02020603050405020304" pitchFamily="18" charset="0"/>
-              </a:rPr>
-              <a:t>Sometimes we care about prediction too! (e.g., risk adjustment)</a:t>
-            </a:r>
-          </a:p>
-        </p:txBody>
-      </p:sp>
-      <p:pic>
-        <p:nvPicPr>
-          <p:cNvPr id="4" name="Picture 2" descr="RStudio - RStudio">
-            <a:extLst>
-              <a:ext uri="{FF2B5EF4-FFF2-40B4-BE49-F238E27FC236}">
-                <a16:creationId xmlns:a16="http://schemas.microsoft.com/office/drawing/2014/main" id="{EAA4D273-BE86-B94A-B34C-C3E48EB17EDD}"/>
-              </a:ext>
-            </a:extLst>
-          </p:cNvPr>
-          <p:cNvPicPr>
-            <a:picLocks noChangeAspect="1" noChangeArrowheads="1"/>
-          </p:cNvPicPr>
-          <p:nvPr/>
-        </p:nvPicPr>
-        <p:blipFill>
-          <a:blip r:embed="rId3">
-            <a:extLst>
-              <a:ext uri="{28A0092B-C50C-407E-A947-70E740481C1C}">
-                <a14:useLocalDpi xmlns:a14="http://schemas.microsoft.com/office/drawing/2010/main" val="0"/>
-              </a:ext>
-            </a:extLst>
-          </a:blip>
-          <a:srcRect/>
-          <a:stretch>
-            <a:fillRect/>
-          </a:stretch>
-        </p:blipFill>
-        <p:spPr bwMode="auto">
-          <a:xfrm>
-            <a:off x="9527629" y="5209968"/>
-            <a:ext cx="1371600" cy="1371600"/>
-          </a:xfrm>
-          <a:prstGeom prst="rect">
-            <a:avLst/>
-          </a:prstGeom>
-          <a:noFill/>
-          <a:extLst>
-            <a:ext uri="{909E8E84-426E-40DD-AFC4-6F175D3DCCD1}">
-              <a14:hiddenFill xmlns:a14="http://schemas.microsoft.com/office/drawing/2010/main">
-                <a:solidFill>
-                  <a:srgbClr val="FFFFFF"/>
-                </a:solidFill>
-              </a14:hiddenFill>
-            </a:ext>
-          </a:extLst>
-        </p:spPr>
-      </p:pic>
-    </p:spTree>
-    <p:extLst>
-      <p:ext uri="{BB962C8B-B14F-4D97-AF65-F5344CB8AC3E}">
-        <p14:creationId xmlns:p14="http://schemas.microsoft.com/office/powerpoint/2010/main" val="1679008531"/>
-      </p:ext>
-    </p:extLst>
-  </p:cSld>
-  <p:clrMapOvr>
-    <a:masterClrMapping/>
-  </p:clrMapOvr>
-</p:sld>
-</file>
-
 <file path=ppt/slides/slide4.xml><?xml version="1.0" encoding="utf-8"?>
 <p:sld xmlns:a="http://schemas.openxmlformats.org/drawingml/2006/main" xmlns:r="http://schemas.openxmlformats.org/officeDocument/2006/relationships" xmlns:p="http://schemas.openxmlformats.org/presentationml/2006/main">
   <p:cSld>
@@ -18138,8 +18247,8 @@
           </a:p>
         </p:txBody>
       </p:sp>
-      <mc:AlternateContent xmlns:mc="http://schemas.openxmlformats.org/markup-compatibility/2006">
-        <mc:Choice xmlns:a14="http://schemas.microsoft.com/office/drawing/2010/main" Requires="a14">
+      <mc:AlternateContent xmlns:mc="http://schemas.openxmlformats.org/markup-compatibility/2006" xmlns:a14="http://schemas.microsoft.com/office/drawing/2010/main">
+        <mc:Choice Requires="a14">
           <p:sp>
             <p:nvSpPr>
               <p:cNvPr id="3" name="Content Placeholder 2"/>
@@ -18438,7 +18547,7 @@
             </p:txBody>
           </p:sp>
         </mc:Choice>
-        <mc:Fallback>
+        <mc:Fallback xmlns="">
           <p:sp>
             <p:nvSpPr>
               <p:cNvPr id="3" name="Content Placeholder 2"/>
@@ -18532,6 +18641,318 @@
               <a:rPr lang="en-US" sz="3600" dirty="0">
                 <a:cs typeface="Times New Roman" panose="02020603050405020304" pitchFamily="18" charset="0"/>
               </a:rPr>
+              <a:t>Random Forests</a:t>
+            </a:r>
+            <a:endParaRPr lang="en-US" sz="3600" dirty="0">
+              <a:latin typeface="Times New Roman" panose="02020603050405020304" pitchFamily="18" charset="0"/>
+              <a:cs typeface="Times New Roman" panose="02020603050405020304" pitchFamily="18" charset="0"/>
+            </a:endParaRPr>
+          </a:p>
+        </p:txBody>
+      </p:sp>
+      <p:sp>
+        <p:nvSpPr>
+          <p:cNvPr id="3" name="Content Placeholder 2"/>
+          <p:cNvSpPr>
+            <a:spLocks noGrp="1"/>
+          </p:cNvSpPr>
+          <p:nvPr>
+            <p:ph idx="1"/>
+          </p:nvPr>
+        </p:nvSpPr>
+        <p:spPr>
+          <a:xfrm>
+            <a:off x="609601" y="1066801"/>
+            <a:ext cx="10439400" cy="5141388"/>
+          </a:xfrm>
+        </p:spPr>
+        <p:txBody>
+          <a:bodyPr>
+            <a:noAutofit/>
+          </a:bodyPr>
+          <a:lstStyle/>
+          <a:p>
+            <a:r>
+              <a:rPr lang="en-US" sz="2400" dirty="0">
+                <a:solidFill>
+                  <a:srgbClr val="222222"/>
+                </a:solidFill>
+                <a:cs typeface="Times New Roman" panose="02020603050405020304" pitchFamily="18" charset="0"/>
+              </a:rPr>
+              <a:t>A more </a:t>
+            </a:r>
+            <a:r>
+              <a:rPr lang="en-US" sz="2400" b="1" dirty="0">
+                <a:solidFill>
+                  <a:srgbClr val="222222"/>
+                </a:solidFill>
+                <a:cs typeface="Times New Roman" panose="02020603050405020304" pitchFamily="18" charset="0"/>
+              </a:rPr>
+              <a:t>computer science / prediction </a:t>
+            </a:r>
+            <a:r>
+              <a:rPr lang="en-US" sz="2400" dirty="0">
+                <a:solidFill>
+                  <a:srgbClr val="222222"/>
+                </a:solidFill>
+                <a:cs typeface="Times New Roman" panose="02020603050405020304" pitchFamily="18" charset="0"/>
+              </a:rPr>
+              <a:t>approach to regression</a:t>
+            </a:r>
+          </a:p>
+          <a:p>
+            <a:pPr lvl="1"/>
+            <a:r>
+              <a:rPr lang="en-US" sz="2400" dirty="0">
+                <a:solidFill>
+                  <a:srgbClr val="222222"/>
+                </a:solidFill>
+                <a:cs typeface="Times New Roman" panose="02020603050405020304" pitchFamily="18" charset="0"/>
+              </a:rPr>
+              <a:t>Rather than coefficient estimation based on averages of errors, </a:t>
+            </a:r>
+          </a:p>
+          <a:p>
+            <a:pPr lvl="1"/>
+            <a:r>
+              <a:rPr lang="en-US" sz="2400" dirty="0">
+                <a:solidFill>
+                  <a:srgbClr val="222222"/>
+                </a:solidFill>
+                <a:cs typeface="Times New Roman" panose="02020603050405020304" pitchFamily="18" charset="0"/>
+              </a:rPr>
+              <a:t>Split data into </a:t>
+            </a:r>
+            <a:r>
+              <a:rPr lang="en-US" sz="2400" i="1" dirty="0">
+                <a:solidFill>
+                  <a:srgbClr val="222222"/>
+                </a:solidFill>
+                <a:cs typeface="Times New Roman" panose="02020603050405020304" pitchFamily="18" charset="0"/>
+              </a:rPr>
+              <a:t>trees </a:t>
+            </a:r>
+            <a:r>
+              <a:rPr lang="en-US" sz="2400" dirty="0">
+                <a:solidFill>
+                  <a:srgbClr val="222222"/>
+                </a:solidFill>
+                <a:cs typeface="Times New Roman" panose="02020603050405020304" pitchFamily="18" charset="0"/>
+              </a:rPr>
+              <a:t>based on “cut-points” in data</a:t>
+            </a:r>
+          </a:p>
+          <a:p>
+            <a:pPr lvl="1"/>
+            <a:r>
+              <a:rPr lang="en-US" sz="2400" dirty="0">
+                <a:solidFill>
+                  <a:srgbClr val="222222"/>
+                </a:solidFill>
+                <a:cs typeface="Times New Roman" panose="02020603050405020304" pitchFamily="18" charset="0"/>
+              </a:rPr>
+              <a:t>Trees are chosen in order to maximize predictive power of data</a:t>
+            </a:r>
+          </a:p>
+          <a:p>
+            <a:r>
+              <a:rPr lang="en-US" sz="2400" dirty="0">
+                <a:solidFill>
+                  <a:srgbClr val="222222"/>
+                </a:solidFill>
+                <a:cs typeface="Times New Roman" panose="02020603050405020304" pitchFamily="18" charset="0"/>
+              </a:rPr>
+              <a:t>Forests: bootstrapping over the trees!</a:t>
+            </a:r>
+          </a:p>
+          <a:p>
+            <a:pPr lvl="1"/>
+            <a:r>
+              <a:rPr lang="en-US" sz="2400" dirty="0">
+                <a:solidFill>
+                  <a:srgbClr val="222222"/>
+                </a:solidFill>
+                <a:cs typeface="Times New Roman" panose="02020603050405020304" pitchFamily="18" charset="0"/>
+              </a:rPr>
+              <a:t>There is new terminology here: bagging, boosting, etc. But the concepts are similar</a:t>
+            </a:r>
+          </a:p>
+          <a:p>
+            <a:r>
+              <a:rPr lang="en-US" sz="2400" dirty="0">
+                <a:solidFill>
+                  <a:srgbClr val="222222"/>
+                </a:solidFill>
+                <a:cs typeface="Times New Roman" panose="02020603050405020304" pitchFamily="18" charset="0"/>
+              </a:rPr>
+              <a:t>These methods were applied best as </a:t>
+            </a:r>
+            <a:r>
+              <a:rPr lang="en-US" sz="2400" b="1" dirty="0">
+                <a:solidFill>
+                  <a:srgbClr val="222222"/>
+                </a:solidFill>
+                <a:cs typeface="Times New Roman" panose="02020603050405020304" pitchFamily="18" charset="0"/>
+              </a:rPr>
+              <a:t>predictive methods</a:t>
+            </a:r>
+            <a:r>
+              <a:rPr lang="en-US" sz="2400" dirty="0">
+                <a:solidFill>
+                  <a:srgbClr val="222222"/>
+                </a:solidFill>
+                <a:cs typeface="Times New Roman" panose="02020603050405020304" pitchFamily="18" charset="0"/>
+              </a:rPr>
+              <a:t>, so causality is not always apparent</a:t>
+            </a:r>
+          </a:p>
+          <a:p>
+            <a:pPr lvl="1"/>
+            <a:r>
+              <a:rPr lang="en-US" sz="2400" dirty="0">
+                <a:solidFill>
+                  <a:srgbClr val="222222"/>
+                </a:solidFill>
+                <a:cs typeface="Times New Roman" panose="02020603050405020304" pitchFamily="18" charset="0"/>
+              </a:rPr>
+              <a:t>But causal methods are being developed; see papers in </a:t>
+            </a:r>
+            <a:r>
+              <a:rPr lang="en-US" sz="2400" dirty="0" err="1">
+                <a:solidFill>
+                  <a:srgbClr val="222222"/>
+                </a:solidFill>
+                <a:cs typeface="Times New Roman" panose="02020603050405020304" pitchFamily="18" charset="0"/>
+              </a:rPr>
+              <a:t>Github</a:t>
+            </a:r>
+            <a:r>
+              <a:rPr lang="en-US" sz="2400" dirty="0">
+                <a:solidFill>
+                  <a:srgbClr val="222222"/>
+                </a:solidFill>
+                <a:cs typeface="Times New Roman" panose="02020603050405020304" pitchFamily="18" charset="0"/>
+              </a:rPr>
+              <a:t> repo </a:t>
+            </a:r>
+          </a:p>
+          <a:p>
+            <a:pPr lvl="1"/>
+            <a:r>
+              <a:rPr lang="en-US" sz="2400" dirty="0">
+                <a:solidFill>
+                  <a:srgbClr val="222222"/>
+                </a:solidFill>
+                <a:cs typeface="Times New Roman" panose="02020603050405020304" pitchFamily="18" charset="0"/>
+              </a:rPr>
+              <a:t>Sometimes we care about prediction too! (e.g., risk adjustment)</a:t>
+            </a:r>
+          </a:p>
+        </p:txBody>
+      </p:sp>
+      <p:pic>
+        <p:nvPicPr>
+          <p:cNvPr id="4" name="Picture 2" descr="RStudio - RStudio">
+            <a:extLst>
+              <a:ext uri="{FF2B5EF4-FFF2-40B4-BE49-F238E27FC236}">
+                <a16:creationId xmlns:a16="http://schemas.microsoft.com/office/drawing/2014/main" id="{EAA4D273-BE86-B94A-B34C-C3E48EB17EDD}"/>
+              </a:ext>
+            </a:extLst>
+          </p:cNvPr>
+          <p:cNvPicPr>
+            <a:picLocks noChangeAspect="1" noChangeArrowheads="1"/>
+          </p:cNvPicPr>
+          <p:nvPr/>
+        </p:nvPicPr>
+        <p:blipFill>
+          <a:blip r:embed="rId3">
+            <a:extLst>
+              <a:ext uri="{28A0092B-C50C-407E-A947-70E740481C1C}">
+                <a14:useLocalDpi xmlns:a14="http://schemas.microsoft.com/office/drawing/2010/main" val="0"/>
+              </a:ext>
+            </a:extLst>
+          </a:blip>
+          <a:srcRect/>
+          <a:stretch>
+            <a:fillRect/>
+          </a:stretch>
+        </p:blipFill>
+        <p:spPr bwMode="auto">
+          <a:xfrm>
+            <a:off x="9527629" y="5209968"/>
+            <a:ext cx="1371600" cy="1371600"/>
+          </a:xfrm>
+          <a:prstGeom prst="rect">
+            <a:avLst/>
+          </a:prstGeom>
+          <a:noFill/>
+          <a:extLst>
+            <a:ext uri="{909E8E84-426E-40DD-AFC4-6F175D3DCCD1}">
+              <a14:hiddenFill xmlns:a14="http://schemas.microsoft.com/office/drawing/2010/main">
+                <a:solidFill>
+                  <a:srgbClr val="FFFFFF"/>
+                </a:solidFill>
+              </a14:hiddenFill>
+            </a:ext>
+          </a:extLst>
+        </p:spPr>
+      </p:pic>
+    </p:spTree>
+    <p:extLst>
+      <p:ext uri="{BB962C8B-B14F-4D97-AF65-F5344CB8AC3E}">
+        <p14:creationId xmlns:p14="http://schemas.microsoft.com/office/powerpoint/2010/main" val="1679008531"/>
+      </p:ext>
+    </p:extLst>
+  </p:cSld>
+  <p:clrMapOvr>
+    <a:masterClrMapping/>
+  </p:clrMapOvr>
+</p:sld>
+</file>
+
+<file path=ppt/slides/slide41.xml><?xml version="1.0" encoding="utf-8"?>
+<p:sld xmlns:a="http://schemas.openxmlformats.org/drawingml/2006/main" xmlns:r="http://schemas.openxmlformats.org/officeDocument/2006/relationships" xmlns:p="http://schemas.openxmlformats.org/presentationml/2006/main">
+  <p:cSld>
+    <p:spTree>
+      <p:nvGrpSpPr>
+        <p:cNvPr id="1" name=""/>
+        <p:cNvGrpSpPr/>
+        <p:nvPr/>
+      </p:nvGrpSpPr>
+      <p:grpSpPr>
+        <a:xfrm>
+          <a:off x="0" y="0"/>
+          <a:ext cx="0" cy="0"/>
+          <a:chOff x="0" y="0"/>
+          <a:chExt cx="0" cy="0"/>
+        </a:xfrm>
+      </p:grpSpPr>
+      <p:sp>
+        <p:nvSpPr>
+          <p:cNvPr id="2" name="Title 1"/>
+          <p:cNvSpPr>
+            <a:spLocks noGrp="1"/>
+          </p:cNvSpPr>
+          <p:nvPr>
+            <p:ph type="title"/>
+          </p:nvPr>
+        </p:nvSpPr>
+        <p:spPr>
+          <a:xfrm>
+            <a:off x="609600" y="337392"/>
+            <a:ext cx="10439400" cy="624840"/>
+          </a:xfrm>
+        </p:spPr>
+        <p:txBody>
+          <a:bodyPr>
+            <a:noAutofit/>
+          </a:bodyPr>
+          <a:lstStyle/>
+          <a:p>
+            <a:r>
+              <a:rPr lang="en-US" sz="3600" dirty="0">
+                <a:cs typeface="Times New Roman" panose="02020603050405020304" pitchFamily="18" charset="0"/>
+              </a:rPr>
               <a:t>Neural Networks</a:t>
             </a:r>
             <a:endParaRPr lang="en-US" sz="3600" dirty="0">
@@ -18723,7 +19144,7 @@
 </p:sld>
 </file>
 
-<file path=ppt/slides/slide41.xml><?xml version="1.0" encoding="utf-8"?>
+<file path=ppt/slides/slide42.xml><?xml version="1.0" encoding="utf-8"?>
 <p:sld xmlns:a="http://schemas.openxmlformats.org/drawingml/2006/main" xmlns:r="http://schemas.openxmlformats.org/officeDocument/2006/relationships" xmlns:p="http://schemas.openxmlformats.org/presentationml/2006/main">
   <p:cSld>
     <p:spTree>
@@ -18775,8 +19196,8 @@
           </a:p>
         </p:txBody>
       </p:sp>
-      <mc:AlternateContent xmlns:mc="http://schemas.openxmlformats.org/markup-compatibility/2006">
-        <mc:Choice xmlns:a14="http://schemas.microsoft.com/office/drawing/2010/main" Requires="a14">
+      <mc:AlternateContent xmlns:mc="http://schemas.openxmlformats.org/markup-compatibility/2006" xmlns:a14="http://schemas.microsoft.com/office/drawing/2010/main">
+        <mc:Choice Requires="a14">
           <p:sp>
             <p:nvSpPr>
               <p:cNvPr id="3" name="Content Placeholder 2"/>
@@ -18932,7 +19353,7 @@
             </p:txBody>
           </p:sp>
         </mc:Choice>
-        <mc:Fallback>
+        <mc:Fallback xmlns="">
           <p:sp>
             <p:nvSpPr>
               <p:cNvPr id="3" name="Content Placeholder 2"/>
@@ -19047,8 +19468,8 @@
           </a:p>
         </p:txBody>
       </p:sp>
-      <mc:AlternateContent xmlns:mc="http://schemas.openxmlformats.org/markup-compatibility/2006">
-        <mc:Choice xmlns:a14="http://schemas.microsoft.com/office/drawing/2010/main" Requires="a14">
+      <mc:AlternateContent xmlns:mc="http://schemas.openxmlformats.org/markup-compatibility/2006" xmlns:a14="http://schemas.microsoft.com/office/drawing/2010/main">
+        <mc:Choice Requires="a14">
           <p:sp>
             <p:nvSpPr>
               <p:cNvPr id="3" name="Content Placeholder 2"/>
@@ -19406,7 +19827,7 @@
             </p:txBody>
           </p:sp>
         </mc:Choice>
-        <mc:Fallback>
+        <mc:Fallback xmlns="">
           <p:sp>
             <p:nvSpPr>
               <p:cNvPr id="3" name="Content Placeholder 2"/>

</xml_diff>